<commit_message>
Database Design Small Fixes
</commit_message>
<xml_diff>
--- a/documentation/Database Design.pptx
+++ b/documentation/Database Design.pptx
@@ -71,43 +71,7 @@
                 </a:solidFill>
                 <a:latin typeface="Arial"/>
               </a:rPr>
-              <a:t>Click </a:t>
-            </a:r>
-            <a:r>
-              <a:rPr b="0" lang="en-US" sz="4400" spc="-1" strike="noStrike">
-                <a:solidFill>
-                  <a:srgbClr val="000000"/>
-                </a:solidFill>
-                <a:latin typeface="Arial"/>
-              </a:rPr>
-              <a:t>to </a:t>
-            </a:r>
-            <a:r>
-              <a:rPr b="0" lang="en-US" sz="4400" spc="-1" strike="noStrike">
-                <a:solidFill>
-                  <a:srgbClr val="000000"/>
-                </a:solidFill>
-                <a:latin typeface="Arial"/>
-              </a:rPr>
-              <a:t>move </a:t>
-            </a:r>
-            <a:r>
-              <a:rPr b="0" lang="en-US" sz="4400" spc="-1" strike="noStrike">
-                <a:solidFill>
-                  <a:srgbClr val="000000"/>
-                </a:solidFill>
-                <a:latin typeface="Arial"/>
-              </a:rPr>
-              <a:t>the </a:t>
-            </a:r>
-            <a:r>
-              <a:rPr b="0" lang="en-US" sz="4400" spc="-1" strike="noStrike">
-                <a:solidFill>
-                  <a:srgbClr val="000000"/>
-                </a:solidFill>
-                <a:latin typeface="Arial"/>
-              </a:rPr>
-              <a:t>slide</a:t>
+              <a:t>Click to move the slide</a:t>
             </a:r>
             <a:endParaRPr b="0" lang="en-US" sz="4400" spc="-1" strike="noStrike">
               <a:solidFill>
@@ -378,7 +342,7 @@
             <a:pPr indent="0" algn="r">
               <a:buNone/>
             </a:pPr>
-            <a:fld id="{548E05D0-EEA5-4763-8967-A6852ECCC1FC}" type="slidenum">
+            <a:fld id="{94E36001-2D8E-4055-AFE5-C691EDE18371}" type="slidenum">
               <a:rPr b="0" lang="en-US" sz="1400" spc="-1" strike="noStrike">
                 <a:solidFill>
                   <a:srgbClr val="000000"/>
@@ -421,7 +385,7 @@
       </p:grpSpPr>
       <p:sp>
         <p:nvSpPr>
-          <p:cNvPr id="276" name="PlaceHolder 1"/>
+          <p:cNvPr id="277" name="PlaceHolder 1"/>
           <p:cNvSpPr>
             <a:spLocks noGrp="1"/>
           </p:cNvSpPr>
@@ -432,7 +396,7 @@
         <p:spPr>
           <a:xfrm>
             <a:off x="685800" y="1143000"/>
-            <a:ext cx="5484240" cy="3084120"/>
+            <a:ext cx="5483880" cy="3083760"/>
           </a:xfrm>
           <a:prstGeom prst="rect">
             <a:avLst/>
@@ -444,7 +408,7 @@
       </p:sp>
       <p:sp>
         <p:nvSpPr>
-          <p:cNvPr id="277" name="PlaceHolder 2"/>
+          <p:cNvPr id="278" name="PlaceHolder 2"/>
           <p:cNvSpPr>
             <a:spLocks noGrp="1"/>
           </p:cNvSpPr>
@@ -455,7 +419,7 @@
         <p:spPr>
           <a:xfrm>
             <a:off x="685800" y="4400640"/>
-            <a:ext cx="5484240" cy="3598200"/>
+            <a:ext cx="5483880" cy="3597840"/>
           </a:xfrm>
           <a:prstGeom prst="rect">
             <a:avLst/>
@@ -484,7 +448,7 @@
       </p:sp>
       <p:sp>
         <p:nvSpPr>
-          <p:cNvPr id="278" name="PlaceHolder 3"/>
+          <p:cNvPr id="279" name="PlaceHolder 3"/>
           <p:cNvSpPr>
             <a:spLocks noGrp="1"/>
           </p:cNvSpPr>
@@ -495,7 +459,7 @@
         <p:spPr>
           <a:xfrm>
             <a:off x="3884760" y="8685360"/>
-            <a:ext cx="2969640" cy="456480"/>
+            <a:ext cx="2969280" cy="456120"/>
           </a:xfrm>
           <a:prstGeom prst="rect">
             <a:avLst/>
@@ -537,7 +501,7 @@
                 <a:tab algn="l" pos="0"/>
               </a:tabLst>
             </a:pPr>
-            <a:fld id="{96129124-1659-4A23-9BEE-EBA2B3CD1418}" type="slidenum">
+            <a:fld id="{2EF3F997-A115-4D24-AF98-514885E67761}" type="slidenum">
               <a:rPr b="0" lang="en-US" sz="1200" spc="-1" strike="noStrike">
                 <a:solidFill>
                   <a:schemeClr val="dk1"/>
@@ -580,7 +544,7 @@
       </p:grpSpPr>
       <p:sp>
         <p:nvSpPr>
-          <p:cNvPr id="279" name="PlaceHolder 1"/>
+          <p:cNvPr id="280" name="PlaceHolder 1"/>
           <p:cNvSpPr>
             <a:spLocks noGrp="1"/>
           </p:cNvSpPr>
@@ -591,7 +555,7 @@
         <p:spPr>
           <a:xfrm>
             <a:off x="685800" y="1143000"/>
-            <a:ext cx="5484240" cy="3084120"/>
+            <a:ext cx="5483880" cy="3083760"/>
           </a:xfrm>
           <a:prstGeom prst="rect">
             <a:avLst/>
@@ -603,7 +567,7 @@
       </p:sp>
       <p:sp>
         <p:nvSpPr>
-          <p:cNvPr id="280" name="PlaceHolder 2"/>
+          <p:cNvPr id="281" name="PlaceHolder 2"/>
           <p:cNvSpPr>
             <a:spLocks noGrp="1"/>
           </p:cNvSpPr>
@@ -614,7 +578,7 @@
         <p:spPr>
           <a:xfrm>
             <a:off x="685800" y="4400640"/>
-            <a:ext cx="5484240" cy="3598200"/>
+            <a:ext cx="5483880" cy="3597840"/>
           </a:xfrm>
           <a:prstGeom prst="rect">
             <a:avLst/>
@@ -643,7 +607,7 @@
       </p:sp>
       <p:sp>
         <p:nvSpPr>
-          <p:cNvPr id="281" name="PlaceHolder 3"/>
+          <p:cNvPr id="282" name="PlaceHolder 3"/>
           <p:cNvSpPr>
             <a:spLocks noGrp="1"/>
           </p:cNvSpPr>
@@ -654,7 +618,7 @@
         <p:spPr>
           <a:xfrm>
             <a:off x="3884760" y="8685360"/>
-            <a:ext cx="2969640" cy="456480"/>
+            <a:ext cx="2969280" cy="456120"/>
           </a:xfrm>
           <a:prstGeom prst="rect">
             <a:avLst/>
@@ -696,7 +660,7 @@
                 <a:tab algn="l" pos="0"/>
               </a:tabLst>
             </a:pPr>
-            <a:fld id="{11A41204-B0EF-4E1F-A201-6B1479740135}" type="slidenum">
+            <a:fld id="{97CDABAE-55A7-41F6-B538-83605A45BA37}" type="slidenum">
               <a:rPr b="0" lang="en-US" sz="1200" spc="-1" strike="noStrike">
                 <a:solidFill>
                   <a:schemeClr val="dk1"/>
@@ -739,7 +703,7 @@
       </p:grpSpPr>
       <p:sp>
         <p:nvSpPr>
-          <p:cNvPr id="282" name="PlaceHolder 1"/>
+          <p:cNvPr id="283" name="PlaceHolder 1"/>
           <p:cNvSpPr>
             <a:spLocks noGrp="1"/>
           </p:cNvSpPr>
@@ -750,7 +714,7 @@
         <p:spPr>
           <a:xfrm>
             <a:off x="685800" y="1143000"/>
-            <a:ext cx="5484240" cy="3084120"/>
+            <a:ext cx="5483880" cy="3083760"/>
           </a:xfrm>
           <a:prstGeom prst="rect">
             <a:avLst/>
@@ -762,7 +726,7 @@
       </p:sp>
       <p:sp>
         <p:nvSpPr>
-          <p:cNvPr id="283" name="PlaceHolder 2"/>
+          <p:cNvPr id="284" name="PlaceHolder 2"/>
           <p:cNvSpPr>
             <a:spLocks noGrp="1"/>
           </p:cNvSpPr>
@@ -773,7 +737,7 @@
         <p:spPr>
           <a:xfrm>
             <a:off x="685800" y="4400640"/>
-            <a:ext cx="5484240" cy="3598200"/>
+            <a:ext cx="5483880" cy="3597840"/>
           </a:xfrm>
           <a:prstGeom prst="rect">
             <a:avLst/>
@@ -802,7 +766,7 @@
       </p:sp>
       <p:sp>
         <p:nvSpPr>
-          <p:cNvPr id="284" name="PlaceHolder 3"/>
+          <p:cNvPr id="285" name="PlaceHolder 3"/>
           <p:cNvSpPr>
             <a:spLocks noGrp="1"/>
           </p:cNvSpPr>
@@ -813,7 +777,7 @@
         <p:spPr>
           <a:xfrm>
             <a:off x="3884760" y="8685360"/>
-            <a:ext cx="2969640" cy="456480"/>
+            <a:ext cx="2969280" cy="456120"/>
           </a:xfrm>
           <a:prstGeom prst="rect">
             <a:avLst/>
@@ -855,7 +819,7 @@
                 <a:tab algn="l" pos="0"/>
               </a:tabLst>
             </a:pPr>
-            <a:fld id="{2E3490BF-97F4-495A-9C48-0E90E9C5297E}" type="slidenum">
+            <a:fld id="{B4FC46B9-E0C5-43A7-BCF7-A0E004EADD98}" type="slidenum">
               <a:rPr b="0" lang="en-US" sz="1200" spc="-1" strike="noStrike">
                 <a:solidFill>
                   <a:schemeClr val="dk1"/>
@@ -898,7 +862,7 @@
       </p:grpSpPr>
       <p:sp>
         <p:nvSpPr>
-          <p:cNvPr id="285" name="PlaceHolder 1"/>
+          <p:cNvPr id="286" name="PlaceHolder 1"/>
           <p:cNvSpPr>
             <a:spLocks noGrp="1"/>
           </p:cNvSpPr>
@@ -909,7 +873,7 @@
         <p:spPr>
           <a:xfrm>
             <a:off x="685800" y="1143000"/>
-            <a:ext cx="5484240" cy="3084120"/>
+            <a:ext cx="5483880" cy="3083760"/>
           </a:xfrm>
           <a:prstGeom prst="rect">
             <a:avLst/>
@@ -921,7 +885,7 @@
       </p:sp>
       <p:sp>
         <p:nvSpPr>
-          <p:cNvPr id="286" name="PlaceHolder 2"/>
+          <p:cNvPr id="287" name="PlaceHolder 2"/>
           <p:cNvSpPr>
             <a:spLocks noGrp="1"/>
           </p:cNvSpPr>
@@ -932,7 +896,7 @@
         <p:spPr>
           <a:xfrm>
             <a:off x="685800" y="4400640"/>
-            <a:ext cx="5484240" cy="3598200"/>
+            <a:ext cx="5483880" cy="3597840"/>
           </a:xfrm>
           <a:prstGeom prst="rect">
             <a:avLst/>
@@ -961,7 +925,7 @@
       </p:sp>
       <p:sp>
         <p:nvSpPr>
-          <p:cNvPr id="287" name="PlaceHolder 3"/>
+          <p:cNvPr id="288" name="PlaceHolder 3"/>
           <p:cNvSpPr>
             <a:spLocks noGrp="1"/>
           </p:cNvSpPr>
@@ -972,7 +936,7 @@
         <p:spPr>
           <a:xfrm>
             <a:off x="3884760" y="8685360"/>
-            <a:ext cx="2969640" cy="456480"/>
+            <a:ext cx="2969280" cy="456120"/>
           </a:xfrm>
           <a:prstGeom prst="rect">
             <a:avLst/>
@@ -1014,7 +978,7 @@
                 <a:tab algn="l" pos="0"/>
               </a:tabLst>
             </a:pPr>
-            <a:fld id="{821A6852-AA3C-4D55-86CB-DB8B57B5F36C}" type="slidenum">
+            <a:fld id="{56802E33-0C96-4FBF-A01A-3166B4355AD8}" type="slidenum">
               <a:rPr b="0" lang="en-US" sz="1200" spc="-1" strike="noStrike">
                 <a:solidFill>
                   <a:schemeClr val="dk1"/>
@@ -1089,7 +1053,7 @@
         <p:txBody>
           <a:bodyPr/>
           <a:p>
-            <a:fld id="{016B94A0-64D0-497A-81FF-612668E8C87A}" type="slidenum">
+            <a:fld id="{114551AE-3135-446F-8AE5-4B2124DCAB0C}" type="slidenum">
               <a:t>&lt;#&gt;</a:t>
             </a:fld>
           </a:p>
@@ -1298,7 +1262,7 @@
         <p:txBody>
           <a:bodyPr/>
           <a:p>
-            <a:fld id="{5E1AB228-0FEB-4425-8359-B22814FDBF1B}" type="slidenum">
+            <a:fld id="{60C29D11-8088-4711-A3CB-5CE03B4BB7CB}" type="slidenum">
               <a:t>&lt;#&gt;</a:t>
             </a:fld>
           </a:p>
@@ -1593,7 +1557,7 @@
         <p:txBody>
           <a:bodyPr/>
           <a:p>
-            <a:fld id="{DC7B9849-98B4-4B01-BBFF-487E27FD5005}" type="slidenum">
+            <a:fld id="{AF0D271E-5E80-4C7E-A95F-6AB60031DF9E}" type="slidenum">
               <a:t>&lt;#&gt;</a:t>
             </a:fld>
           </a:p>
@@ -1974,7 +1938,7 @@
         <p:txBody>
           <a:bodyPr/>
           <a:p>
-            <a:fld id="{76CEF645-61AF-4A37-9C11-2DE473FEF9A3}" type="slidenum">
+            <a:fld id="{77310E96-5347-448E-8EC5-372A839C32AD}" type="slidenum">
               <a:t>&lt;#&gt;</a:t>
             </a:fld>
           </a:p>
@@ -2137,7 +2101,7 @@
         <p:txBody>
           <a:bodyPr/>
           <a:p>
-            <a:fld id="{D472F20F-A6B2-48B1-A75A-D33C7A2C02E1}" type="slidenum">
+            <a:fld id="{DB023E8E-CCBE-4A6B-A766-7B020AE05BC1}" type="slidenum">
               <a:t>&lt;#&gt;</a:t>
             </a:fld>
           </a:p>
@@ -2303,7 +2267,7 @@
         <p:txBody>
           <a:bodyPr/>
           <a:p>
-            <a:fld id="{1940F7D2-A40F-4419-B531-8D59CBAFDA66}" type="slidenum">
+            <a:fld id="{28A82B62-1A16-4439-92F2-636448A41624}" type="slidenum">
               <a:t>&lt;#&gt;</a:t>
             </a:fld>
           </a:p>
@@ -2512,7 +2476,7 @@
         <p:txBody>
           <a:bodyPr/>
           <a:p>
-            <a:fld id="{B103DEA4-09C6-4848-BC72-FBE0C6326D8F}" type="slidenum">
+            <a:fld id="{A7BF43D1-2853-4B81-ABF1-FB1DCC06A941}" type="slidenum">
               <a:t>&lt;#&gt;</a:t>
             </a:fld>
           </a:p>
@@ -2635,7 +2599,7 @@
         <p:txBody>
           <a:bodyPr/>
           <a:p>
-            <a:fld id="{26CEE8F8-FC01-4EEE-B910-0CE26BA52E86}" type="slidenum">
+            <a:fld id="{7B99A9C3-EA87-41C7-90C0-676D759353DB}" type="slidenum">
               <a:t>&lt;#&gt;</a:t>
             </a:fld>
           </a:p>
@@ -2756,7 +2720,7 @@
         <p:txBody>
           <a:bodyPr/>
           <a:p>
-            <a:fld id="{8F1D4230-F17D-49A3-8E49-9B8FC0DA5285}" type="slidenum">
+            <a:fld id="{1C1D8BF8-559B-48E4-8487-1FCEA1BF276D}" type="slidenum">
               <a:t>&lt;#&gt;</a:t>
             </a:fld>
           </a:p>
@@ -3008,7 +2972,7 @@
         <p:txBody>
           <a:bodyPr/>
           <a:p>
-            <a:fld id="{B8CC81B1-EE94-4CE5-9722-55A527A64B9C}" type="slidenum">
+            <a:fld id="{12D07B1D-B61C-4C70-B818-050AC07A62B1}" type="slidenum">
               <a:t>&lt;#&gt;</a:t>
             </a:fld>
           </a:p>
@@ -3260,7 +3224,7 @@
         <p:txBody>
           <a:bodyPr/>
           <a:p>
-            <a:fld id="{B458C4E1-E91E-44D1-8692-091E55005AE4}" type="slidenum">
+            <a:fld id="{8A5276FE-B525-4B6E-9562-45779AE7A137}" type="slidenum">
               <a:t>&lt;#&gt;</a:t>
             </a:fld>
           </a:p>
@@ -3512,7 +3476,7 @@
         <p:txBody>
           <a:bodyPr/>
           <a:p>
-            <a:fld id="{615023C9-5D37-4418-AAD0-F368F4E9E3B4}" type="slidenum">
+            <a:fld id="{7CD022DD-C551-4693-ABFD-8CF59862E282}" type="slidenum">
               <a:t>&lt;#&gt;</a:t>
             </a:fld>
           </a:p>
@@ -3577,9 +3541,9 @@
         <p:grpSpPr>
           <a:xfrm>
             <a:off x="6199200" y="6162840"/>
-            <a:ext cx="5990760" cy="693000"/>
+            <a:ext cx="5990400" cy="692640"/>
             <a:chOff x="6199200" y="6162840"/>
-            <a:chExt cx="5990760" cy="693000"/>
+            <a:chExt cx="5990400" cy="692640"/>
           </a:xfrm>
         </p:grpSpPr>
         <p:pic>
@@ -3595,7 +3559,7 @@
           <p:spPr>
             <a:xfrm>
               <a:off x="6199200" y="6162840"/>
-              <a:ext cx="4054320" cy="693000"/>
+              <a:ext cx="4053960" cy="692640"/>
             </a:xfrm>
             <a:prstGeom prst="rect">
               <a:avLst/>
@@ -3618,7 +3582,7 @@
           <p:spPr>
             <a:xfrm>
               <a:off x="10270080" y="6162840"/>
-              <a:ext cx="1919880" cy="609480"/>
+              <a:ext cx="1919520" cy="609120"/>
             </a:xfrm>
             <a:prstGeom prst="rect">
               <a:avLst/>
@@ -4366,7 +4330,7 @@
         <p:spPr>
           <a:xfrm>
             <a:off x="4038480" y="6356520"/>
-            <a:ext cx="4112640" cy="362880"/>
+            <a:ext cx="4112280" cy="362520"/>
           </a:xfrm>
           <a:prstGeom prst="rect">
             <a:avLst/>
@@ -4438,7 +4402,7 @@
         <p:spPr>
           <a:xfrm>
             <a:off x="8610480" y="6356520"/>
-            <a:ext cx="2741040" cy="362880"/>
+            <a:ext cx="2740680" cy="362520"/>
           </a:xfrm>
           <a:prstGeom prst="rect">
             <a:avLst/>
@@ -4481,7 +4445,7 @@
                 <a:tab algn="l" pos="0"/>
               </a:tabLst>
             </a:pPr>
-            <a:fld id="{4E6225FC-8DDB-4916-BA79-920B791DD8C0}" type="slidenum">
+            <a:fld id="{3E547995-03C9-4C39-963A-9058221B37C9}" type="slidenum">
               <a:rPr b="0" lang="en-US" sz="1200" spc="-1" strike="noStrike">
                 <a:solidFill>
                   <a:schemeClr val="dk1">
@@ -4514,7 +4478,7 @@
         <p:spPr>
           <a:xfrm>
             <a:off x="838080" y="6356520"/>
-            <a:ext cx="2741040" cy="362880"/>
+            <a:ext cx="2740680" cy="362520"/>
           </a:xfrm>
           <a:prstGeom prst="rect">
             <a:avLst/>
@@ -4607,7 +4571,7 @@
         <p:spPr>
           <a:xfrm flipH="1">
             <a:off x="0" y="3073320"/>
-            <a:ext cx="1830960" cy="2160"/>
+            <a:ext cx="1831320" cy="2520"/>
           </a:xfrm>
           <a:prstGeom prst="straightConnector1">
             <a:avLst/>
@@ -4630,7 +4594,7 @@
         <p:spPr>
           <a:xfrm>
             <a:off x="0" y="2489400"/>
-            <a:ext cx="1830960" cy="2160"/>
+            <a:ext cx="1831320" cy="2520"/>
           </a:xfrm>
           <a:prstGeom prst="straightConnector1">
             <a:avLst/>
@@ -4653,7 +4617,7 @@
         <p:spPr>
           <a:xfrm>
             <a:off x="0" y="2781360"/>
-            <a:ext cx="1830960" cy="2160"/>
+            <a:ext cx="1831320" cy="2520"/>
           </a:xfrm>
           <a:prstGeom prst="straightConnector1">
             <a:avLst/>
@@ -4676,7 +4640,7 @@
         <p:spPr>
           <a:xfrm flipH="1">
             <a:off x="0" y="3657600"/>
-            <a:ext cx="1830960" cy="2160"/>
+            <a:ext cx="1831320" cy="2520"/>
           </a:xfrm>
           <a:prstGeom prst="straightConnector1">
             <a:avLst/>
@@ -4698,7 +4662,7 @@
         <p:spPr>
           <a:xfrm>
             <a:off x="128520" y="6134040"/>
-            <a:ext cx="1569600" cy="385560"/>
+            <a:ext cx="1569240" cy="385200"/>
           </a:xfrm>
           <a:prstGeom prst="diamond">
             <a:avLst/>
@@ -4763,7 +4727,7 @@
         <p:spPr>
           <a:xfrm>
             <a:off x="302760" y="5454000"/>
-            <a:ext cx="1221120" cy="385560"/>
+            <a:ext cx="1220760" cy="385200"/>
           </a:xfrm>
           <a:prstGeom prst="ellipse">
             <a:avLst/>
@@ -4826,7 +4790,7 @@
         <p:spPr>
           <a:xfrm>
             <a:off x="101160" y="336240"/>
-            <a:ext cx="1624320" cy="303120"/>
+            <a:ext cx="1623960" cy="303120"/>
           </a:xfrm>
           <a:prstGeom prst="rect">
             <a:avLst/>
@@ -4883,7 +4847,7 @@
         <p:spPr>
           <a:xfrm>
             <a:off x="101160" y="597600"/>
-            <a:ext cx="1624320" cy="516600"/>
+            <a:ext cx="1623960" cy="516600"/>
           </a:xfrm>
           <a:prstGeom prst="rect">
             <a:avLst/>
@@ -4973,7 +4937,7 @@
         <p:spPr>
           <a:xfrm>
             <a:off x="101160" y="336240"/>
-            <a:ext cx="1624320" cy="303120"/>
+            <a:ext cx="1623960" cy="303120"/>
           </a:xfrm>
           <a:prstGeom prst="rect">
             <a:avLst/>
@@ -5030,7 +4994,7 @@
         <p:spPr>
           <a:xfrm>
             <a:off x="101160" y="597600"/>
-            <a:ext cx="1624320" cy="516600"/>
+            <a:ext cx="1623960" cy="516600"/>
           </a:xfrm>
           <a:prstGeom prst="rect">
             <a:avLst/>
@@ -5120,7 +5084,7 @@
         <p:spPr>
           <a:xfrm>
             <a:off x="2489040" y="0"/>
-            <a:ext cx="1624320" cy="303120"/>
+            <a:ext cx="1623960" cy="303120"/>
           </a:xfrm>
           <a:prstGeom prst="rect">
             <a:avLst/>
@@ -5177,7 +5141,7 @@
         <p:spPr>
           <a:xfrm>
             <a:off x="2489040" y="261360"/>
-            <a:ext cx="1624320" cy="1157040"/>
+            <a:ext cx="1623960" cy="1157040"/>
           </a:xfrm>
           <a:prstGeom prst="rect">
             <a:avLst/>
@@ -5348,7 +5312,7 @@
         <p:spPr>
           <a:xfrm>
             <a:off x="6603840" y="0"/>
-            <a:ext cx="1624320" cy="303120"/>
+            <a:ext cx="1623960" cy="303120"/>
           </a:xfrm>
           <a:prstGeom prst="rect">
             <a:avLst/>
@@ -5405,7 +5369,7 @@
         <p:spPr>
           <a:xfrm>
             <a:off x="6603840" y="261360"/>
-            <a:ext cx="1624320" cy="516600"/>
+            <a:ext cx="1623960" cy="516600"/>
           </a:xfrm>
           <a:prstGeom prst="rect">
             <a:avLst/>
@@ -5495,7 +5459,7 @@
         <p:spPr>
           <a:xfrm>
             <a:off x="6603840" y="0"/>
-            <a:ext cx="1624320" cy="303120"/>
+            <a:ext cx="1623960" cy="303120"/>
           </a:xfrm>
           <a:prstGeom prst="rect">
             <a:avLst/>
@@ -5552,7 +5516,7 @@
         <p:spPr>
           <a:xfrm>
             <a:off x="6603840" y="261360"/>
-            <a:ext cx="1624320" cy="730080"/>
+            <a:ext cx="1623960" cy="730080"/>
           </a:xfrm>
           <a:prstGeom prst="rect">
             <a:avLst/>
@@ -5669,7 +5633,7 @@
         <p:spPr>
           <a:xfrm>
             <a:off x="128520" y="4629600"/>
-            <a:ext cx="1569600" cy="530280"/>
+            <a:ext cx="1569240" cy="529920"/>
           </a:xfrm>
           <a:prstGeom prst="diamond">
             <a:avLst/>
@@ -5757,7 +5721,7 @@
         <p:spPr>
           <a:xfrm>
             <a:off x="0" y="3365640"/>
-            <a:ext cx="1830960" cy="2160"/>
+            <a:ext cx="1831320" cy="2520"/>
           </a:xfrm>
           <a:prstGeom prst="straightConnector1">
             <a:avLst/>
@@ -5779,7 +5743,7 @@
         <p:spPr>
           <a:xfrm>
             <a:off x="673200" y="3949920"/>
-            <a:ext cx="480600" cy="385560"/>
+            <a:ext cx="480240" cy="385200"/>
           </a:xfrm>
           <a:prstGeom prst="triangle">
             <a:avLst>
@@ -5846,9 +5810,9 @@
         <p:grpSpPr>
           <a:xfrm>
             <a:off x="101160" y="1413000"/>
-            <a:ext cx="1624320" cy="777960"/>
+            <a:ext cx="1623960" cy="777960"/>
             <a:chOff x="101160" y="1413000"/>
-            <a:chExt cx="1624320" cy="777960"/>
+            <a:chExt cx="1623960" cy="777960"/>
           </a:xfrm>
         </p:grpSpPr>
         <p:sp>
@@ -5860,7 +5824,7 @@
           <p:spPr>
             <a:xfrm>
               <a:off x="101160" y="1413000"/>
-              <a:ext cx="1624320" cy="303120"/>
+              <a:ext cx="1623960" cy="303120"/>
             </a:xfrm>
             <a:prstGeom prst="rect">
               <a:avLst/>
@@ -5918,7 +5882,7 @@
           <p:spPr>
             <a:xfrm>
               <a:off x="101160" y="1674360"/>
-              <a:ext cx="1624320" cy="516600"/>
+              <a:ext cx="1623960" cy="516600"/>
             </a:xfrm>
             <a:prstGeom prst="rect">
               <a:avLst/>
@@ -6010,7 +5974,7 @@
         <p:spPr>
           <a:xfrm>
             <a:off x="4372560" y="345960"/>
-            <a:ext cx="1569600" cy="385560"/>
+            <a:ext cx="1569240" cy="385200"/>
           </a:xfrm>
           <a:prstGeom prst="diamond">
             <a:avLst/>
@@ -6068,32 +6032,7 @@
       </p:sp>
       <p:cxnSp>
         <p:nvCxnSpPr>
-          <p:cNvPr id="75" name="Straight Arrow Connector 12"/>
-          <p:cNvCxnSpPr>
-            <a:stCxn id="63" idx="3"/>
-            <a:endCxn id="74" idx="1"/>
-          </p:cNvCxnSpPr>
-          <p:nvPr/>
-        </p:nvCxnSpPr>
-        <p:spPr>
-          <a:xfrm flipV="1">
-            <a:off x="4113360" y="538920"/>
-            <a:ext cx="259560" cy="301320"/>
-          </a:xfrm>
-          <a:prstGeom prst="straightConnector1">
-            <a:avLst/>
-          </a:prstGeom>
-          <a:ln cap="sq" w="76200">
-            <a:solidFill>
-              <a:srgbClr val="000000"/>
-            </a:solidFill>
-            <a:round/>
-          </a:ln>
-        </p:spPr>
-      </p:cxnSp>
-      <p:cxnSp>
-        <p:nvCxnSpPr>
-          <p:cNvPr id="76" name="Straight Arrow Connector 11"/>
+          <p:cNvPr id="75" name="Straight Arrow Connector 11"/>
           <p:cNvCxnSpPr>
             <a:stCxn id="67" idx="1"/>
             <a:endCxn id="74" idx="3"/>
@@ -6102,8 +6041,8 @@
         </p:nvCxnSpPr>
         <p:spPr>
           <a:xfrm flipH="1" flipV="1">
-            <a:off x="5942160" y="538920"/>
-            <a:ext cx="662040" cy="87840"/>
+            <a:off x="5941800" y="538560"/>
+            <a:ext cx="662400" cy="88200"/>
           </a:xfrm>
           <a:prstGeom prst="straightConnector1">
             <a:avLst/>
@@ -6119,14 +6058,14 @@
       </p:cxnSp>
       <p:sp>
         <p:nvSpPr>
-          <p:cNvPr id="77" name="Diamond 6"/>
+          <p:cNvPr id="76" name="Diamond 6"/>
           <p:cNvSpPr/>
           <p:nvPr/>
         </p:nvSpPr>
         <p:spPr>
           <a:xfrm>
             <a:off x="5744520" y="1600200"/>
-            <a:ext cx="1798200" cy="385560"/>
+            <a:ext cx="1797840" cy="385200"/>
           </a:xfrm>
           <a:prstGeom prst="diamond">
             <a:avLst/>
@@ -6184,16 +6123,16 @@
       </p:sp>
       <p:cxnSp>
         <p:nvCxnSpPr>
-          <p:cNvPr id="78" name="Straight Arrow Connector 13"/>
+          <p:cNvPr id="77" name="Straight Arrow Connector 13"/>
           <p:cNvCxnSpPr>
-            <a:stCxn id="77" idx="0"/>
+            <a:stCxn id="76" idx="0"/>
             <a:endCxn id="67" idx="2"/>
           </p:cNvCxnSpPr>
           <p:nvPr/>
         </p:nvCxnSpPr>
         <p:spPr>
           <a:xfrm flipV="1">
-            <a:off x="6643800" y="991440"/>
+            <a:off x="6643440" y="991440"/>
             <a:ext cx="772560" cy="609120"/>
           </a:xfrm>
           <a:prstGeom prst="straightConnector1">
@@ -6209,16 +6148,16 @@
       </p:cxnSp>
       <p:cxnSp>
         <p:nvCxnSpPr>
-          <p:cNvPr id="79" name="Straight Arrow Connector 14"/>
+          <p:cNvPr id="78" name="Straight Arrow Connector 14"/>
           <p:cNvCxnSpPr>
-            <a:endCxn id="77" idx="2"/>
+            <a:endCxn id="76" idx="2"/>
           </p:cNvCxnSpPr>
           <p:nvPr/>
         </p:nvCxnSpPr>
         <p:spPr>
           <a:xfrm flipH="1" flipV="1">
-            <a:off x="6643800" y="1985760"/>
-            <a:ext cx="431280" cy="758160"/>
+            <a:off x="6643440" y="1985400"/>
+            <a:ext cx="432000" cy="758880"/>
           </a:xfrm>
           <a:prstGeom prst="straightConnector1">
             <a:avLst/>
@@ -6234,14 +6173,14 @@
       </p:cxnSp>
       <p:sp>
         <p:nvSpPr>
-          <p:cNvPr id="80" name="Diamond 7"/>
+          <p:cNvPr id="79" name="Diamond 7"/>
           <p:cNvSpPr/>
           <p:nvPr/>
         </p:nvSpPr>
         <p:spPr>
           <a:xfrm>
             <a:off x="128520" y="6134400"/>
-            <a:ext cx="1569600" cy="385560"/>
+            <a:ext cx="1569240" cy="385200"/>
           </a:xfrm>
           <a:prstGeom prst="diamond">
             <a:avLst/>
@@ -6299,28 +6238,28 @@
       </p:sp>
       <p:grpSp>
         <p:nvGrpSpPr>
-          <p:cNvPr id="81" name="Group 8"/>
+          <p:cNvPr id="80" name="Group 8"/>
           <p:cNvGrpSpPr/>
           <p:nvPr/>
         </p:nvGrpSpPr>
         <p:grpSpPr>
           <a:xfrm>
             <a:off x="6147720" y="2743200"/>
-            <a:ext cx="1852920" cy="1216440"/>
+            <a:ext cx="1852560" cy="1216440"/>
             <a:chOff x="6147720" y="2743200"/>
-            <a:chExt cx="1852920" cy="1216440"/>
+            <a:chExt cx="1852560" cy="1216440"/>
           </a:xfrm>
         </p:grpSpPr>
         <p:sp>
           <p:nvSpPr>
-            <p:cNvPr id="82" name="TextBox 33"/>
+            <p:cNvPr id="81" name="TextBox 33"/>
             <p:cNvSpPr/>
             <p:nvPr/>
           </p:nvSpPr>
           <p:spPr>
             <a:xfrm>
               <a:off x="6147720" y="2743200"/>
-              <a:ext cx="1852920" cy="303120"/>
+              <a:ext cx="1852560" cy="303120"/>
             </a:xfrm>
             <a:prstGeom prst="rect">
               <a:avLst/>
@@ -6370,14 +6309,14 @@
         </p:sp>
         <p:sp>
           <p:nvSpPr>
-            <p:cNvPr id="83" name="TextBox 34"/>
+            <p:cNvPr id="82" name="TextBox 34"/>
             <p:cNvSpPr/>
             <p:nvPr/>
           </p:nvSpPr>
           <p:spPr>
             <a:xfrm>
               <a:off x="6147720" y="3016080"/>
-              <a:ext cx="1852920" cy="943560"/>
+              <a:ext cx="1852560" cy="943560"/>
             </a:xfrm>
             <a:prstGeom prst="rect">
               <a:avLst/>
@@ -6517,14 +6456,14 @@
       </p:grpSp>
       <p:sp>
         <p:nvSpPr>
-          <p:cNvPr id="84" name="Isosceles Triangle 3"/>
+          <p:cNvPr id="83" name="Isosceles Triangle 3"/>
           <p:cNvSpPr/>
           <p:nvPr/>
         </p:nvSpPr>
         <p:spPr>
           <a:xfrm>
             <a:off x="7315200" y="4414680"/>
-            <a:ext cx="480600" cy="385560"/>
+            <a:ext cx="480240" cy="385200"/>
           </a:xfrm>
           <a:prstGeom prst="triangle">
             <a:avLst>
@@ -6584,14 +6523,14 @@
       </p:sp>
       <p:sp>
         <p:nvSpPr>
-          <p:cNvPr id="85" name="TextBox 25"/>
+          <p:cNvPr id="84" name="TextBox 25"/>
           <p:cNvSpPr/>
           <p:nvPr/>
         </p:nvSpPr>
         <p:spPr>
           <a:xfrm>
             <a:off x="8686800" y="3200400"/>
-            <a:ext cx="1624320" cy="303120"/>
+            <a:ext cx="1623960" cy="303120"/>
           </a:xfrm>
           <a:prstGeom prst="rect">
             <a:avLst/>
@@ -6641,14 +6580,14 @@
       </p:sp>
       <p:sp>
         <p:nvSpPr>
-          <p:cNvPr id="86" name="TextBox 28"/>
+          <p:cNvPr id="85" name="TextBox 28"/>
           <p:cNvSpPr/>
           <p:nvPr/>
         </p:nvSpPr>
         <p:spPr>
           <a:xfrm>
             <a:off x="8686800" y="3505680"/>
-            <a:ext cx="1624320" cy="1371240"/>
+            <a:ext cx="1623960" cy="1370520"/>
           </a:xfrm>
           <a:prstGeom prst="rect">
             <a:avLst/>
@@ -6797,17 +6736,17 @@
       </p:sp>
       <p:cxnSp>
         <p:nvCxnSpPr>
-          <p:cNvPr id="87" name="Straight Arrow Connector 15"/>
+          <p:cNvPr id="86" name="Straight Arrow Connector 15"/>
           <p:cNvCxnSpPr>
-            <a:stCxn id="84" idx="4"/>
-            <a:endCxn id="86" idx="1"/>
+            <a:stCxn id="83" idx="4"/>
+            <a:endCxn id="85" idx="1"/>
           </p:cNvCxnSpPr>
           <p:nvPr/>
         </p:nvCxnSpPr>
         <p:spPr>
           <a:xfrm flipV="1">
-            <a:off x="7795800" y="4191120"/>
-            <a:ext cx="891360" cy="609480"/>
+            <a:off x="7795440" y="4190760"/>
+            <a:ext cx="891720" cy="609480"/>
           </a:xfrm>
           <a:prstGeom prst="straightConnector1">
             <a:avLst/>
@@ -6822,17 +6761,17 @@
       </p:cxnSp>
       <p:cxnSp>
         <p:nvCxnSpPr>
-          <p:cNvPr id="88" name="Straight Arrow Connector 16"/>
+          <p:cNvPr id="87" name="Straight Arrow Connector 16"/>
           <p:cNvCxnSpPr>
-            <a:stCxn id="84" idx="0"/>
-            <a:endCxn id="81" idx="2"/>
+            <a:stCxn id="83" idx="0"/>
+            <a:endCxn id="80" idx="2"/>
           </p:cNvCxnSpPr>
           <p:nvPr/>
         </p:nvCxnSpPr>
         <p:spPr>
           <a:xfrm flipH="1" flipV="1">
             <a:off x="7074000" y="3959640"/>
-            <a:ext cx="482040" cy="455400"/>
+            <a:ext cx="481680" cy="455400"/>
           </a:xfrm>
           <a:prstGeom prst="straightConnector1">
             <a:avLst/>
@@ -6847,14 +6786,14 @@
       </p:cxnSp>
       <p:sp>
         <p:nvSpPr>
-          <p:cNvPr id="89" name="TextBox 35"/>
+          <p:cNvPr id="88" name="TextBox 35"/>
           <p:cNvSpPr/>
           <p:nvPr/>
         </p:nvSpPr>
         <p:spPr>
           <a:xfrm>
             <a:off x="2032200" y="2436840"/>
-            <a:ext cx="1624320" cy="303120"/>
+            <a:ext cx="1623960" cy="303120"/>
           </a:xfrm>
           <a:prstGeom prst="rect">
             <a:avLst/>
@@ -6904,14 +6843,14 @@
       </p:sp>
       <p:sp>
         <p:nvSpPr>
-          <p:cNvPr id="90" name="TextBox 36"/>
+          <p:cNvPr id="89" name="TextBox 36"/>
           <p:cNvSpPr/>
           <p:nvPr/>
         </p:nvSpPr>
         <p:spPr>
           <a:xfrm>
             <a:off x="2032200" y="2698200"/>
-            <a:ext cx="1624320" cy="516600"/>
+            <a:ext cx="1623960" cy="516600"/>
           </a:xfrm>
           <a:prstGeom prst="rect">
             <a:avLst/>
@@ -6994,14 +6933,14 @@
       </p:sp>
       <p:sp>
         <p:nvSpPr>
-          <p:cNvPr id="91" name="TextBox 37"/>
+          <p:cNvPr id="90" name="TextBox 37"/>
           <p:cNvSpPr/>
           <p:nvPr/>
         </p:nvSpPr>
         <p:spPr>
           <a:xfrm>
             <a:off x="2032200" y="2436840"/>
-            <a:ext cx="1624320" cy="303120"/>
+            <a:ext cx="1623960" cy="303120"/>
           </a:xfrm>
           <a:prstGeom prst="rect">
             <a:avLst/>
@@ -7051,14 +6990,14 @@
       </p:sp>
       <p:sp>
         <p:nvSpPr>
-          <p:cNvPr id="92" name="TextBox 38"/>
+          <p:cNvPr id="91" name="TextBox 38"/>
           <p:cNvSpPr/>
           <p:nvPr/>
         </p:nvSpPr>
         <p:spPr>
           <a:xfrm>
             <a:off x="2032200" y="2698200"/>
-            <a:ext cx="1624320" cy="517320"/>
+            <a:ext cx="1623960" cy="516600"/>
           </a:xfrm>
           <a:prstGeom prst="rect">
             <a:avLst/>
@@ -7141,14 +7080,14 @@
       </p:sp>
       <p:sp>
         <p:nvSpPr>
-          <p:cNvPr id="93" name="Diamond 8"/>
+          <p:cNvPr id="92" name="Diamond 8"/>
           <p:cNvSpPr/>
           <p:nvPr/>
         </p:nvSpPr>
         <p:spPr>
           <a:xfrm>
             <a:off x="1829160" y="1828800"/>
-            <a:ext cx="1827360" cy="385560"/>
+            <a:ext cx="1827000" cy="385200"/>
           </a:xfrm>
           <a:prstGeom prst="diamond">
             <a:avLst/>
@@ -7206,14 +7145,14 @@
       </p:sp>
       <p:sp>
         <p:nvSpPr>
-          <p:cNvPr id="94" name="Oval 3"/>
+          <p:cNvPr id="93" name="Oval 3"/>
           <p:cNvSpPr/>
           <p:nvPr/>
         </p:nvSpPr>
         <p:spPr>
           <a:xfrm>
             <a:off x="3886200" y="1442160"/>
-            <a:ext cx="1598760" cy="385560"/>
+            <a:ext cx="1598400" cy="385200"/>
           </a:xfrm>
           <a:prstGeom prst="ellipse">
             <a:avLst/>
@@ -7269,17 +7208,17 @@
       </p:sp>
       <p:cxnSp>
         <p:nvCxnSpPr>
-          <p:cNvPr id="95" name="Straight Arrow Connector 36"/>
+          <p:cNvPr id="94" name="Straight Arrow Connector 36"/>
           <p:cNvCxnSpPr>
-            <a:stCxn id="93" idx="3"/>
-            <a:endCxn id="94" idx="2"/>
+            <a:stCxn id="92" idx="3"/>
+            <a:endCxn id="93" idx="2"/>
           </p:cNvCxnSpPr>
           <p:nvPr/>
         </p:nvCxnSpPr>
         <p:spPr>
           <a:xfrm flipV="1">
-            <a:off x="3656520" y="1635120"/>
-            <a:ext cx="230040" cy="387000"/>
+            <a:off x="3656160" y="1634760"/>
+            <a:ext cx="230400" cy="387000"/>
           </a:xfrm>
           <a:prstGeom prst="straightConnector1">
             <a:avLst/>
@@ -7294,17 +7233,17 @@
       </p:cxnSp>
       <p:cxnSp>
         <p:nvCxnSpPr>
-          <p:cNvPr id="96" name="Straight Arrow Connector 37"/>
+          <p:cNvPr id="95" name="Straight Arrow Connector 37"/>
           <p:cNvCxnSpPr>
-            <a:stCxn id="91" idx="-1"/>
-            <a:endCxn id="93" idx="2"/>
+            <a:stCxn id="90" idx="-1"/>
+            <a:endCxn id="92" idx="2"/>
           </p:cNvCxnSpPr>
           <p:nvPr/>
         </p:nvCxnSpPr>
         <p:spPr>
           <a:xfrm flipH="1" flipV="1">
-            <a:off x="2742840" y="2214360"/>
-            <a:ext cx="101880" cy="222840"/>
+            <a:off x="2742840" y="2214000"/>
+            <a:ext cx="101520" cy="223200"/>
           </a:xfrm>
           <a:prstGeom prst="straightConnector1">
             <a:avLst/>
@@ -7319,9 +7258,9 @@
       </p:cxnSp>
       <p:cxnSp>
         <p:nvCxnSpPr>
-          <p:cNvPr id="97" name="Straight Arrow Connector 38"/>
+          <p:cNvPr id="96" name="Straight Arrow Connector 38"/>
           <p:cNvCxnSpPr>
-            <a:stCxn id="93" idx="0"/>
+            <a:stCxn id="92" idx="0"/>
             <a:endCxn id="63" idx="2"/>
           </p:cNvCxnSpPr>
           <p:nvPr/>
@@ -7329,7 +7268,7 @@
         <p:spPr>
           <a:xfrm flipV="1">
             <a:off x="2742840" y="1418400"/>
-            <a:ext cx="558720" cy="410760"/>
+            <a:ext cx="558360" cy="410760"/>
           </a:xfrm>
           <a:prstGeom prst="straightConnector1">
             <a:avLst/>
@@ -7344,14 +7283,14 @@
       </p:cxnSp>
       <p:sp>
         <p:nvSpPr>
-          <p:cNvPr id="98" name="TextBox 43"/>
+          <p:cNvPr id="97" name="TextBox 43"/>
           <p:cNvSpPr/>
           <p:nvPr/>
         </p:nvSpPr>
         <p:spPr>
           <a:xfrm>
             <a:off x="10491120" y="1275120"/>
-            <a:ext cx="1624320" cy="303120"/>
+            <a:ext cx="1623960" cy="303120"/>
           </a:xfrm>
           <a:prstGeom prst="rect">
             <a:avLst/>
@@ -7401,14 +7340,14 @@
       </p:sp>
       <p:sp>
         <p:nvSpPr>
-          <p:cNvPr id="99" name="TextBox 44"/>
+          <p:cNvPr id="98" name="TextBox 44"/>
           <p:cNvSpPr/>
           <p:nvPr/>
         </p:nvSpPr>
         <p:spPr>
           <a:xfrm>
             <a:off x="10491120" y="1536480"/>
-            <a:ext cx="1624320" cy="516600"/>
+            <a:ext cx="1623960" cy="516600"/>
           </a:xfrm>
           <a:prstGeom prst="rect">
             <a:avLst/>
@@ -7491,14 +7430,14 @@
       </p:sp>
       <p:sp>
         <p:nvSpPr>
-          <p:cNvPr id="100" name="TextBox 45"/>
+          <p:cNvPr id="99" name="TextBox 45"/>
           <p:cNvSpPr/>
           <p:nvPr/>
         </p:nvSpPr>
         <p:spPr>
           <a:xfrm>
             <a:off x="10491120" y="1275120"/>
-            <a:ext cx="1624320" cy="303120"/>
+            <a:ext cx="1623960" cy="303120"/>
           </a:xfrm>
           <a:prstGeom prst="rect">
             <a:avLst/>
@@ -7535,7 +7474,7 @@
                 </a:solidFill>
                 <a:latin typeface="Calibri"/>
               </a:rPr>
-              <a:t>Troop</a:t>
+              <a:t>Soldier</a:t>
             </a:r>
             <a:endParaRPr b="0" lang="en-US" sz="1400" spc="-1" strike="noStrike">
               <a:solidFill>
@@ -7548,14 +7487,14 @@
       </p:sp>
       <p:sp>
         <p:nvSpPr>
-          <p:cNvPr id="101" name="TextBox 46"/>
+          <p:cNvPr id="100" name="TextBox 46"/>
           <p:cNvSpPr/>
           <p:nvPr/>
         </p:nvSpPr>
         <p:spPr>
           <a:xfrm>
             <a:off x="10491120" y="1536480"/>
-            <a:ext cx="1624320" cy="1584000"/>
+            <a:ext cx="1623960" cy="1584000"/>
           </a:xfrm>
           <a:prstGeom prst="rect">
             <a:avLst/>
@@ -7746,14 +7685,14 @@
       </p:sp>
       <p:sp>
         <p:nvSpPr>
-          <p:cNvPr id="102" name="Diamond 20"/>
+          <p:cNvPr id="101" name="Diamond 20"/>
           <p:cNvSpPr/>
           <p:nvPr/>
         </p:nvSpPr>
         <p:spPr>
           <a:xfrm>
             <a:off x="8078040" y="1516320"/>
-            <a:ext cx="2056320" cy="385560"/>
+            <a:ext cx="2055960" cy="385200"/>
           </a:xfrm>
           <a:prstGeom prst="diamond">
             <a:avLst/>
@@ -7811,17 +7750,17 @@
       </p:sp>
       <p:cxnSp>
         <p:nvCxnSpPr>
-          <p:cNvPr id="103" name="Straight Arrow Connector 35"/>
+          <p:cNvPr id="102" name="Straight Arrow Connector 35"/>
           <p:cNvCxnSpPr>
-            <a:stCxn id="102" idx="2"/>
-            <a:endCxn id="85" idx="0"/>
+            <a:stCxn id="101" idx="2"/>
+            <a:endCxn id="84" idx="0"/>
           </p:cNvCxnSpPr>
           <p:nvPr/>
         </p:nvCxnSpPr>
         <p:spPr>
           <a:xfrm>
-            <a:off x="9106200" y="1901880"/>
-            <a:ext cx="393120" cy="1298880"/>
+            <a:off x="9106200" y="1901520"/>
+            <a:ext cx="392760" cy="1299240"/>
           </a:xfrm>
           <a:prstGeom prst="straightConnector1">
             <a:avLst/>
@@ -7836,17 +7775,17 @@
       </p:cxnSp>
       <p:cxnSp>
         <p:nvCxnSpPr>
-          <p:cNvPr id="104" name="Straight Arrow Connector 43"/>
+          <p:cNvPr id="103" name="Straight Arrow Connector 43"/>
           <p:cNvCxnSpPr>
-            <a:stCxn id="101" idx="1"/>
-            <a:endCxn id="102" idx="2"/>
+            <a:stCxn id="100" idx="1"/>
+            <a:endCxn id="101" idx="2"/>
           </p:cNvCxnSpPr>
           <p:nvPr/>
         </p:nvCxnSpPr>
         <p:spPr>
           <a:xfrm flipH="1" flipV="1">
-            <a:off x="9106200" y="1901880"/>
-            <a:ext cx="1385280" cy="426960"/>
+            <a:off x="9106200" y="1901520"/>
+            <a:ext cx="1385280" cy="427320"/>
           </a:xfrm>
           <a:prstGeom prst="straightConnector1">
             <a:avLst/>
@@ -7861,17 +7800,17 @@
       </p:cxnSp>
       <p:cxnSp>
         <p:nvCxnSpPr>
-          <p:cNvPr id="105" name="Straight Arrow Connector 49"/>
+          <p:cNvPr id="104" name="Straight Arrow Connector 49"/>
           <p:cNvCxnSpPr>
-            <a:stCxn id="102" idx="0"/>
+            <a:stCxn id="101" idx="0"/>
             <a:endCxn id="67" idx="2"/>
           </p:cNvCxnSpPr>
           <p:nvPr/>
         </p:nvCxnSpPr>
         <p:spPr>
           <a:xfrm flipH="1" flipV="1">
-            <a:off x="7416000" y="991440"/>
-            <a:ext cx="1690560" cy="525240"/>
+            <a:off x="7415640" y="991440"/>
+            <a:ext cx="1690920" cy="525240"/>
           </a:xfrm>
           <a:prstGeom prst="straightConnector1">
             <a:avLst/>
@@ -7886,14 +7825,14 @@
       </p:cxnSp>
       <p:sp>
         <p:nvSpPr>
-          <p:cNvPr id="106" name="Oval 6"/>
+          <p:cNvPr id="105" name="Oval 6"/>
           <p:cNvSpPr/>
           <p:nvPr/>
         </p:nvSpPr>
         <p:spPr>
           <a:xfrm>
             <a:off x="7084440" y="2131560"/>
-            <a:ext cx="1221120" cy="385560"/>
+            <a:ext cx="1220760" cy="385200"/>
           </a:xfrm>
           <a:prstGeom prst="ellipse">
             <a:avLst/>
@@ -7949,17 +7888,17 @@
       </p:sp>
       <p:cxnSp>
         <p:nvCxnSpPr>
-          <p:cNvPr id="107" name="Straight Arrow Connector 50"/>
+          <p:cNvPr id="106" name="Straight Arrow Connector 50"/>
           <p:cNvCxnSpPr>
-            <a:stCxn id="102" idx="1"/>
-            <a:endCxn id="106" idx="0"/>
+            <a:stCxn id="101" idx="1"/>
+            <a:endCxn id="105" idx="0"/>
           </p:cNvCxnSpPr>
           <p:nvPr/>
         </p:nvCxnSpPr>
         <p:spPr>
           <a:xfrm flipH="1">
-            <a:off x="7695000" y="1709280"/>
-            <a:ext cx="383400" cy="422640"/>
+            <a:off x="7695000" y="1708920"/>
+            <a:ext cx="383400" cy="423000"/>
           </a:xfrm>
           <a:prstGeom prst="straightConnector1">
             <a:avLst/>
@@ -7974,14 +7913,14 @@
       </p:cxnSp>
       <p:sp>
         <p:nvSpPr>
-          <p:cNvPr id="108" name="TextBox 74"/>
+          <p:cNvPr id="107" name="TextBox 74"/>
           <p:cNvSpPr/>
           <p:nvPr/>
         </p:nvSpPr>
         <p:spPr>
           <a:xfrm>
             <a:off x="4547880" y="5640480"/>
-            <a:ext cx="1624320" cy="303120"/>
+            <a:ext cx="1623960" cy="303120"/>
           </a:xfrm>
           <a:prstGeom prst="rect">
             <a:avLst/>
@@ -8031,14 +7970,14 @@
       </p:sp>
       <p:sp>
         <p:nvSpPr>
-          <p:cNvPr id="109" name="Diamond 22"/>
+          <p:cNvPr id="108" name="Diamond 22"/>
           <p:cNvSpPr/>
           <p:nvPr/>
         </p:nvSpPr>
         <p:spPr>
           <a:xfrm>
             <a:off x="2971800" y="3500280"/>
-            <a:ext cx="1827720" cy="385560"/>
+            <a:ext cx="1827360" cy="385200"/>
           </a:xfrm>
           <a:prstGeom prst="diamond">
             <a:avLst/>
@@ -8096,17 +8035,17 @@
       </p:sp>
       <p:cxnSp>
         <p:nvCxnSpPr>
-          <p:cNvPr id="110" name="Straight Arrow Connector 59"/>
+          <p:cNvPr id="109" name="Straight Arrow Connector 59"/>
           <p:cNvCxnSpPr>
-            <a:stCxn id="108" idx="1"/>
-            <a:endCxn id="109" idx="2"/>
+            <a:stCxn id="107" idx="1"/>
+            <a:endCxn id="108" idx="2"/>
           </p:cNvCxnSpPr>
           <p:nvPr/>
         </p:nvCxnSpPr>
         <p:spPr>
           <a:xfrm flipH="1" flipV="1">
-            <a:off x="3885840" y="3885840"/>
-            <a:ext cx="662400" cy="1906560"/>
+            <a:off x="3885480" y="3885480"/>
+            <a:ext cx="662760" cy="1906920"/>
           </a:xfrm>
           <a:prstGeom prst="straightConnector1">
             <a:avLst/>
@@ -8122,17 +8061,17 @@
       </p:cxnSp>
       <p:cxnSp>
         <p:nvCxnSpPr>
-          <p:cNvPr id="111" name="Straight Arrow Connector 60"/>
+          <p:cNvPr id="110" name="Straight Arrow Connector 60"/>
           <p:cNvCxnSpPr>
-            <a:stCxn id="92" idx="2"/>
-            <a:endCxn id="109" idx="0"/>
+            <a:stCxn id="91" idx="2"/>
+            <a:endCxn id="108" idx="0"/>
           </p:cNvCxnSpPr>
           <p:nvPr/>
         </p:nvCxnSpPr>
         <p:spPr>
           <a:xfrm>
-            <a:off x="2844360" y="3215520"/>
-            <a:ext cx="1041840" cy="285120"/>
+            <a:off x="2844000" y="3214800"/>
+            <a:ext cx="1041840" cy="285840"/>
           </a:xfrm>
           <a:prstGeom prst="straightConnector1">
             <a:avLst/>
@@ -8147,16 +8086,16 @@
       </p:cxnSp>
       <p:cxnSp>
         <p:nvCxnSpPr>
-          <p:cNvPr id="112" name="Straight Arrow Connector 61"/>
+          <p:cNvPr id="111" name="Straight Arrow Connector 61"/>
           <p:cNvCxnSpPr>
-            <a:stCxn id="113" idx="3"/>
+            <a:stCxn id="112" idx="3"/>
             <a:endCxn id="63" idx="2"/>
           </p:cNvCxnSpPr>
           <p:nvPr/>
         </p:nvCxnSpPr>
         <p:spPr>
           <a:xfrm flipH="1" flipV="1">
-            <a:off x="3301200" y="1418400"/>
+            <a:off x="3300840" y="1418400"/>
             <a:ext cx="3556800" cy="3496320"/>
           </a:xfrm>
           <a:prstGeom prst="straightConnector1">
@@ -8172,14 +8111,14 @@
       </p:cxnSp>
       <p:sp>
         <p:nvSpPr>
-          <p:cNvPr id="113" name="Diamond 24"/>
+          <p:cNvPr id="112" name="Diamond 24"/>
           <p:cNvSpPr/>
           <p:nvPr/>
         </p:nvSpPr>
         <p:spPr>
           <a:xfrm>
             <a:off x="4801320" y="4572000"/>
-            <a:ext cx="2056320" cy="684720"/>
+            <a:ext cx="2055960" cy="684360"/>
           </a:xfrm>
           <a:prstGeom prst="diamond">
             <a:avLst/>
@@ -8237,17 +8176,17 @@
       </p:sp>
       <p:cxnSp>
         <p:nvCxnSpPr>
-          <p:cNvPr id="114" name="Straight Arrow Connector 62"/>
+          <p:cNvPr id="113" name="Straight Arrow Connector 62"/>
           <p:cNvCxnSpPr>
-            <a:stCxn id="108" idx="0"/>
-            <a:endCxn id="113" idx="2"/>
+            <a:stCxn id="107" idx="0"/>
+            <a:endCxn id="112" idx="2"/>
           </p:cNvCxnSpPr>
           <p:nvPr/>
         </p:nvCxnSpPr>
         <p:spPr>
           <a:xfrm flipV="1">
-            <a:off x="5360040" y="5256720"/>
-            <a:ext cx="469800" cy="384120"/>
+            <a:off x="5359680" y="5256360"/>
+            <a:ext cx="470160" cy="384480"/>
           </a:xfrm>
           <a:prstGeom prst="straightConnector1">
             <a:avLst/>
@@ -8262,14 +8201,14 @@
       </p:cxnSp>
       <p:sp>
         <p:nvSpPr>
-          <p:cNvPr id="115" name="Isosceles Triangle 4"/>
+          <p:cNvPr id="114" name="Isosceles Triangle 4"/>
           <p:cNvSpPr/>
           <p:nvPr/>
         </p:nvSpPr>
         <p:spPr>
           <a:xfrm>
             <a:off x="2490840" y="4343400"/>
-            <a:ext cx="480600" cy="385560"/>
+            <a:ext cx="480240" cy="385200"/>
           </a:xfrm>
           <a:prstGeom prst="triangle">
             <a:avLst>
@@ -8329,17 +8268,17 @@
       </p:sp>
       <p:cxnSp>
         <p:nvCxnSpPr>
-          <p:cNvPr id="116" name="Straight Arrow Connector 74"/>
+          <p:cNvPr id="115" name="Straight Arrow Connector 74"/>
           <p:cNvCxnSpPr>
-            <a:stCxn id="115" idx="0"/>
-            <a:endCxn id="92" idx="2"/>
+            <a:stCxn id="114" idx="0"/>
+            <a:endCxn id="91" idx="2"/>
           </p:cNvCxnSpPr>
           <p:nvPr/>
         </p:nvCxnSpPr>
         <p:spPr>
           <a:xfrm flipV="1">
-            <a:off x="2731320" y="3215520"/>
-            <a:ext cx="113400" cy="1128240"/>
+            <a:off x="2730960" y="3214800"/>
+            <a:ext cx="113400" cy="1128960"/>
           </a:xfrm>
           <a:prstGeom prst="straightConnector1">
             <a:avLst/>
@@ -8354,14 +8293,14 @@
       </p:cxnSp>
       <p:sp>
         <p:nvSpPr>
-          <p:cNvPr id="117" name="TextBox 39"/>
+          <p:cNvPr id="116" name="TextBox 39"/>
           <p:cNvSpPr/>
           <p:nvPr/>
         </p:nvSpPr>
         <p:spPr>
           <a:xfrm>
             <a:off x="2057400" y="5257800"/>
-            <a:ext cx="1624320" cy="303120"/>
+            <a:ext cx="1623960" cy="303120"/>
           </a:xfrm>
           <a:prstGeom prst="rect">
             <a:avLst/>
@@ -8411,14 +8350,14 @@
       </p:sp>
       <p:sp>
         <p:nvSpPr>
-          <p:cNvPr id="118" name="TextBox 41"/>
+          <p:cNvPr id="117" name="TextBox 41"/>
           <p:cNvSpPr/>
           <p:nvPr/>
         </p:nvSpPr>
         <p:spPr>
           <a:xfrm>
             <a:off x="2057400" y="5257800"/>
-            <a:ext cx="1624320" cy="303120"/>
+            <a:ext cx="1623960" cy="303120"/>
           </a:xfrm>
           <a:prstGeom prst="rect">
             <a:avLst/>
@@ -8468,14 +8407,14 @@
       </p:sp>
       <p:sp>
         <p:nvSpPr>
-          <p:cNvPr id="119" name="TextBox 42"/>
+          <p:cNvPr id="118" name="TextBox 42"/>
           <p:cNvSpPr/>
           <p:nvPr/>
         </p:nvSpPr>
         <p:spPr>
           <a:xfrm>
             <a:off x="2057400" y="5519160"/>
-            <a:ext cx="1624320" cy="363960"/>
+            <a:ext cx="1623960" cy="363960"/>
           </a:xfrm>
           <a:prstGeom prst="rect">
             <a:avLst/>
@@ -8500,6 +8439,11 @@
             <a:spAutoFit/>
           </a:bodyPr>
           <a:p>
+            <a:pPr>
+              <a:lnSpc>
+                <a:spcPct val="100000"/>
+              </a:lnSpc>
+            </a:pPr>
             <a:r>
               <a:rPr b="0" lang="en-US" sz="1800" spc="-1" strike="noStrike">
                 <a:solidFill>
@@ -8520,17 +8464,17 @@
       </p:sp>
       <p:cxnSp>
         <p:nvCxnSpPr>
-          <p:cNvPr id="120" name="Straight Arrow Connector 75"/>
+          <p:cNvPr id="119" name="Straight Arrow Connector 75"/>
           <p:cNvCxnSpPr>
-            <a:stCxn id="115" idx="3"/>
-            <a:endCxn id="118" idx="0"/>
+            <a:stCxn id="114" idx="3"/>
+            <a:endCxn id="117" idx="0"/>
           </p:cNvCxnSpPr>
           <p:nvPr/>
         </p:nvCxnSpPr>
         <p:spPr>
           <a:xfrm>
-            <a:off x="2731320" y="4728960"/>
-            <a:ext cx="138600" cy="529200"/>
+            <a:off x="2730960" y="4728600"/>
+            <a:ext cx="138600" cy="529560"/>
           </a:xfrm>
           <a:prstGeom prst="straightConnector1">
             <a:avLst/>
@@ -8545,14 +8489,14 @@
       </p:cxnSp>
       <p:sp>
         <p:nvSpPr>
-          <p:cNvPr id="121" name="Diamond 30"/>
+          <p:cNvPr id="120" name="Diamond 30"/>
           <p:cNvSpPr/>
           <p:nvPr/>
         </p:nvSpPr>
         <p:spPr>
           <a:xfrm>
             <a:off x="6431400" y="5329440"/>
-            <a:ext cx="1569600" cy="385560"/>
+            <a:ext cx="1569240" cy="385200"/>
           </a:xfrm>
           <a:prstGeom prst="diamond">
             <a:avLst/>
@@ -8610,14 +8554,14 @@
       </p:sp>
       <p:sp>
         <p:nvSpPr>
-          <p:cNvPr id="122" name="Diamond 31"/>
+          <p:cNvPr id="121" name="Diamond 31"/>
           <p:cNvSpPr/>
           <p:nvPr/>
         </p:nvSpPr>
         <p:spPr>
           <a:xfrm>
             <a:off x="6431400" y="5786640"/>
-            <a:ext cx="1798200" cy="385560"/>
+            <a:ext cx="1797840" cy="385200"/>
           </a:xfrm>
           <a:prstGeom prst="diamond">
             <a:avLst/>
@@ -8675,17 +8619,17 @@
       </p:sp>
       <p:cxnSp>
         <p:nvCxnSpPr>
-          <p:cNvPr id="123" name="Straight Arrow Connector 76"/>
+          <p:cNvPr id="122" name="Straight Arrow Connector 76"/>
           <p:cNvCxnSpPr>
-            <a:stCxn id="86" idx="1"/>
-            <a:endCxn id="121" idx="3"/>
+            <a:stCxn id="85" idx="1"/>
+            <a:endCxn id="120" idx="3"/>
           </p:cNvCxnSpPr>
           <p:nvPr/>
         </p:nvCxnSpPr>
         <p:spPr>
           <a:xfrm flipH="1">
-            <a:off x="8001000" y="4191120"/>
-            <a:ext cx="686160" cy="1331640"/>
+            <a:off x="8000640" y="4190760"/>
+            <a:ext cx="686520" cy="1331640"/>
           </a:xfrm>
           <a:prstGeom prst="straightConnector1">
             <a:avLst/>
@@ -8701,17 +8645,17 @@
       </p:cxnSp>
       <p:cxnSp>
         <p:nvCxnSpPr>
-          <p:cNvPr id="124" name="Straight Arrow Connector 77"/>
+          <p:cNvPr id="123" name="Straight Arrow Connector 77"/>
           <p:cNvCxnSpPr>
-            <a:stCxn id="121" idx="1"/>
-            <a:endCxn id="108" idx="3"/>
+            <a:stCxn id="120" idx="1"/>
+            <a:endCxn id="107" idx="3"/>
           </p:cNvCxnSpPr>
           <p:nvPr/>
         </p:nvCxnSpPr>
         <p:spPr>
           <a:xfrm flipH="1">
-            <a:off x="6172200" y="5522400"/>
-            <a:ext cx="259560" cy="270000"/>
+            <a:off x="6171840" y="5522040"/>
+            <a:ext cx="259920" cy="270360"/>
           </a:xfrm>
           <a:prstGeom prst="straightConnector1">
             <a:avLst/>
@@ -8726,17 +8670,17 @@
       </p:cxnSp>
       <p:cxnSp>
         <p:nvCxnSpPr>
-          <p:cNvPr id="125" name="Straight Arrow Connector 78"/>
+          <p:cNvPr id="124" name="Straight Arrow Connector 78"/>
           <p:cNvCxnSpPr>
-            <a:stCxn id="122" idx="1"/>
-            <a:endCxn id="108" idx="3"/>
+            <a:stCxn id="121" idx="1"/>
+            <a:endCxn id="107" idx="3"/>
           </p:cNvCxnSpPr>
           <p:nvPr/>
         </p:nvCxnSpPr>
         <p:spPr>
           <a:xfrm flipH="1" flipV="1">
-            <a:off x="6172200" y="5792040"/>
-            <a:ext cx="259560" cy="187920"/>
+            <a:off x="6171840" y="5792040"/>
+            <a:ext cx="259920" cy="187560"/>
           </a:xfrm>
           <a:prstGeom prst="straightConnector1">
             <a:avLst/>
@@ -8751,17 +8695,17 @@
       </p:cxnSp>
       <p:cxnSp>
         <p:nvCxnSpPr>
-          <p:cNvPr id="126" name="Straight Arrow Connector 79"/>
+          <p:cNvPr id="125" name="Straight Arrow Connector 79"/>
           <p:cNvCxnSpPr>
-            <a:stCxn id="86" idx="1"/>
-            <a:endCxn id="122" idx="3"/>
+            <a:stCxn id="85" idx="1"/>
+            <a:endCxn id="121" idx="3"/>
           </p:cNvCxnSpPr>
           <p:nvPr/>
         </p:nvCxnSpPr>
         <p:spPr>
           <a:xfrm flipH="1">
-            <a:off x="8229600" y="4191120"/>
-            <a:ext cx="457560" cy="1788840"/>
+            <a:off x="8229240" y="4190760"/>
+            <a:ext cx="457920" cy="1788840"/>
           </a:xfrm>
           <a:prstGeom prst="straightConnector1">
             <a:avLst/>
@@ -8772,6 +8716,31 @@
             </a:solidFill>
             <a:round/>
             <a:tailEnd len="sm" type="triangle" w="sm"/>
+          </a:ln>
+        </p:spPr>
+      </p:cxnSp>
+      <p:cxnSp>
+        <p:nvCxnSpPr>
+          <p:cNvPr id="126" name="Straight Arrow Connector 12"/>
+          <p:cNvCxnSpPr>
+            <a:stCxn id="74" idx="1"/>
+            <a:endCxn id="63" idx="3"/>
+          </p:cNvCxnSpPr>
+          <p:nvPr/>
+        </p:nvCxnSpPr>
+        <p:spPr>
+          <a:xfrm flipH="1">
+            <a:off x="4113000" y="538560"/>
+            <a:ext cx="259920" cy="301680"/>
+          </a:xfrm>
+          <a:prstGeom prst="straightConnector1">
+            <a:avLst/>
+          </a:prstGeom>
+          <a:ln w="25400">
+            <a:solidFill>
+              <a:srgbClr val="000000"/>
+            </a:solidFill>
+            <a:round/>
           </a:ln>
         </p:spPr>
       </p:cxnSp>
@@ -8814,7 +8783,7 @@
         <p:spPr>
           <a:xfrm flipH="1">
             <a:off x="0" y="3073320"/>
-            <a:ext cx="1830960" cy="2160"/>
+            <a:ext cx="1831320" cy="2520"/>
           </a:xfrm>
           <a:prstGeom prst="straightConnector1">
             <a:avLst/>
@@ -8837,7 +8806,7 @@
         <p:spPr>
           <a:xfrm>
             <a:off x="0" y="2489400"/>
-            <a:ext cx="1830960" cy="2160"/>
+            <a:ext cx="1831320" cy="2520"/>
           </a:xfrm>
           <a:prstGeom prst="straightConnector1">
             <a:avLst/>
@@ -8860,7 +8829,7 @@
         <p:spPr>
           <a:xfrm>
             <a:off x="0" y="2781360"/>
-            <a:ext cx="1830960" cy="2160"/>
+            <a:ext cx="1831320" cy="2520"/>
           </a:xfrm>
           <a:prstGeom prst="straightConnector1">
             <a:avLst/>
@@ -8883,7 +8852,7 @@
         <p:spPr>
           <a:xfrm flipH="1">
             <a:off x="0" y="3657600"/>
-            <a:ext cx="1830960" cy="2160"/>
+            <a:ext cx="1831320" cy="2520"/>
           </a:xfrm>
           <a:prstGeom prst="straightConnector1">
             <a:avLst/>
@@ -8905,7 +8874,7 @@
         <p:spPr>
           <a:xfrm>
             <a:off x="128520" y="6134040"/>
-            <a:ext cx="1569600" cy="385560"/>
+            <a:ext cx="1569240" cy="385200"/>
           </a:xfrm>
           <a:prstGeom prst="diamond">
             <a:avLst/>
@@ -8970,7 +8939,7 @@
         <p:spPr>
           <a:xfrm>
             <a:off x="302760" y="5454000"/>
-            <a:ext cx="1221120" cy="385560"/>
+            <a:ext cx="1220760" cy="385200"/>
           </a:xfrm>
           <a:prstGeom prst="ellipse">
             <a:avLst/>
@@ -9033,9 +9002,9 @@
         <p:grpSpPr>
           <a:xfrm>
             <a:off x="101160" y="336240"/>
-            <a:ext cx="1624320" cy="777960"/>
+            <a:ext cx="1623960" cy="777960"/>
             <a:chOff x="101160" y="336240"/>
-            <a:chExt cx="1624320" cy="777960"/>
+            <a:chExt cx="1623960" cy="777960"/>
           </a:xfrm>
         </p:grpSpPr>
         <p:sp>
@@ -9047,7 +9016,7 @@
           <p:spPr>
             <a:xfrm>
               <a:off x="101160" y="336240"/>
-              <a:ext cx="1624320" cy="303120"/>
+              <a:ext cx="1623960" cy="303120"/>
             </a:xfrm>
             <a:prstGeom prst="rect">
               <a:avLst/>
@@ -9104,7 +9073,7 @@
           <p:spPr>
             <a:xfrm>
               <a:off x="101160" y="597600"/>
-              <a:ext cx="1624320" cy="516600"/>
+              <a:ext cx="1623960" cy="516600"/>
             </a:xfrm>
             <a:prstGeom prst="rect">
               <a:avLst/>
@@ -9195,7 +9164,7 @@
         <p:spPr>
           <a:xfrm>
             <a:off x="128520" y="4629600"/>
-            <a:ext cx="1569600" cy="530280"/>
+            <a:ext cx="1569240" cy="529920"/>
           </a:xfrm>
           <a:prstGeom prst="diamond">
             <a:avLst/>
@@ -9283,7 +9252,7 @@
         <p:spPr>
           <a:xfrm>
             <a:off x="0" y="3365640"/>
-            <a:ext cx="1830960" cy="2160"/>
+            <a:ext cx="1831320" cy="2520"/>
           </a:xfrm>
           <a:prstGeom prst="straightConnector1">
             <a:avLst/>
@@ -9305,7 +9274,7 @@
         <p:spPr>
           <a:xfrm>
             <a:off x="673200" y="3949920"/>
-            <a:ext cx="480600" cy="385560"/>
+            <a:ext cx="480240" cy="385200"/>
           </a:xfrm>
           <a:prstGeom prst="triangle">
             <a:avLst>
@@ -9372,9 +9341,9 @@
         <p:grpSpPr>
           <a:xfrm>
             <a:off x="101160" y="1413000"/>
-            <a:ext cx="1624320" cy="777960"/>
+            <a:ext cx="1623960" cy="777960"/>
             <a:chOff x="101160" y="1413000"/>
-            <a:chExt cx="1624320" cy="777960"/>
+            <a:chExt cx="1623960" cy="777960"/>
           </a:xfrm>
         </p:grpSpPr>
         <p:sp>
@@ -9386,7 +9355,7 @@
           <p:spPr>
             <a:xfrm>
               <a:off x="101160" y="1413000"/>
-              <a:ext cx="1624320" cy="303120"/>
+              <a:ext cx="1623960" cy="303120"/>
             </a:xfrm>
             <a:prstGeom prst="rect">
               <a:avLst/>
@@ -9444,7 +9413,7 @@
           <p:spPr>
             <a:xfrm>
               <a:off x="101160" y="1674360"/>
-              <a:ext cx="1624320" cy="516600"/>
+              <a:ext cx="1623960" cy="516600"/>
             </a:xfrm>
             <a:prstGeom prst="rect">
               <a:avLst/>
@@ -9536,7 +9505,7 @@
         <p:spPr>
           <a:xfrm>
             <a:off x="4775040" y="457200"/>
-            <a:ext cx="1624320" cy="303120"/>
+            <a:ext cx="1623960" cy="303120"/>
           </a:xfrm>
           <a:prstGeom prst="rect">
             <a:avLst/>
@@ -9593,7 +9562,7 @@
         <p:spPr>
           <a:xfrm>
             <a:off x="4775040" y="718560"/>
-            <a:ext cx="1624320" cy="730080"/>
+            <a:ext cx="1623960" cy="730080"/>
           </a:xfrm>
           <a:prstGeom prst="rect">
             <a:avLst/>
@@ -9710,9 +9679,9 @@
         <p:grpSpPr>
           <a:xfrm>
             <a:off x="4343400" y="4114800"/>
-            <a:ext cx="1624320" cy="991440"/>
+            <a:ext cx="1623960" cy="991440"/>
             <a:chOff x="4343400" y="4114800"/>
-            <a:chExt cx="1624320" cy="991440"/>
+            <a:chExt cx="1623960" cy="991440"/>
           </a:xfrm>
         </p:grpSpPr>
         <p:sp>
@@ -9724,7 +9693,7 @@
           <p:spPr>
             <a:xfrm>
               <a:off x="4343400" y="4114800"/>
-              <a:ext cx="1624320" cy="303120"/>
+              <a:ext cx="1623960" cy="303120"/>
             </a:xfrm>
             <a:prstGeom prst="rect">
               <a:avLst/>
@@ -9781,7 +9750,7 @@
           <p:spPr>
             <a:xfrm>
               <a:off x="4343400" y="4376160"/>
-              <a:ext cx="1624320" cy="730080"/>
+              <a:ext cx="1623960" cy="730080"/>
             </a:xfrm>
             <a:prstGeom prst="rect">
               <a:avLst/>
@@ -9899,7 +9868,7 @@
         <p:spPr>
           <a:xfrm>
             <a:off x="2743200" y="2356560"/>
-            <a:ext cx="1569600" cy="385560"/>
+            <a:ext cx="1569240" cy="385200"/>
           </a:xfrm>
           <a:prstGeom prst="diamond">
             <a:avLst/>
@@ -9964,7 +9933,7 @@
         <p:spPr>
           <a:xfrm>
             <a:off x="4572000" y="2355120"/>
-            <a:ext cx="1798200" cy="387000"/>
+            <a:ext cx="1797840" cy="386640"/>
           </a:xfrm>
           <a:prstGeom prst="diamond">
             <a:avLst/>
@@ -10031,8 +10000,8 @@
         </p:nvCxnSpPr>
         <p:spPr>
           <a:xfrm flipH="1" flipV="1">
-            <a:off x="3528000" y="2742120"/>
-            <a:ext cx="1627920" cy="1373040"/>
+            <a:off x="3528000" y="2741760"/>
+            <a:ext cx="1627560" cy="1373400"/>
           </a:xfrm>
           <a:prstGeom prst="straightConnector1">
             <a:avLst/>
@@ -10057,7 +10026,7 @@
         </p:nvCxnSpPr>
         <p:spPr>
           <a:xfrm flipV="1">
-            <a:off x="5471280" y="1448640"/>
+            <a:off x="5470920" y="1448640"/>
             <a:ext cx="116280" cy="906840"/>
           </a:xfrm>
           <a:prstGeom prst="straightConnector1">
@@ -10082,8 +10051,8 @@
         </p:nvCxnSpPr>
         <p:spPr>
           <a:xfrm flipV="1">
-            <a:off x="5155560" y="2742120"/>
-            <a:ext cx="316080" cy="1373040"/>
+            <a:off x="5155200" y="2741760"/>
+            <a:ext cx="316080" cy="1373400"/>
           </a:xfrm>
           <a:prstGeom prst="straightConnector1">
             <a:avLst/>
@@ -10108,7 +10077,7 @@
         <p:spPr>
           <a:xfrm flipH="1">
             <a:off x="3528000" y="1448640"/>
-            <a:ext cx="2059560" cy="908280"/>
+            <a:ext cx="2059200" cy="908280"/>
           </a:xfrm>
           <a:prstGeom prst="straightConnector1">
             <a:avLst/>
@@ -10130,7 +10099,7 @@
         <p:spPr>
           <a:xfrm>
             <a:off x="2743200" y="300240"/>
-            <a:ext cx="1569600" cy="385560"/>
+            <a:ext cx="1569240" cy="385200"/>
           </a:xfrm>
           <a:prstGeom prst="diamond">
             <a:avLst/>
@@ -10197,8 +10166,8 @@
         </p:nvCxnSpPr>
         <p:spPr>
           <a:xfrm flipH="1" flipV="1">
-            <a:off x="4312800" y="493200"/>
-            <a:ext cx="462600" cy="590760"/>
+            <a:off x="4312440" y="492840"/>
+            <a:ext cx="462960" cy="591120"/>
           </a:xfrm>
           <a:prstGeom prst="straightConnector1">
             <a:avLst/>
@@ -10222,8 +10191,8 @@
         </p:nvCxnSpPr>
         <p:spPr>
           <a:xfrm flipH="1" flipV="1">
-            <a:off x="3528000" y="685800"/>
-            <a:ext cx="2059560" cy="763200"/>
+            <a:off x="3528000" y="685440"/>
+            <a:ext cx="2059200" cy="763560"/>
           </a:xfrm>
           <a:prstGeom prst="straightConnector1">
             <a:avLst/>
@@ -10245,9 +10214,9 @@
         <p:grpSpPr>
           <a:xfrm>
             <a:off x="8686800" y="837360"/>
-            <a:ext cx="1624320" cy="991440"/>
+            <a:ext cx="1623960" cy="991440"/>
             <a:chOff x="8686800" y="837360"/>
-            <a:chExt cx="1624320" cy="991440"/>
+            <a:chExt cx="1623960" cy="991440"/>
           </a:xfrm>
         </p:grpSpPr>
         <p:sp>
@@ -10259,7 +10228,7 @@
           <p:spPr>
             <a:xfrm>
               <a:off x="8686800" y="837360"/>
-              <a:ext cx="1624320" cy="303120"/>
+              <a:ext cx="1623960" cy="303120"/>
             </a:xfrm>
             <a:prstGeom prst="rect">
               <a:avLst/>
@@ -10316,7 +10285,7 @@
           <p:spPr>
             <a:xfrm>
               <a:off x="8686800" y="1098720"/>
-              <a:ext cx="1624320" cy="730080"/>
+              <a:ext cx="1623960" cy="730080"/>
             </a:xfrm>
             <a:prstGeom prst="rect">
               <a:avLst/>
@@ -10434,7 +10403,7 @@
         <p:spPr>
           <a:xfrm>
             <a:off x="128880" y="6134040"/>
-            <a:ext cx="1569600" cy="385560"/>
+            <a:ext cx="1569240" cy="385200"/>
           </a:xfrm>
           <a:prstGeom prst="diamond">
             <a:avLst/>
@@ -10499,7 +10468,7 @@
         <p:spPr>
           <a:xfrm>
             <a:off x="7315200" y="228600"/>
-            <a:ext cx="1569600" cy="385560"/>
+            <a:ext cx="1569240" cy="385200"/>
           </a:xfrm>
           <a:prstGeom prst="diamond">
             <a:avLst/>
@@ -10564,7 +10533,7 @@
         <p:spPr>
           <a:xfrm>
             <a:off x="360" y="3366000"/>
-            <a:ext cx="1830960" cy="2160"/>
+            <a:ext cx="1831320" cy="2520"/>
           </a:xfrm>
           <a:prstGeom prst="straightConnector1">
             <a:avLst/>
@@ -10588,8 +10557,8 @@
         </p:nvCxnSpPr>
         <p:spPr>
           <a:xfrm flipH="1">
-            <a:off x="6399360" y="421560"/>
-            <a:ext cx="916200" cy="662400"/>
+            <a:off x="6399000" y="421200"/>
+            <a:ext cx="916560" cy="662760"/>
           </a:xfrm>
           <a:prstGeom prst="straightConnector1">
             <a:avLst/>
@@ -10611,7 +10580,7 @@
         <p:spPr>
           <a:xfrm>
             <a:off x="6629400" y="1442160"/>
-            <a:ext cx="1828800" cy="615240"/>
+            <a:ext cx="1828440" cy="614880"/>
           </a:xfrm>
           <a:prstGeom prst="diamond">
             <a:avLst/>
@@ -10678,8 +10647,8 @@
         </p:nvCxnSpPr>
         <p:spPr>
           <a:xfrm flipH="1" flipV="1">
-            <a:off x="8884800" y="421560"/>
-            <a:ext cx="614520" cy="416160"/>
+            <a:off x="8884440" y="421200"/>
+            <a:ext cx="614520" cy="416520"/>
           </a:xfrm>
           <a:prstGeom prst="straightConnector1">
             <a:avLst/>
@@ -10702,7 +10671,7 @@
         <p:spPr>
           <a:xfrm>
             <a:off x="6429960" y="2356560"/>
-            <a:ext cx="1569600" cy="385560"/>
+            <a:ext cx="1569240" cy="385200"/>
           </a:xfrm>
           <a:prstGeom prst="diamond">
             <a:avLst/>
@@ -10769,8 +10738,8 @@
         </p:nvCxnSpPr>
         <p:spPr>
           <a:xfrm flipH="1">
-            <a:off x="7999560" y="1828800"/>
-            <a:ext cx="1499760" cy="721080"/>
+            <a:off x="7999200" y="1828800"/>
+            <a:ext cx="1499760" cy="720720"/>
           </a:xfrm>
           <a:prstGeom prst="straightConnector1">
             <a:avLst/>
@@ -10794,8 +10763,8 @@
         </p:nvCxnSpPr>
         <p:spPr>
           <a:xfrm flipH="1">
-            <a:off x="5967720" y="2549520"/>
-            <a:ext cx="462600" cy="2061360"/>
+            <a:off x="5967360" y="2549160"/>
+            <a:ext cx="462960" cy="2061720"/>
           </a:xfrm>
           <a:prstGeom prst="straightConnector1">
             <a:avLst/>
@@ -10819,8 +10788,8 @@
         </p:nvCxnSpPr>
         <p:spPr>
           <a:xfrm flipH="1">
-            <a:off x="8458200" y="1333080"/>
-            <a:ext cx="228960" cy="417240"/>
+            <a:off x="8457840" y="1333080"/>
+            <a:ext cx="229320" cy="416880"/>
           </a:xfrm>
           <a:prstGeom prst="straightConnector1">
             <a:avLst/>
@@ -10844,8 +10813,8 @@
         </p:nvCxnSpPr>
         <p:spPr>
           <a:xfrm flipH="1" flipV="1">
-            <a:off x="5587200" y="1448640"/>
-            <a:ext cx="1042560" cy="301680"/>
+            <a:off x="5586840" y="1448640"/>
+            <a:ext cx="1042920" cy="301320"/>
           </a:xfrm>
           <a:prstGeom prst="straightConnector1">
             <a:avLst/>
@@ -10867,9 +10836,9 @@
         <p:grpSpPr>
           <a:xfrm>
             <a:off x="8433000" y="4392720"/>
-            <a:ext cx="1624320" cy="565200"/>
+            <a:ext cx="1623960" cy="564480"/>
             <a:chOff x="8433000" y="4392720"/>
-            <a:chExt cx="1624320" cy="565200"/>
+            <a:chExt cx="1623960" cy="564480"/>
           </a:xfrm>
         </p:grpSpPr>
         <p:sp>
@@ -10881,7 +10850,7 @@
           <p:spPr>
             <a:xfrm>
               <a:off x="8433000" y="4392720"/>
-              <a:ext cx="1624320" cy="303120"/>
+              <a:ext cx="1623960" cy="303120"/>
             </a:xfrm>
             <a:prstGeom prst="rect">
               <a:avLst/>
@@ -10938,7 +10907,7 @@
           <p:spPr>
             <a:xfrm>
               <a:off x="8433000" y="4654080"/>
-              <a:ext cx="1624320" cy="303840"/>
+              <a:ext cx="1623960" cy="303120"/>
             </a:xfrm>
             <a:prstGeom prst="rect">
               <a:avLst/>
@@ -11001,9 +10970,9 @@
         <p:grpSpPr>
           <a:xfrm>
             <a:off x="101160" y="336240"/>
-            <a:ext cx="1624320" cy="777960"/>
+            <a:ext cx="1623960" cy="777960"/>
             <a:chOff x="101160" y="336240"/>
-            <a:chExt cx="1624320" cy="777960"/>
+            <a:chExt cx="1623960" cy="777960"/>
           </a:xfrm>
         </p:grpSpPr>
         <p:sp>
@@ -11015,7 +10984,7 @@
           <p:spPr>
             <a:xfrm>
               <a:off x="101160" y="336240"/>
-              <a:ext cx="1624320" cy="303120"/>
+              <a:ext cx="1623960" cy="303120"/>
             </a:xfrm>
             <a:prstGeom prst="rect">
               <a:avLst/>
@@ -11072,7 +11041,7 @@
           <p:spPr>
             <a:xfrm>
               <a:off x="101160" y="597600"/>
-              <a:ext cx="1624320" cy="516600"/>
+              <a:ext cx="1623960" cy="516600"/>
             </a:xfrm>
             <a:prstGeom prst="rect">
               <a:avLst/>
@@ -11163,9 +11132,9 @@
         <p:grpSpPr>
           <a:xfrm>
             <a:off x="6400800" y="4205880"/>
-            <a:ext cx="1624320" cy="564480"/>
+            <a:ext cx="1623960" cy="564120"/>
             <a:chOff x="6400800" y="4205880"/>
-            <a:chExt cx="1624320" cy="564480"/>
+            <a:chExt cx="1623960" cy="564120"/>
           </a:xfrm>
         </p:grpSpPr>
         <p:sp>
@@ -11177,7 +11146,7 @@
           <p:spPr>
             <a:xfrm>
               <a:off x="6400800" y="4205880"/>
-              <a:ext cx="1624320" cy="303120"/>
+              <a:ext cx="1623960" cy="303120"/>
             </a:xfrm>
             <a:prstGeom prst="rect">
               <a:avLst/>
@@ -11234,7 +11203,7 @@
           <p:spPr>
             <a:xfrm>
               <a:off x="6400800" y="4467240"/>
-              <a:ext cx="1624320" cy="303120"/>
+              <a:ext cx="1623960" cy="302760"/>
             </a:xfrm>
             <a:prstGeom prst="rect">
               <a:avLst/>
@@ -11259,15 +11228,10 @@
               <a:spAutoFit/>
             </a:bodyPr>
             <a:p>
-              <a:pPr marL="304920" indent="-304920" defTabSz="914400">
+              <a:pPr defTabSz="914400">
                 <a:lnSpc>
                   <a:spcPct val="100000"/>
                 </a:lnSpc>
-                <a:buClr>
-                  <a:srgbClr val="000000"/>
-                </a:buClr>
-                <a:buFont typeface="OpenSymbol"/>
-                <a:buChar char="-"/>
               </a:pPr>
               <a:endParaRPr b="0" lang="en-US" sz="1800" spc="-1" strike="noStrike">
                 <a:solidFill>
@@ -11288,7 +11252,7 @@
         <p:spPr>
           <a:xfrm>
             <a:off x="9601200" y="2127960"/>
-            <a:ext cx="480600" cy="385560"/>
+            <a:ext cx="480240" cy="385200"/>
           </a:xfrm>
           <a:prstGeom prst="triangle">
             <a:avLst>
@@ -11357,8 +11321,8 @@
         </p:nvCxnSpPr>
         <p:spPr>
           <a:xfrm flipH="1">
-            <a:off x="7212960" y="4114800"/>
-            <a:ext cx="765000" cy="91440"/>
+            <a:off x="7212600" y="4114440"/>
+            <a:ext cx="765360" cy="91800"/>
           </a:xfrm>
           <a:prstGeom prst="straightConnector1">
             <a:avLst/>
@@ -11382,8 +11346,8 @@
         </p:nvCxnSpPr>
         <p:spPr>
           <a:xfrm flipH="1" flipV="1">
-            <a:off x="8458200" y="4114800"/>
-            <a:ext cx="787320" cy="278280"/>
+            <a:off x="8457840" y="4114440"/>
+            <a:ext cx="787320" cy="278640"/>
           </a:xfrm>
           <a:prstGeom prst="straightConnector1">
             <a:avLst/>
@@ -11401,14 +11365,13 @@
           <p:cNvPr id="183" name="Straight Arrow Connector 54"/>
           <p:cNvCxnSpPr>
             <a:stCxn id="179" idx="3"/>
-            <a:endCxn id="184" idx="0"/>
           </p:cNvCxnSpPr>
           <p:nvPr/>
         </p:nvCxnSpPr>
         <p:spPr>
           <a:xfrm flipH="1">
-            <a:off x="8103240" y="2513520"/>
-            <a:ext cx="1738800" cy="366480"/>
+            <a:off x="8103240" y="2513160"/>
+            <a:ext cx="1738440" cy="367200"/>
           </a:xfrm>
           <a:prstGeom prst="straightConnector1">
             <a:avLst/>
@@ -11423,7 +11386,7 @@
       </p:cxnSp>
       <p:cxnSp>
         <p:nvCxnSpPr>
-          <p:cNvPr id="185" name="Straight Arrow Connector 55"/>
+          <p:cNvPr id="184" name="Straight Arrow Connector 55"/>
           <p:cNvCxnSpPr>
             <a:stCxn id="156" idx="2"/>
             <a:endCxn id="179" idx="0"/>
@@ -11432,7 +11395,7 @@
         </p:nvCxnSpPr>
         <p:spPr>
           <a:xfrm>
-            <a:off x="9498960" y="1828800"/>
+            <a:off x="9498600" y="1828800"/>
             <a:ext cx="343080" cy="299520"/>
           </a:xfrm>
           <a:prstGeom prst="straightConnector1">
@@ -11448,14 +11411,14 @@
       </p:cxnSp>
       <p:sp>
         <p:nvSpPr>
-          <p:cNvPr id="186" name="TextBox 73"/>
+          <p:cNvPr id="185" name="TextBox 73"/>
           <p:cNvSpPr/>
           <p:nvPr/>
         </p:nvSpPr>
         <p:spPr>
           <a:xfrm>
-            <a:off x="6604200" y="5640480"/>
-            <a:ext cx="1624320" cy="303120"/>
+            <a:off x="6629400" y="5715000"/>
+            <a:ext cx="1623960" cy="303120"/>
           </a:xfrm>
           <a:prstGeom prst="rect">
             <a:avLst/>
@@ -11505,14 +11468,14 @@
       </p:sp>
       <p:sp>
         <p:nvSpPr>
-          <p:cNvPr id="187" name="Diamond 21"/>
+          <p:cNvPr id="186" name="Diamond 21"/>
           <p:cNvSpPr/>
           <p:nvPr/>
         </p:nvSpPr>
         <p:spPr>
           <a:xfrm>
-            <a:off x="6400800" y="5100840"/>
-            <a:ext cx="1827720" cy="385560"/>
+            <a:off x="6400800" y="5029200"/>
+            <a:ext cx="1827360" cy="385200"/>
           </a:xfrm>
           <a:prstGeom prst="diamond">
             <a:avLst/>
@@ -11570,70 +11533,19 @@
       </p:sp>
       <p:cxnSp>
         <p:nvCxnSpPr>
-          <p:cNvPr id="188" name="Straight Arrow Connector 56"/>
+          <p:cNvPr id="187" name="Straight Arrow Connector 56"/>
           <p:cNvCxnSpPr/>
           <p:nvPr/>
         </p:nvCxnSpPr>
         <p:spPr>
           <a:xfrm flipH="1">
             <a:off x="0" y="3657600"/>
-            <a:ext cx="1830960" cy="2160"/>
+            <a:ext cx="1831320" cy="2520"/>
           </a:xfrm>
           <a:prstGeom prst="straightConnector1">
             <a:avLst/>
           </a:prstGeom>
           <a:ln w="25400">
-            <a:solidFill>
-              <a:srgbClr val="000000"/>
-            </a:solidFill>
-            <a:round/>
-          </a:ln>
-        </p:spPr>
-      </p:cxnSp>
-      <p:cxnSp>
-        <p:nvCxnSpPr>
-          <p:cNvPr id="189" name="Straight Arrow Connector 57"/>
-          <p:cNvCxnSpPr>
-            <a:stCxn id="186" idx="0"/>
-            <a:endCxn id="187" idx="2"/>
-          </p:cNvCxnSpPr>
-          <p:nvPr/>
-        </p:nvCxnSpPr>
-        <p:spPr>
-          <a:xfrm flipH="1" flipV="1">
-            <a:off x="7314840" y="5486400"/>
-            <a:ext cx="101880" cy="154440"/>
-          </a:xfrm>
-          <a:prstGeom prst="straightConnector1">
-            <a:avLst/>
-          </a:prstGeom>
-          <a:ln cap="sq" w="76200">
-            <a:solidFill>
-              <a:srgbClr val="000000"/>
-            </a:solidFill>
-            <a:round/>
-            <a:tailEnd len="sm" type="triangle" w="sm"/>
-          </a:ln>
-        </p:spPr>
-      </p:cxnSp>
-      <p:cxnSp>
-        <p:nvCxnSpPr>
-          <p:cNvPr id="190" name="Straight Arrow Connector 58"/>
-          <p:cNvCxnSpPr>
-            <a:stCxn id="176" idx="2"/>
-            <a:endCxn id="187" idx="0"/>
-          </p:cNvCxnSpPr>
-          <p:nvPr/>
-        </p:nvCxnSpPr>
-        <p:spPr>
-          <a:xfrm>
-            <a:off x="7212960" y="4770360"/>
-            <a:ext cx="102240" cy="330840"/>
-          </a:xfrm>
-          <a:prstGeom prst="straightConnector1">
-            <a:avLst/>
-          </a:prstGeom>
-          <a:ln cap="sq" w="76200">
             <a:solidFill>
               <a:srgbClr val="000000"/>
             </a:solidFill>
@@ -11643,28 +11555,28 @@
       </p:cxnSp>
       <p:grpSp>
         <p:nvGrpSpPr>
-          <p:cNvPr id="191" name="Group 12"/>
+          <p:cNvPr id="188" name="Group 12"/>
           <p:cNvGrpSpPr/>
           <p:nvPr/>
         </p:nvGrpSpPr>
         <p:grpSpPr>
           <a:xfrm>
             <a:off x="7291080" y="2879640"/>
-            <a:ext cx="1624320" cy="565200"/>
+            <a:ext cx="1623960" cy="564840"/>
             <a:chOff x="7291080" y="2879640"/>
-            <a:chExt cx="1624320" cy="565200"/>
+            <a:chExt cx="1623960" cy="564840"/>
           </a:xfrm>
         </p:grpSpPr>
         <p:sp>
           <p:nvSpPr>
-            <p:cNvPr id="192" name="TextBox 23"/>
+            <p:cNvPr id="189" name="TextBox 23"/>
             <p:cNvSpPr/>
             <p:nvPr/>
           </p:nvSpPr>
           <p:spPr>
             <a:xfrm>
               <a:off x="7291080" y="2879640"/>
-              <a:ext cx="1624320" cy="303120"/>
+              <a:ext cx="1623960" cy="303120"/>
             </a:xfrm>
             <a:prstGeom prst="rect">
               <a:avLst/>
@@ -11714,14 +11626,14 @@
         </p:sp>
         <p:sp>
           <p:nvSpPr>
-            <p:cNvPr id="193" name="TextBox 24"/>
+            <p:cNvPr id="190" name="TextBox 24"/>
             <p:cNvSpPr/>
             <p:nvPr/>
           </p:nvSpPr>
           <p:spPr>
             <a:xfrm>
               <a:off x="7291080" y="3141000"/>
-              <a:ext cx="1624320" cy="303840"/>
+              <a:ext cx="1623960" cy="303480"/>
             </a:xfrm>
             <a:prstGeom prst="rect">
               <a:avLst/>
@@ -11746,15 +11658,10 @@
               <a:spAutoFit/>
             </a:bodyPr>
             <a:p>
-              <a:pPr marL="304920" indent="-304920" defTabSz="914400">
+              <a:pPr defTabSz="914400">
                 <a:lnSpc>
                   <a:spcPct val="100000"/>
                 </a:lnSpc>
-                <a:buClr>
-                  <a:srgbClr val="000000"/>
-                </a:buClr>
-                <a:buFont typeface="OpenSymbol"/>
-                <a:buChar char="-"/>
               </a:pPr>
               <a:endParaRPr b="0" lang="en-US" sz="1800" spc="-1" strike="noStrike">
                 <a:solidFill>
@@ -11768,28 +11675,28 @@
       </p:grpSp>
       <p:grpSp>
         <p:nvGrpSpPr>
-          <p:cNvPr id="194" name="Group 16"/>
+          <p:cNvPr id="191" name="Group 16"/>
           <p:cNvGrpSpPr/>
           <p:nvPr/>
         </p:nvGrpSpPr>
         <p:grpSpPr>
           <a:xfrm>
             <a:off x="7291080" y="2879640"/>
-            <a:ext cx="1624320" cy="565200"/>
+            <a:ext cx="1623960" cy="564480"/>
             <a:chOff x="7291080" y="2879640"/>
-            <a:chExt cx="1624320" cy="565200"/>
+            <a:chExt cx="1623960" cy="564480"/>
           </a:xfrm>
         </p:grpSpPr>
         <p:sp>
           <p:nvSpPr>
-            <p:cNvPr id="195" name="TextBox 40"/>
+            <p:cNvPr id="192" name="TextBox 40"/>
             <p:cNvSpPr/>
             <p:nvPr/>
           </p:nvSpPr>
           <p:spPr>
             <a:xfrm>
               <a:off x="7291080" y="2879640"/>
-              <a:ext cx="1624320" cy="303120"/>
+              <a:ext cx="1623960" cy="303120"/>
             </a:xfrm>
             <a:prstGeom prst="rect">
               <a:avLst/>
@@ -11839,14 +11746,14 @@
         </p:sp>
         <p:sp>
           <p:nvSpPr>
-            <p:cNvPr id="196" name="TextBox 59"/>
+            <p:cNvPr id="193" name="TextBox 59"/>
             <p:cNvSpPr/>
             <p:nvPr/>
           </p:nvSpPr>
           <p:spPr>
             <a:xfrm>
               <a:off x="7291080" y="3141000"/>
-              <a:ext cx="1624320" cy="303840"/>
+              <a:ext cx="1623960" cy="303120"/>
             </a:xfrm>
             <a:prstGeom prst="rect">
               <a:avLst/>
@@ -11888,7 +11795,7 @@
                   </a:solidFill>
                   <a:latin typeface="Calibri"/>
                 </a:rPr>
-                <a:t>Status</a:t>
+                <a:t>Accept</a:t>
               </a:r>
               <a:endParaRPr b="0" lang="en-US" sz="1400" spc="-1" strike="noStrike">
                 <a:solidFill>
@@ -11909,7 +11816,7 @@
         <p:spPr>
           <a:xfrm>
             <a:off x="7977600" y="3729240"/>
-            <a:ext cx="480600" cy="385560"/>
+            <a:ext cx="480240" cy="385200"/>
           </a:xfrm>
           <a:prstGeom prst="triangle">
             <a:avLst>
@@ -11969,17 +11876,17 @@
       </p:sp>
       <p:cxnSp>
         <p:nvCxnSpPr>
-          <p:cNvPr id="197" name="Straight Arrow Connector 80"/>
+          <p:cNvPr id="194" name="Straight Arrow Connector 80"/>
           <p:cNvCxnSpPr>
-            <a:stCxn id="194" idx="2"/>
+            <a:stCxn id="191" idx="2"/>
             <a:endCxn id="181" idx="0"/>
           </p:cNvCxnSpPr>
           <p:nvPr/>
         </p:nvCxnSpPr>
         <p:spPr>
           <a:xfrm>
-            <a:off x="8103240" y="3444840"/>
-            <a:ext cx="115200" cy="284760"/>
+            <a:off x="8102880" y="3444120"/>
+            <a:ext cx="115200" cy="285480"/>
           </a:xfrm>
           <a:prstGeom prst="straightConnector1">
             <a:avLst/>
@@ -11994,14 +11901,14 @@
       </p:cxnSp>
       <p:cxnSp>
         <p:nvCxnSpPr>
-          <p:cNvPr id="198" name="Straight Arrow Connector 52"/>
+          <p:cNvPr id="195" name="Straight Arrow Connector 52"/>
           <p:cNvCxnSpPr/>
           <p:nvPr/>
         </p:nvCxnSpPr>
         <p:spPr>
           <a:xfrm>
             <a:off x="7313400" y="3657600"/>
-            <a:ext cx="1830960" cy="2160"/>
+            <a:ext cx="1831320" cy="2520"/>
           </a:xfrm>
           <a:prstGeom prst="straightConnector1">
             <a:avLst/>
@@ -12017,14 +11924,14 @@
       </p:cxnSp>
       <p:sp>
         <p:nvSpPr>
-          <p:cNvPr id="199" name=""/>
-          <p:cNvSpPr txBox="1"/>
+          <p:cNvPr id="196" name=""/>
+          <p:cNvSpPr/>
           <p:nvPr/>
         </p:nvSpPr>
         <p:spPr>
           <a:xfrm>
             <a:off x="8458200" y="3382920"/>
-            <a:ext cx="914400" cy="346320"/>
+            <a:ext cx="914040" cy="345960"/>
           </a:xfrm>
           <a:prstGeom prst="rect">
             <a:avLst/>
@@ -12032,52 +11939,6 @@
           <a:noFill/>
           <a:ln w="0">
             <a:noFill/>
-          </a:ln>
-        </p:spPr>
-        <p:txBody>
-          <a:bodyPr lIns="90000" rIns="90000" tIns="45000" bIns="45000" anchor="t">
-            <a:noAutofit/>
-          </a:bodyPr>
-          <a:p>
-            <a:r>
-              <a:rPr b="0" lang="en-US" sz="1800" spc="-1" strike="noStrike">
-                <a:solidFill>
-                  <a:srgbClr val="000000"/>
-                </a:solidFill>
-                <a:latin typeface="Arial"/>
-              </a:rPr>
-              <a:t>Total</a:t>
-            </a:r>
-            <a:endParaRPr b="0" lang="en-US" sz="1800" spc="-1" strike="noStrike">
-              <a:solidFill>
-                <a:srgbClr val="000000"/>
-              </a:solidFill>
-              <a:latin typeface="Arial"/>
-            </a:endParaRPr>
-          </a:p>
-        </p:txBody>
-      </p:sp>
-      <p:sp>
-        <p:nvSpPr>
-          <p:cNvPr id="200" name="TextBox 49"/>
-          <p:cNvSpPr/>
-          <p:nvPr/>
-        </p:nvSpPr>
-        <p:spPr>
-          <a:xfrm>
-            <a:off x="1804680" y="1600200"/>
-            <a:ext cx="1624320" cy="303120"/>
-          </a:xfrm>
-          <a:prstGeom prst="rect">
-            <a:avLst/>
-          </a:prstGeom>
-          <a:solidFill>
-            <a:schemeClr val="bg1"/>
-          </a:solidFill>
-          <a:ln w="0">
-            <a:solidFill>
-              <a:srgbClr val="000000"/>
-            </a:solidFill>
           </a:ln>
         </p:spPr>
         <p:style>
@@ -12088,42 +11949,42 @@
         </p:style>
         <p:txBody>
           <a:bodyPr lIns="90000" rIns="90000" tIns="45000" bIns="45000" anchor="t">
-            <a:spAutoFit/>
+            <a:noAutofit/>
           </a:bodyPr>
           <a:p>
-            <a:pPr algn="ctr" defTabSz="914400">
+            <a:pPr>
               <a:lnSpc>
                 <a:spcPct val="100000"/>
               </a:lnSpc>
             </a:pPr>
             <a:r>
-              <a:rPr b="0" lang="en-US" sz="1400" spc="-1" strike="noStrike">
-                <a:solidFill>
-                  <a:schemeClr val="dk1"/>
-                </a:solidFill>
-                <a:latin typeface="Calibri"/>
+              <a:rPr b="0" lang="en-US" sz="1800" spc="-1" strike="noStrike">
+                <a:solidFill>
+                  <a:srgbClr val="000000"/>
+                </a:solidFill>
+                <a:latin typeface="Arial"/>
               </a:rPr>
-              <a:t>Admin</a:t>
+              <a:t>Total</a:t>
             </a:r>
-            <a:endParaRPr b="0" lang="en-US" sz="1400" spc="-1" strike="noStrike">
-              <a:solidFill>
-                <a:srgbClr val="000000"/>
-              </a:solidFill>
-              <a:latin typeface="Arial"/>
-            </a:endParaRPr>
-          </a:p>
-        </p:txBody>
-      </p:sp>
-      <p:sp>
-        <p:nvSpPr>
-          <p:cNvPr id="201" name="TextBox 50"/>
+            <a:endParaRPr b="0" lang="en-US" sz="1800" spc="-1" strike="noStrike">
+              <a:solidFill>
+                <a:srgbClr val="000000"/>
+              </a:solidFill>
+              <a:latin typeface="Arial"/>
+            </a:endParaRPr>
+          </a:p>
+        </p:txBody>
+      </p:sp>
+      <p:sp>
+        <p:nvSpPr>
+          <p:cNvPr id="197" name="TextBox 49"/>
           <p:cNvSpPr/>
           <p:nvPr/>
         </p:nvSpPr>
         <p:spPr>
           <a:xfrm>
-            <a:off x="1804680" y="1861560"/>
-            <a:ext cx="1624320" cy="195840"/>
+            <a:off x="1804680" y="1600200"/>
+            <a:ext cx="1623960" cy="303120"/>
           </a:xfrm>
           <a:prstGeom prst="rect">
             <a:avLst/>
@@ -12148,15 +12009,67 @@
             <a:spAutoFit/>
           </a:bodyPr>
           <a:p>
-            <a:pPr marL="304920" indent="-304920" defTabSz="914400">
+            <a:pPr algn="ctr" defTabSz="914400">
               <a:lnSpc>
                 <a:spcPct val="100000"/>
               </a:lnSpc>
-              <a:buClr>
-                <a:srgbClr val="000000"/>
-              </a:buClr>
-              <a:buFont typeface="OpenSymbol"/>
-              <a:buChar char="-"/>
+            </a:pPr>
+            <a:r>
+              <a:rPr b="0" lang="en-US" sz="1400" spc="-1" strike="noStrike">
+                <a:solidFill>
+                  <a:schemeClr val="dk1"/>
+                </a:solidFill>
+                <a:latin typeface="Calibri"/>
+              </a:rPr>
+              <a:t>Admin</a:t>
+            </a:r>
+            <a:endParaRPr b="0" lang="en-US" sz="1400" spc="-1" strike="noStrike">
+              <a:solidFill>
+                <a:srgbClr val="000000"/>
+              </a:solidFill>
+              <a:latin typeface="Arial"/>
+            </a:endParaRPr>
+          </a:p>
+        </p:txBody>
+      </p:sp>
+      <p:sp>
+        <p:nvSpPr>
+          <p:cNvPr id="198" name="TextBox 50"/>
+          <p:cNvSpPr/>
+          <p:nvPr/>
+        </p:nvSpPr>
+        <p:spPr>
+          <a:xfrm>
+            <a:off x="1804680" y="1861560"/>
+            <a:ext cx="1623960" cy="195480"/>
+          </a:xfrm>
+          <a:prstGeom prst="rect">
+            <a:avLst/>
+          </a:prstGeom>
+          <a:solidFill>
+            <a:schemeClr val="bg1"/>
+          </a:solidFill>
+          <a:ln w="0">
+            <a:solidFill>
+              <a:srgbClr val="000000"/>
+            </a:solidFill>
+          </a:ln>
+        </p:spPr>
+        <p:style>
+          <a:lnRef idx="0"/>
+          <a:fillRef idx="0"/>
+          <a:effectRef idx="0"/>
+          <a:fontRef idx="minor"/>
+        </p:style>
+        <p:txBody>
+          <a:bodyPr lIns="90000" rIns="90000" tIns="45000" bIns="45000" anchor="t">
+            <a:spAutoFit/>
+          </a:bodyPr>
+          <a:p>
+            <a:pPr defTabSz="914400">
+              <a:lnSpc>
+                <a:spcPct val="100000"/>
+              </a:lnSpc>
             </a:pPr>
             <a:endParaRPr b="0" lang="en-US" sz="1800" spc="-1" strike="noStrike">
               <a:solidFill>
@@ -12169,14 +12082,14 @@
       </p:sp>
       <p:sp>
         <p:nvSpPr>
-          <p:cNvPr id="202" name="Isosceles Triangle 8"/>
+          <p:cNvPr id="199" name="Isosceles Triangle 8"/>
           <p:cNvSpPr/>
           <p:nvPr/>
         </p:nvSpPr>
         <p:spPr>
           <a:xfrm>
             <a:off x="3405600" y="986040"/>
-            <a:ext cx="480600" cy="385560"/>
+            <a:ext cx="480240" cy="385200"/>
           </a:xfrm>
           <a:prstGeom prst="triangle">
             <a:avLst>
@@ -12236,17 +12149,17 @@
       </p:sp>
       <p:cxnSp>
         <p:nvCxnSpPr>
-          <p:cNvPr id="203" name="Straight Arrow Connector 81"/>
+          <p:cNvPr id="200" name="Straight Arrow Connector 81"/>
           <p:cNvCxnSpPr>
-            <a:stCxn id="202" idx="3"/>
-            <a:endCxn id="200" idx="0"/>
+            <a:stCxn id="199" idx="3"/>
+            <a:endCxn id="197" idx="0"/>
           </p:cNvCxnSpPr>
           <p:nvPr/>
         </p:nvCxnSpPr>
         <p:spPr>
           <a:xfrm flipH="1">
-            <a:off x="2616840" y="1371600"/>
-            <a:ext cx="1029600" cy="228960"/>
+            <a:off x="2616480" y="1371240"/>
+            <a:ext cx="1029600" cy="229320"/>
           </a:xfrm>
           <a:prstGeom prst="straightConnector1">
             <a:avLst/>
@@ -12261,17 +12174,68 @@
       </p:cxnSp>
       <p:cxnSp>
         <p:nvCxnSpPr>
-          <p:cNvPr id="204" name="Straight Arrow Connector 82"/>
+          <p:cNvPr id="201" name="Straight Arrow Connector 82"/>
           <p:cNvCxnSpPr>
-            <a:stCxn id="202" idx="0"/>
+            <a:stCxn id="199" idx="0"/>
             <a:endCxn id="143" idx="1"/>
           </p:cNvCxnSpPr>
           <p:nvPr/>
         </p:nvCxnSpPr>
         <p:spPr>
           <a:xfrm>
-            <a:off x="3646080" y="986040"/>
-            <a:ext cx="1129320" cy="97920"/>
+            <a:off x="3645720" y="986040"/>
+            <a:ext cx="1129680" cy="97920"/>
+          </a:xfrm>
+          <a:prstGeom prst="straightConnector1">
+            <a:avLst/>
+          </a:prstGeom>
+          <a:ln w="25400">
+            <a:solidFill>
+              <a:srgbClr val="000000"/>
+            </a:solidFill>
+            <a:round/>
+          </a:ln>
+        </p:spPr>
+      </p:cxnSp>
+      <p:cxnSp>
+        <p:nvCxnSpPr>
+          <p:cNvPr id="202" name="Straight Arrow Connector 83"/>
+          <p:cNvCxnSpPr>
+            <a:stCxn id="176" idx="2"/>
+            <a:endCxn id="186" idx="0"/>
+          </p:cNvCxnSpPr>
+          <p:nvPr/>
+        </p:nvCxnSpPr>
+        <p:spPr>
+          <a:xfrm>
+            <a:off x="7212600" y="4770000"/>
+            <a:ext cx="102240" cy="259560"/>
+          </a:xfrm>
+          <a:prstGeom prst="straightConnector1">
+            <a:avLst/>
+          </a:prstGeom>
+          <a:ln cap="sq" w="76200">
+            <a:solidFill>
+              <a:srgbClr val="000000"/>
+            </a:solidFill>
+            <a:round/>
+            <a:tailEnd len="sm" type="triangle" w="sm"/>
+          </a:ln>
+        </p:spPr>
+      </p:cxnSp>
+      <p:cxnSp>
+        <p:nvCxnSpPr>
+          <p:cNvPr id="203" name="Straight Arrow Connector 57"/>
+          <p:cNvCxnSpPr>
+            <a:stCxn id="186" idx="2"/>
+            <a:endCxn id="185" idx="0"/>
+          </p:cNvCxnSpPr>
+          <p:nvPr/>
+        </p:nvCxnSpPr>
+        <p:spPr>
+          <a:xfrm>
+            <a:off x="7314480" y="5414400"/>
+            <a:ext cx="127080" cy="300960"/>
           </a:xfrm>
           <a:prstGeom prst="straightConnector1">
             <a:avLst/>
@@ -12316,14 +12280,14 @@
       </p:grpSpPr>
       <p:cxnSp>
         <p:nvCxnSpPr>
-          <p:cNvPr id="205" name="Straight Arrow Connector 44"/>
+          <p:cNvPr id="204" name="Straight Arrow Connector 44"/>
           <p:cNvCxnSpPr/>
           <p:nvPr/>
         </p:nvCxnSpPr>
         <p:spPr>
           <a:xfrm flipH="1">
             <a:off x="0" y="3073320"/>
-            <a:ext cx="1830960" cy="2160"/>
+            <a:ext cx="1831320" cy="2520"/>
           </a:xfrm>
           <a:prstGeom prst="straightConnector1">
             <a:avLst/>
@@ -12339,14 +12303,14 @@
       </p:cxnSp>
       <p:cxnSp>
         <p:nvCxnSpPr>
-          <p:cNvPr id="206" name="Straight Arrow Connector 45"/>
+          <p:cNvPr id="205" name="Straight Arrow Connector 45"/>
           <p:cNvCxnSpPr/>
           <p:nvPr/>
         </p:nvCxnSpPr>
         <p:spPr>
           <a:xfrm>
             <a:off x="0" y="2489400"/>
-            <a:ext cx="1830960" cy="2160"/>
+            <a:ext cx="1831320" cy="2520"/>
           </a:xfrm>
           <a:prstGeom prst="straightConnector1">
             <a:avLst/>
@@ -12362,14 +12326,14 @@
       </p:cxnSp>
       <p:cxnSp>
         <p:nvCxnSpPr>
-          <p:cNvPr id="207" name="Straight Arrow Connector 46"/>
+          <p:cNvPr id="206" name="Straight Arrow Connector 46"/>
           <p:cNvCxnSpPr/>
           <p:nvPr/>
         </p:nvCxnSpPr>
         <p:spPr>
           <a:xfrm>
             <a:off x="0" y="2781360"/>
-            <a:ext cx="1830960" cy="2160"/>
+            <a:ext cx="1831320" cy="2520"/>
           </a:xfrm>
           <a:prstGeom prst="straightConnector1">
             <a:avLst/>
@@ -12385,14 +12349,14 @@
       </p:cxnSp>
       <p:cxnSp>
         <p:nvCxnSpPr>
-          <p:cNvPr id="208" name="Straight Arrow Connector 47"/>
+          <p:cNvPr id="207" name="Straight Arrow Connector 47"/>
           <p:cNvCxnSpPr/>
           <p:nvPr/>
         </p:nvCxnSpPr>
         <p:spPr>
           <a:xfrm flipH="1">
             <a:off x="0" y="3657600"/>
-            <a:ext cx="1830960" cy="2160"/>
+            <a:ext cx="1831320" cy="2520"/>
           </a:xfrm>
           <a:prstGeom prst="straightConnector1">
             <a:avLst/>
@@ -12407,14 +12371,14 @@
       </p:cxnSp>
       <p:sp>
         <p:nvSpPr>
-          <p:cNvPr id="209" name="Diamond 17"/>
+          <p:cNvPr id="208" name="Diamond 17"/>
           <p:cNvSpPr/>
           <p:nvPr/>
         </p:nvSpPr>
         <p:spPr>
           <a:xfrm>
             <a:off x="128520" y="6134040"/>
-            <a:ext cx="1569600" cy="385560"/>
+            <a:ext cx="1569240" cy="385200"/>
           </a:xfrm>
           <a:prstGeom prst="diamond">
             <a:avLst/>
@@ -12472,14 +12436,14 @@
       </p:sp>
       <p:sp>
         <p:nvSpPr>
-          <p:cNvPr id="210" name="Oval 4"/>
+          <p:cNvPr id="209" name="Oval 4"/>
           <p:cNvSpPr/>
           <p:nvPr/>
         </p:nvSpPr>
         <p:spPr>
           <a:xfrm>
             <a:off x="302760" y="5454000"/>
-            <a:ext cx="1221120" cy="385560"/>
+            <a:ext cx="1220760" cy="385200"/>
           </a:xfrm>
           <a:prstGeom prst="ellipse">
             <a:avLst/>
@@ -12535,14 +12499,14 @@
       </p:sp>
       <p:sp>
         <p:nvSpPr>
-          <p:cNvPr id="211" name="TextBox 53"/>
+          <p:cNvPr id="210" name="TextBox 53"/>
           <p:cNvSpPr/>
           <p:nvPr/>
         </p:nvSpPr>
         <p:spPr>
           <a:xfrm>
             <a:off x="101160" y="336240"/>
-            <a:ext cx="1624320" cy="303120"/>
+            <a:ext cx="1623960" cy="303120"/>
           </a:xfrm>
           <a:prstGeom prst="rect">
             <a:avLst/>
@@ -12592,14 +12556,14 @@
       </p:sp>
       <p:sp>
         <p:nvSpPr>
-          <p:cNvPr id="212" name="TextBox 54"/>
+          <p:cNvPr id="211" name="TextBox 54"/>
           <p:cNvSpPr/>
           <p:nvPr/>
         </p:nvSpPr>
         <p:spPr>
           <a:xfrm>
             <a:off x="101160" y="597600"/>
-            <a:ext cx="1624320" cy="516600"/>
+            <a:ext cx="1623960" cy="516600"/>
           </a:xfrm>
           <a:prstGeom prst="rect">
             <a:avLst/>
@@ -12682,14 +12646,14 @@
       </p:sp>
       <p:sp>
         <p:nvSpPr>
-          <p:cNvPr id="213" name="TextBox 72"/>
+          <p:cNvPr id="212" name="TextBox 72"/>
           <p:cNvSpPr/>
           <p:nvPr/>
         </p:nvSpPr>
         <p:spPr>
           <a:xfrm>
             <a:off x="8458200" y="5486400"/>
-            <a:ext cx="1624320" cy="303120"/>
+            <a:ext cx="1623960" cy="303120"/>
           </a:xfrm>
           <a:prstGeom prst="rect">
             <a:avLst/>
@@ -12739,14 +12703,14 @@
       </p:sp>
       <p:sp>
         <p:nvSpPr>
-          <p:cNvPr id="214" name="Diamond 18"/>
+          <p:cNvPr id="213" name="Diamond 18"/>
           <p:cNvSpPr/>
           <p:nvPr/>
         </p:nvSpPr>
         <p:spPr>
           <a:xfrm>
             <a:off x="128520" y="4629600"/>
-            <a:ext cx="1569600" cy="530280"/>
+            <a:ext cx="1569240" cy="529920"/>
           </a:xfrm>
           <a:prstGeom prst="diamond">
             <a:avLst/>
@@ -12827,14 +12791,14 @@
       </p:sp>
       <p:cxnSp>
         <p:nvCxnSpPr>
-          <p:cNvPr id="215" name="Straight Arrow Connector 48"/>
+          <p:cNvPr id="214" name="Straight Arrow Connector 48"/>
           <p:cNvCxnSpPr/>
           <p:nvPr/>
         </p:nvCxnSpPr>
         <p:spPr>
           <a:xfrm>
             <a:off x="0" y="3365640"/>
-            <a:ext cx="1830960" cy="2160"/>
+            <a:ext cx="1831320" cy="2520"/>
           </a:xfrm>
           <a:prstGeom prst="straightConnector1">
             <a:avLst/>
@@ -12849,14 +12813,14 @@
       </p:cxnSp>
       <p:sp>
         <p:nvSpPr>
-          <p:cNvPr id="216" name="Isosceles Triangle 5"/>
+          <p:cNvPr id="215" name="Isosceles Triangle 5"/>
           <p:cNvSpPr/>
           <p:nvPr/>
         </p:nvSpPr>
         <p:spPr>
           <a:xfrm>
             <a:off x="673200" y="3949920"/>
-            <a:ext cx="480600" cy="385560"/>
+            <a:ext cx="480240" cy="385200"/>
           </a:xfrm>
           <a:prstGeom prst="triangle">
             <a:avLst>
@@ -12916,28 +12880,28 @@
       </p:sp>
       <p:grpSp>
         <p:nvGrpSpPr>
-          <p:cNvPr id="217" name="Group 15"/>
+          <p:cNvPr id="216" name="Group 15"/>
           <p:cNvGrpSpPr/>
           <p:nvPr/>
         </p:nvGrpSpPr>
         <p:grpSpPr>
           <a:xfrm>
             <a:off x="101160" y="1413000"/>
-            <a:ext cx="1624320" cy="777960"/>
+            <a:ext cx="1623960" cy="777960"/>
             <a:chOff x="101160" y="1413000"/>
-            <a:chExt cx="1624320" cy="777960"/>
+            <a:chExt cx="1623960" cy="777960"/>
           </a:xfrm>
         </p:grpSpPr>
         <p:sp>
           <p:nvSpPr>
-            <p:cNvPr id="218" name="TextBox 57"/>
+            <p:cNvPr id="217" name="TextBox 57"/>
             <p:cNvSpPr/>
             <p:nvPr/>
           </p:nvSpPr>
           <p:spPr>
             <a:xfrm>
               <a:off x="101160" y="1413000"/>
-              <a:ext cx="1624320" cy="303120"/>
+              <a:ext cx="1623960" cy="303120"/>
             </a:xfrm>
             <a:prstGeom prst="rect">
               <a:avLst/>
@@ -12988,14 +12952,14 @@
         </p:sp>
         <p:sp>
           <p:nvSpPr>
-            <p:cNvPr id="219" name="TextBox 58"/>
+            <p:cNvPr id="218" name="TextBox 58"/>
             <p:cNvSpPr/>
             <p:nvPr/>
           </p:nvSpPr>
           <p:spPr>
             <a:xfrm>
               <a:off x="101160" y="1674360"/>
-              <a:ext cx="1624320" cy="516600"/>
+              <a:ext cx="1623960" cy="516600"/>
             </a:xfrm>
             <a:prstGeom prst="rect">
               <a:avLst/>
@@ -13080,14 +13044,14 @@
       </p:grpSp>
       <p:sp>
         <p:nvSpPr>
-          <p:cNvPr id="220" name="TextBox 62"/>
+          <p:cNvPr id="219" name="TextBox 62"/>
           <p:cNvSpPr/>
           <p:nvPr/>
         </p:nvSpPr>
         <p:spPr>
           <a:xfrm>
             <a:off x="7493400" y="746280"/>
-            <a:ext cx="1624320" cy="303120"/>
+            <a:ext cx="1623960" cy="303120"/>
           </a:xfrm>
           <a:prstGeom prst="rect">
             <a:avLst/>
@@ -13143,14 +13107,14 @@
       </p:sp>
       <p:sp>
         <p:nvSpPr>
-          <p:cNvPr id="221" name="TextBox 65"/>
+          <p:cNvPr id="220" name="TextBox 65"/>
           <p:cNvSpPr/>
           <p:nvPr/>
         </p:nvSpPr>
         <p:spPr>
           <a:xfrm>
             <a:off x="7493400" y="443160"/>
-            <a:ext cx="1624320" cy="303120"/>
+            <a:ext cx="1623960" cy="303120"/>
           </a:xfrm>
           <a:prstGeom prst="rect">
             <a:avLst/>
@@ -13200,28 +13164,28 @@
       </p:sp>
       <p:grpSp>
         <p:nvGrpSpPr>
-          <p:cNvPr id="222" name="Group 17"/>
+          <p:cNvPr id="221" name="Group 17"/>
           <p:cNvGrpSpPr/>
           <p:nvPr/>
         </p:nvGrpSpPr>
         <p:grpSpPr>
           <a:xfrm>
             <a:off x="5715000" y="3200400"/>
-            <a:ext cx="1624320" cy="777960"/>
+            <a:ext cx="1623960" cy="777960"/>
             <a:chOff x="5715000" y="3200400"/>
-            <a:chExt cx="1624320" cy="777960"/>
+            <a:chExt cx="1623960" cy="777960"/>
           </a:xfrm>
         </p:grpSpPr>
         <p:sp>
           <p:nvSpPr>
-            <p:cNvPr id="223" name="TextBox 61"/>
+            <p:cNvPr id="222" name="TextBox 61"/>
             <p:cNvSpPr/>
             <p:nvPr/>
           </p:nvSpPr>
           <p:spPr>
             <a:xfrm>
               <a:off x="5715000" y="3200400"/>
-              <a:ext cx="1624320" cy="303120"/>
+              <a:ext cx="1623960" cy="303120"/>
             </a:xfrm>
             <a:prstGeom prst="rect">
               <a:avLst/>
@@ -13271,14 +13235,14 @@
         </p:sp>
         <p:sp>
           <p:nvSpPr>
-            <p:cNvPr id="224" name="TextBox 63"/>
+            <p:cNvPr id="223" name="TextBox 63"/>
             <p:cNvSpPr/>
             <p:nvPr/>
           </p:nvSpPr>
           <p:spPr>
             <a:xfrm>
               <a:off x="5715000" y="3461760"/>
-              <a:ext cx="1624320" cy="516600"/>
+              <a:ext cx="1623960" cy="516600"/>
             </a:xfrm>
             <a:prstGeom prst="rect">
               <a:avLst/>
@@ -13362,28 +13326,28 @@
       </p:grpSp>
       <p:grpSp>
         <p:nvGrpSpPr>
-          <p:cNvPr id="225" name="Group 18"/>
+          <p:cNvPr id="224" name="Group 18"/>
           <p:cNvGrpSpPr/>
           <p:nvPr/>
         </p:nvGrpSpPr>
         <p:grpSpPr>
           <a:xfrm>
             <a:off x="10058400" y="2482920"/>
-            <a:ext cx="1624320" cy="1631880"/>
+            <a:ext cx="1623960" cy="1631880"/>
             <a:chOff x="10058400" y="2482920"/>
-            <a:chExt cx="1624320" cy="1631880"/>
+            <a:chExt cx="1623960" cy="1631880"/>
           </a:xfrm>
         </p:grpSpPr>
         <p:sp>
           <p:nvSpPr>
-            <p:cNvPr id="226" name="TextBox 64"/>
+            <p:cNvPr id="225" name="TextBox 64"/>
             <p:cNvSpPr/>
             <p:nvPr/>
           </p:nvSpPr>
           <p:spPr>
             <a:xfrm>
               <a:off x="10058400" y="2482920"/>
-              <a:ext cx="1624320" cy="303120"/>
+              <a:ext cx="1623960" cy="303120"/>
             </a:xfrm>
             <a:prstGeom prst="rect">
               <a:avLst/>
@@ -13433,14 +13397,14 @@
         </p:sp>
         <p:sp>
           <p:nvSpPr>
-            <p:cNvPr id="227" name="TextBox 66"/>
+            <p:cNvPr id="226" name="TextBox 66"/>
             <p:cNvSpPr/>
             <p:nvPr/>
           </p:nvSpPr>
           <p:spPr>
             <a:xfrm>
               <a:off x="10058400" y="2744280"/>
-              <a:ext cx="1624320" cy="1370520"/>
+              <a:ext cx="1623960" cy="1370520"/>
             </a:xfrm>
             <a:prstGeom prst="rect">
               <a:avLst/>
@@ -13632,14 +13596,14 @@
       </p:grpSp>
       <p:sp>
         <p:nvSpPr>
-          <p:cNvPr id="228" name="Diamond 19"/>
+          <p:cNvPr id="227" name="Diamond 19"/>
           <p:cNvSpPr/>
           <p:nvPr/>
         </p:nvSpPr>
         <p:spPr>
           <a:xfrm>
             <a:off x="9402120" y="4572000"/>
-            <a:ext cx="1569600" cy="385560"/>
+            <a:ext cx="1569240" cy="385200"/>
           </a:xfrm>
           <a:prstGeom prst="diamond">
             <a:avLst/>
@@ -13697,14 +13661,14 @@
       </p:sp>
       <p:sp>
         <p:nvSpPr>
-          <p:cNvPr id="229" name="Oval 5"/>
+          <p:cNvPr id="228" name="Oval 5"/>
           <p:cNvSpPr/>
           <p:nvPr/>
         </p:nvSpPr>
         <p:spPr>
           <a:xfrm>
             <a:off x="7007400" y="4572000"/>
-            <a:ext cx="1678320" cy="385560"/>
+            <a:ext cx="1677960" cy="385200"/>
           </a:xfrm>
           <a:prstGeom prst="ellipse">
             <a:avLst/>
@@ -13760,28 +13724,28 @@
       </p:sp>
       <p:grpSp>
         <p:nvGrpSpPr>
-          <p:cNvPr id="230" name="Group 19"/>
+          <p:cNvPr id="229" name="Group 19"/>
           <p:cNvGrpSpPr/>
           <p:nvPr/>
         </p:nvGrpSpPr>
         <p:grpSpPr>
           <a:xfrm>
             <a:off x="10058400" y="2482920"/>
-            <a:ext cx="1624320" cy="1631880"/>
+            <a:ext cx="1623960" cy="1631880"/>
             <a:chOff x="10058400" y="2482920"/>
-            <a:chExt cx="1624320" cy="1631880"/>
+            <a:chExt cx="1623960" cy="1631880"/>
           </a:xfrm>
         </p:grpSpPr>
         <p:sp>
           <p:nvSpPr>
-            <p:cNvPr id="231" name="TextBox 67"/>
+            <p:cNvPr id="230" name="TextBox 67"/>
             <p:cNvSpPr/>
             <p:nvPr/>
           </p:nvSpPr>
           <p:spPr>
             <a:xfrm>
               <a:off x="10058400" y="2482920"/>
-              <a:ext cx="1624320" cy="303120"/>
+              <a:ext cx="1623960" cy="303120"/>
             </a:xfrm>
             <a:prstGeom prst="rect">
               <a:avLst/>
@@ -13831,14 +13795,14 @@
         </p:sp>
         <p:sp>
           <p:nvSpPr>
-            <p:cNvPr id="232" name="TextBox 68"/>
+            <p:cNvPr id="231" name="TextBox 68"/>
             <p:cNvSpPr/>
             <p:nvPr/>
           </p:nvSpPr>
           <p:spPr>
             <a:xfrm>
               <a:off x="10058400" y="2744280"/>
-              <a:ext cx="1624320" cy="1370520"/>
+              <a:ext cx="1623960" cy="1370520"/>
             </a:xfrm>
             <a:prstGeom prst="rect">
               <a:avLst/>
@@ -14030,28 +13994,28 @@
       </p:grpSp>
       <p:grpSp>
         <p:nvGrpSpPr>
-          <p:cNvPr id="233" name="Group 20"/>
+          <p:cNvPr id="232" name="Group 20"/>
           <p:cNvGrpSpPr/>
           <p:nvPr/>
         </p:nvGrpSpPr>
         <p:grpSpPr>
           <a:xfrm>
             <a:off x="10058400" y="2482920"/>
-            <a:ext cx="1624320" cy="1631880"/>
+            <a:ext cx="1623960" cy="1631880"/>
             <a:chOff x="10058400" y="2482920"/>
-            <a:chExt cx="1624320" cy="1631880"/>
+            <a:chExt cx="1623960" cy="1631880"/>
           </a:xfrm>
         </p:grpSpPr>
         <p:sp>
           <p:nvSpPr>
-            <p:cNvPr id="234" name="TextBox 69"/>
+            <p:cNvPr id="233" name="TextBox 69"/>
             <p:cNvSpPr/>
             <p:nvPr/>
           </p:nvSpPr>
           <p:spPr>
             <a:xfrm>
               <a:off x="10058400" y="2482920"/>
-              <a:ext cx="1624320" cy="303120"/>
+              <a:ext cx="1623960" cy="303120"/>
             </a:xfrm>
             <a:prstGeom prst="rect">
               <a:avLst/>
@@ -14101,14 +14065,14 @@
         </p:sp>
         <p:sp>
           <p:nvSpPr>
-            <p:cNvPr id="235" name="TextBox 70"/>
+            <p:cNvPr id="234" name="TextBox 70"/>
             <p:cNvSpPr/>
             <p:nvPr/>
           </p:nvSpPr>
           <p:spPr>
             <a:xfrm>
               <a:off x="10058400" y="2744280"/>
-              <a:ext cx="1624320" cy="1370520"/>
+              <a:ext cx="1623960" cy="1370520"/>
             </a:xfrm>
             <a:prstGeom prst="rect">
               <a:avLst/>
@@ -14300,14 +14264,14 @@
       </p:grpSp>
       <p:sp>
         <p:nvSpPr>
-          <p:cNvPr id="236" name="Diamond 25"/>
+          <p:cNvPr id="235" name="Diamond 25"/>
           <p:cNvSpPr/>
           <p:nvPr/>
         </p:nvSpPr>
         <p:spPr>
           <a:xfrm>
             <a:off x="7772400" y="3339000"/>
-            <a:ext cx="1827720" cy="385560"/>
+            <a:ext cx="1827360" cy="385200"/>
           </a:xfrm>
           <a:prstGeom prst="diamond">
             <a:avLst/>
@@ -14365,14 +14329,14 @@
       </p:sp>
       <p:sp>
         <p:nvSpPr>
-          <p:cNvPr id="237" name="Diamond 16"/>
+          <p:cNvPr id="236" name="Diamond 16"/>
           <p:cNvSpPr/>
           <p:nvPr/>
         </p:nvSpPr>
         <p:spPr>
           <a:xfrm>
             <a:off x="9859320" y="1371600"/>
-            <a:ext cx="1798200" cy="385560"/>
+            <a:ext cx="1797840" cy="385200"/>
           </a:xfrm>
           <a:prstGeom prst="diamond">
             <a:avLst/>
@@ -14430,16 +14394,16 @@
       </p:sp>
       <p:cxnSp>
         <p:nvCxnSpPr>
-          <p:cNvPr id="238" name="Straight Arrow Connector 65"/>
+          <p:cNvPr id="237" name="Straight Arrow Connector 65"/>
           <p:cNvCxnSpPr>
-            <a:stCxn id="220" idx="3"/>
-            <a:endCxn id="237" idx="0"/>
+            <a:stCxn id="219" idx="3"/>
+            <a:endCxn id="236" idx="0"/>
           </p:cNvCxnSpPr>
           <p:nvPr/>
         </p:nvCxnSpPr>
         <p:spPr>
           <a:xfrm>
-            <a:off x="9117720" y="897840"/>
+            <a:off x="9117360" y="897840"/>
             <a:ext cx="1641240" cy="474120"/>
           </a:xfrm>
           <a:prstGeom prst="straightConnector1">
@@ -14456,17 +14420,17 @@
       </p:cxnSp>
       <p:cxnSp>
         <p:nvCxnSpPr>
-          <p:cNvPr id="239" name="Straight Arrow Connector 40"/>
+          <p:cNvPr id="238" name="Straight Arrow Connector 40"/>
           <p:cNvCxnSpPr>
-            <a:stCxn id="228" idx="2"/>
-            <a:endCxn id="213" idx="0"/>
+            <a:stCxn id="227" idx="2"/>
+            <a:endCxn id="212" idx="0"/>
           </p:cNvCxnSpPr>
           <p:nvPr/>
         </p:nvCxnSpPr>
         <p:spPr>
           <a:xfrm flipH="1">
-            <a:off x="9270360" y="4957560"/>
-            <a:ext cx="916920" cy="529200"/>
+            <a:off x="9270000" y="4957200"/>
+            <a:ext cx="917280" cy="529560"/>
           </a:xfrm>
           <a:prstGeom prst="straightConnector1">
             <a:avLst/>
@@ -14481,17 +14445,17 @@
       </p:cxnSp>
       <p:cxnSp>
         <p:nvCxnSpPr>
-          <p:cNvPr id="240" name="Straight Arrow Connector 41"/>
+          <p:cNvPr id="239" name="Straight Arrow Connector 41"/>
           <p:cNvCxnSpPr>
-            <a:stCxn id="233" idx="2"/>
-            <a:endCxn id="228" idx="0"/>
+            <a:stCxn id="232" idx="2"/>
+            <a:endCxn id="227" idx="0"/>
           </p:cNvCxnSpPr>
           <p:nvPr/>
         </p:nvCxnSpPr>
         <p:spPr>
           <a:xfrm flipH="1">
             <a:off x="10186920" y="4114800"/>
-            <a:ext cx="684000" cy="457560"/>
+            <a:ext cx="683640" cy="457560"/>
           </a:xfrm>
           <a:prstGeom prst="straightConnector1">
             <a:avLst/>
@@ -14506,17 +14470,17 @@
       </p:cxnSp>
       <p:cxnSp>
         <p:nvCxnSpPr>
-          <p:cNvPr id="241" name="Straight Arrow Connector 42"/>
+          <p:cNvPr id="240" name="Straight Arrow Connector 42"/>
           <p:cNvCxnSpPr>
-            <a:stCxn id="228" idx="1"/>
-            <a:endCxn id="229" idx="6"/>
+            <a:stCxn id="227" idx="1"/>
+            <a:endCxn id="228" idx="6"/>
           </p:cNvCxnSpPr>
           <p:nvPr/>
         </p:nvCxnSpPr>
         <p:spPr>
           <a:xfrm flipH="1">
-            <a:off x="8685720" y="4764960"/>
-            <a:ext cx="716760" cy="360"/>
+            <a:off x="8685360" y="4764600"/>
+            <a:ext cx="717120" cy="360"/>
           </a:xfrm>
           <a:prstGeom prst="straightConnector1">
             <a:avLst/>
@@ -14531,14 +14495,14 @@
       </p:cxnSp>
       <p:sp>
         <p:nvSpPr>
-          <p:cNvPr id="242" name="Oval 7"/>
+          <p:cNvPr id="241" name="Oval 7"/>
           <p:cNvSpPr/>
           <p:nvPr/>
         </p:nvSpPr>
         <p:spPr>
           <a:xfrm>
             <a:off x="6629400" y="5099760"/>
-            <a:ext cx="1599120" cy="385560"/>
+            <a:ext cx="1598760" cy="385200"/>
           </a:xfrm>
           <a:prstGeom prst="ellipse">
             <a:avLst/>
@@ -14594,17 +14558,17 @@
       </p:sp>
       <p:cxnSp>
         <p:nvCxnSpPr>
-          <p:cNvPr id="243" name="Straight Arrow Connector 66"/>
+          <p:cNvPr id="242" name="Straight Arrow Connector 66"/>
           <p:cNvCxnSpPr>
-            <a:stCxn id="228" idx="1"/>
-            <a:endCxn id="242" idx="6"/>
+            <a:stCxn id="227" idx="1"/>
+            <a:endCxn id="241" idx="6"/>
           </p:cNvCxnSpPr>
           <p:nvPr/>
         </p:nvCxnSpPr>
         <p:spPr>
           <a:xfrm flipH="1">
-            <a:off x="8228520" y="4764960"/>
-            <a:ext cx="1173960" cy="528120"/>
+            <a:off x="8228160" y="4764600"/>
+            <a:ext cx="1174320" cy="528120"/>
           </a:xfrm>
           <a:prstGeom prst="straightConnector1">
             <a:avLst/>
@@ -14619,17 +14583,17 @@
       </p:cxnSp>
       <p:cxnSp>
         <p:nvCxnSpPr>
-          <p:cNvPr id="244" name="Straight Arrow Connector 67"/>
+          <p:cNvPr id="243" name="Straight Arrow Connector 67"/>
           <p:cNvCxnSpPr>
-            <a:stCxn id="245" idx="1"/>
-            <a:endCxn id="246" idx="6"/>
+            <a:stCxn id="244" idx="1"/>
+            <a:endCxn id="245" idx="6"/>
           </p:cNvCxnSpPr>
           <p:nvPr/>
         </p:nvCxnSpPr>
         <p:spPr>
           <a:xfrm flipH="1">
-            <a:off x="4799520" y="1406520"/>
-            <a:ext cx="458640" cy="158400"/>
+            <a:off x="4799160" y="1406160"/>
+            <a:ext cx="459000" cy="158400"/>
           </a:xfrm>
           <a:prstGeom prst="straightConnector1">
             <a:avLst/>
@@ -14644,14 +14608,14 @@
       </p:cxnSp>
       <p:sp>
         <p:nvSpPr>
-          <p:cNvPr id="247" name="Diamond 26"/>
+          <p:cNvPr id="246" name="Diamond 26"/>
           <p:cNvSpPr/>
           <p:nvPr/>
         </p:nvSpPr>
         <p:spPr>
           <a:xfrm>
             <a:off x="7116120" y="1600200"/>
-            <a:ext cx="1569600" cy="385560"/>
+            <a:ext cx="1569240" cy="385200"/>
           </a:xfrm>
           <a:prstGeom prst="diamond">
             <a:avLst/>
@@ -14696,7 +14660,7 @@
                 </a:solidFill>
                 <a:latin typeface="Calibri"/>
               </a:rPr>
-              <a:t>from</a:t>
+              <a:t>From</a:t>
             </a:r>
             <a:endParaRPr b="0" lang="en-US" sz="1400" spc="-1" strike="noStrike">
               <a:solidFill>
@@ -14709,14 +14673,14 @@
       </p:sp>
       <p:sp>
         <p:nvSpPr>
-          <p:cNvPr id="245" name="Diamond 27"/>
+          <p:cNvPr id="244" name="Diamond 27"/>
           <p:cNvSpPr/>
           <p:nvPr/>
         </p:nvSpPr>
         <p:spPr>
           <a:xfrm>
             <a:off x="5257800" y="1213560"/>
-            <a:ext cx="1569600" cy="385560"/>
+            <a:ext cx="1569240" cy="385200"/>
           </a:xfrm>
           <a:prstGeom prst="diamond">
             <a:avLst/>
@@ -14761,7 +14725,7 @@
                 </a:solidFill>
                 <a:latin typeface="Calibri"/>
               </a:rPr>
-              <a:t>to</a:t>
+              <a:t>To</a:t>
             </a:r>
             <a:endParaRPr b="0" lang="en-US" sz="1400" spc="-1" strike="noStrike">
               <a:solidFill>
@@ -14774,14 +14738,14 @@
       </p:sp>
       <p:sp>
         <p:nvSpPr>
-          <p:cNvPr id="246" name="Oval 8"/>
+          <p:cNvPr id="245" name="Oval 8"/>
           <p:cNvSpPr/>
           <p:nvPr/>
         </p:nvSpPr>
         <p:spPr>
           <a:xfrm>
             <a:off x="3200400" y="1371600"/>
-            <a:ext cx="1599120" cy="385560"/>
+            <a:ext cx="1598760" cy="385200"/>
           </a:xfrm>
           <a:prstGeom prst="ellipse">
             <a:avLst/>
@@ -14837,17 +14801,17 @@
       </p:sp>
       <p:cxnSp>
         <p:nvCxnSpPr>
-          <p:cNvPr id="248" name="Straight Arrow Connector 68"/>
+          <p:cNvPr id="247" name="Straight Arrow Connector 68"/>
           <p:cNvCxnSpPr>
-            <a:stCxn id="222" idx="0"/>
-            <a:endCxn id="245" idx="2"/>
+            <a:stCxn id="221" idx="0"/>
+            <a:endCxn id="244" idx="2"/>
           </p:cNvCxnSpPr>
           <p:nvPr/>
         </p:nvCxnSpPr>
         <p:spPr>
           <a:xfrm flipH="1" flipV="1">
-            <a:off x="6042600" y="1599120"/>
-            <a:ext cx="484920" cy="1601640"/>
+            <a:off x="6042600" y="1598760"/>
+            <a:ext cx="484560" cy="1602000"/>
           </a:xfrm>
           <a:prstGeom prst="straightConnector1">
             <a:avLst/>
@@ -14863,10 +14827,10 @@
       </p:cxnSp>
       <p:cxnSp>
         <p:nvCxnSpPr>
-          <p:cNvPr id="249" name="Straight Arrow Connector 69"/>
+          <p:cNvPr id="248" name="Straight Arrow Connector 69"/>
           <p:cNvCxnSpPr>
-            <a:stCxn id="221" idx="1"/>
-            <a:endCxn id="245" idx="0"/>
+            <a:stCxn id="220" idx="1"/>
+            <a:endCxn id="244" idx="0"/>
           </p:cNvCxnSpPr>
           <p:nvPr/>
         </p:nvCxnSpPr>
@@ -14888,17 +14852,17 @@
       </p:cxnSp>
       <p:cxnSp>
         <p:nvCxnSpPr>
-          <p:cNvPr id="250" name="Straight Arrow Connector 70"/>
+          <p:cNvPr id="249" name="Straight Arrow Connector 70"/>
           <p:cNvCxnSpPr>
-            <a:stCxn id="222" idx="0"/>
-            <a:endCxn id="247" idx="2"/>
+            <a:stCxn id="221" idx="0"/>
+            <a:endCxn id="246" idx="2"/>
           </p:cNvCxnSpPr>
           <p:nvPr/>
         </p:nvCxnSpPr>
         <p:spPr>
           <a:xfrm flipV="1">
-            <a:off x="6527160" y="1985760"/>
-            <a:ext cx="1374120" cy="1215000"/>
+            <a:off x="6526800" y="1985400"/>
+            <a:ext cx="1374480" cy="1215360"/>
           </a:xfrm>
           <a:prstGeom prst="straightConnector1">
             <a:avLst/>
@@ -14914,17 +14878,17 @@
       </p:cxnSp>
       <p:cxnSp>
         <p:nvCxnSpPr>
-          <p:cNvPr id="251" name="Straight Arrow Connector 71"/>
+          <p:cNvPr id="250" name="Straight Arrow Connector 71"/>
           <p:cNvCxnSpPr>
-            <a:stCxn id="247" idx="0"/>
-            <a:endCxn id="220" idx="2"/>
+            <a:stCxn id="246" idx="0"/>
+            <a:endCxn id="219" idx="2"/>
           </p:cNvCxnSpPr>
           <p:nvPr/>
         </p:nvCxnSpPr>
         <p:spPr>
           <a:xfrm flipV="1">
             <a:off x="7900920" y="1049400"/>
-            <a:ext cx="405000" cy="551160"/>
+            <a:ext cx="404640" cy="551160"/>
           </a:xfrm>
           <a:prstGeom prst="straightConnector1">
             <a:avLst/>
@@ -14939,17 +14903,17 @@
       </p:cxnSp>
       <p:cxnSp>
         <p:nvCxnSpPr>
-          <p:cNvPr id="252" name="Straight Arrow Connector 64"/>
+          <p:cNvPr id="251" name="Straight Arrow Connector 64"/>
           <p:cNvCxnSpPr>
-            <a:stCxn id="222" idx="3"/>
-            <a:endCxn id="236" idx="1"/>
+            <a:stCxn id="221" idx="3"/>
+            <a:endCxn id="235" idx="1"/>
           </p:cNvCxnSpPr>
           <p:nvPr/>
         </p:nvCxnSpPr>
         <p:spPr>
           <a:xfrm flipV="1">
-            <a:off x="7339320" y="3531960"/>
-            <a:ext cx="433440" cy="57600"/>
+            <a:off x="7338960" y="3531600"/>
+            <a:ext cx="433800" cy="57960"/>
           </a:xfrm>
           <a:prstGeom prst="straightConnector1">
             <a:avLst/>
@@ -14965,17 +14929,17 @@
       </p:cxnSp>
       <p:cxnSp>
         <p:nvCxnSpPr>
-          <p:cNvPr id="253" name="Straight Arrow Connector 63"/>
+          <p:cNvPr id="252" name="Straight Arrow Connector 63"/>
           <p:cNvCxnSpPr>
-            <a:stCxn id="233" idx="1"/>
-            <a:endCxn id="236" idx="3"/>
+            <a:stCxn id="232" idx="1"/>
+            <a:endCxn id="235" idx="3"/>
           </p:cNvCxnSpPr>
           <p:nvPr/>
         </p:nvCxnSpPr>
         <p:spPr>
           <a:xfrm flipH="1">
-            <a:off x="9600120" y="3298680"/>
-            <a:ext cx="458640" cy="233640"/>
+            <a:off x="9599760" y="3298680"/>
+            <a:ext cx="459000" cy="233280"/>
           </a:xfrm>
           <a:prstGeom prst="straightConnector1">
             <a:avLst/>
@@ -14990,17 +14954,17 @@
       </p:cxnSp>
       <p:cxnSp>
         <p:nvCxnSpPr>
-          <p:cNvPr id="254" name="Straight Arrow Connector 39"/>
+          <p:cNvPr id="253" name="Straight Arrow Connector 39"/>
           <p:cNvCxnSpPr>
-            <a:stCxn id="233" idx="0"/>
-            <a:endCxn id="237" idx="2"/>
+            <a:stCxn id="232" idx="0"/>
+            <a:endCxn id="236" idx="2"/>
           </p:cNvCxnSpPr>
           <p:nvPr/>
         </p:nvCxnSpPr>
         <p:spPr>
           <a:xfrm flipH="1" flipV="1">
-            <a:off x="10758600" y="1757160"/>
-            <a:ext cx="112320" cy="726120"/>
+            <a:off x="10758240" y="1756800"/>
+            <a:ext cx="112320" cy="726480"/>
           </a:xfrm>
           <a:prstGeom prst="straightConnector1">
             <a:avLst/>
@@ -15015,14 +14979,14 @@
       </p:cxnSp>
       <p:sp>
         <p:nvSpPr>
-          <p:cNvPr id="255" name="Diamond 29"/>
+          <p:cNvPr id="254" name="Diamond 29"/>
           <p:cNvSpPr/>
           <p:nvPr/>
         </p:nvSpPr>
         <p:spPr>
           <a:xfrm>
             <a:off x="3657600" y="4343400"/>
-            <a:ext cx="1827720" cy="385560"/>
+            <a:ext cx="1827360" cy="385200"/>
           </a:xfrm>
           <a:prstGeom prst="diamond">
             <a:avLst/>
@@ -15080,17 +15044,17 @@
       </p:sp>
       <p:cxnSp>
         <p:nvCxnSpPr>
-          <p:cNvPr id="256" name="Straight Arrow Connector 72"/>
+          <p:cNvPr id="255" name="Straight Arrow Connector 72"/>
           <p:cNvCxnSpPr>
-            <a:stCxn id="222" idx="1"/>
-            <a:endCxn id="255" idx="0"/>
+            <a:stCxn id="221" idx="1"/>
+            <a:endCxn id="254" idx="0"/>
           </p:cNvCxnSpPr>
           <p:nvPr/>
         </p:nvCxnSpPr>
         <p:spPr>
           <a:xfrm flipH="1">
-            <a:off x="4571640" y="3589200"/>
-            <a:ext cx="1143720" cy="754560"/>
+            <a:off x="4571280" y="3589200"/>
+            <a:ext cx="1144080" cy="754560"/>
           </a:xfrm>
           <a:prstGeom prst="straightConnector1">
             <a:avLst/>
@@ -15105,17 +15069,105 @@
       </p:cxnSp>
       <p:cxnSp>
         <p:nvCxnSpPr>
-          <p:cNvPr id="257" name="Straight Arrow Connector 73"/>
+          <p:cNvPr id="256" name="Straight Arrow Connector 73"/>
           <p:cNvCxnSpPr>
-            <a:stCxn id="222" idx="2"/>
-            <a:endCxn id="255" idx="3"/>
+            <a:stCxn id="221" idx="2"/>
+            <a:endCxn id="254" idx="3"/>
           </p:cNvCxnSpPr>
           <p:nvPr/>
         </p:nvCxnSpPr>
         <p:spPr>
           <a:xfrm flipH="1">
-            <a:off x="5485320" y="3978360"/>
-            <a:ext cx="1042200" cy="558360"/>
+            <a:off x="5484960" y="3978360"/>
+            <a:ext cx="1042200" cy="558000"/>
+          </a:xfrm>
+          <a:prstGeom prst="straightConnector1">
+            <a:avLst/>
+          </a:prstGeom>
+          <a:ln w="25400">
+            <a:solidFill>
+              <a:srgbClr val="000000"/>
+            </a:solidFill>
+            <a:round/>
+          </a:ln>
+        </p:spPr>
+      </p:cxnSp>
+      <p:sp>
+        <p:nvSpPr>
+          <p:cNvPr id="257" name="Oval 9"/>
+          <p:cNvSpPr/>
+          <p:nvPr/>
+        </p:nvSpPr>
+        <p:spPr>
+          <a:xfrm>
+            <a:off x="7315200" y="4114800"/>
+            <a:ext cx="1677960" cy="385200"/>
+          </a:xfrm>
+          <a:prstGeom prst="ellipse">
+            <a:avLst/>
+          </a:prstGeom>
+          <a:noFill/>
+          <a:ln>
+            <a:solidFill>
+              <a:srgbClr val="000000"/>
+            </a:solidFill>
+          </a:ln>
+        </p:spPr>
+        <p:style>
+          <a:lnRef idx="2">
+            <a:schemeClr val="accent1">
+              <a:shade val="50000"/>
+            </a:schemeClr>
+          </a:lnRef>
+          <a:fillRef idx="1">
+            <a:schemeClr val="accent1"/>
+          </a:fillRef>
+          <a:effectRef idx="0">
+            <a:schemeClr val="accent1"/>
+          </a:effectRef>
+          <a:fontRef idx="minor"/>
+        </p:style>
+        <p:txBody>
+          <a:bodyPr lIns="90000" rIns="90000" tIns="45000" bIns="45000" anchor="ctr">
+            <a:noAutofit/>
+          </a:bodyPr>
+          <a:p>
+            <a:pPr algn="ctr" defTabSz="914400">
+              <a:lnSpc>
+                <a:spcPct val="100000"/>
+              </a:lnSpc>
+            </a:pPr>
+            <a:r>
+              <a:rPr b="0" lang="en-US" sz="1410" spc="-1" strike="noStrike">
+                <a:solidFill>
+                  <a:schemeClr val="dk1"/>
+                </a:solidFill>
+                <a:latin typeface="Calibri"/>
+              </a:rPr>
+              <a:t>Amount</a:t>
+            </a:r>
+            <a:endParaRPr b="0" lang="en-US" sz="1410" spc="-1" strike="noStrike">
+              <a:solidFill>
+                <a:srgbClr val="000000"/>
+              </a:solidFill>
+              <a:latin typeface="Arial"/>
+            </a:endParaRPr>
+          </a:p>
+        </p:txBody>
+      </p:sp>
+      <p:cxnSp>
+        <p:nvCxnSpPr>
+          <p:cNvPr id="258" name="Straight Arrow Connector 58"/>
+          <p:cNvCxnSpPr>
+            <a:stCxn id="227" idx="1"/>
+            <a:endCxn id="257" idx="6"/>
+          </p:cNvCxnSpPr>
+          <p:nvPr/>
+        </p:nvCxnSpPr>
+        <p:spPr>
+          <a:xfrm flipH="1" flipV="1">
+            <a:off x="8993160" y="4307400"/>
+            <a:ext cx="409320" cy="457560"/>
           </a:xfrm>
           <a:prstGeom prst="straightConnector1">
             <a:avLst/>
@@ -15160,14 +15212,14 @@
       </p:grpSpPr>
       <p:cxnSp>
         <p:nvCxnSpPr>
-          <p:cNvPr id="258" name="Straight Arrow Connector 6"/>
+          <p:cNvPr id="259" name="Straight Arrow Connector 6"/>
           <p:cNvCxnSpPr/>
           <p:nvPr/>
         </p:nvCxnSpPr>
         <p:spPr>
           <a:xfrm flipH="1">
             <a:off x="0" y="3073320"/>
-            <a:ext cx="1830960" cy="2160"/>
+            <a:ext cx="1831320" cy="2520"/>
           </a:xfrm>
           <a:prstGeom prst="straightConnector1">
             <a:avLst/>
@@ -15183,14 +15235,14 @@
       </p:cxnSp>
       <p:cxnSp>
         <p:nvCxnSpPr>
-          <p:cNvPr id="259" name="Straight Arrow Connector 7"/>
+          <p:cNvPr id="260" name="Straight Arrow Connector 7"/>
           <p:cNvCxnSpPr/>
           <p:nvPr/>
         </p:nvCxnSpPr>
         <p:spPr>
           <a:xfrm>
             <a:off x="0" y="2489400"/>
-            <a:ext cx="1830960" cy="2160"/>
+            <a:ext cx="1831320" cy="2520"/>
           </a:xfrm>
           <a:prstGeom prst="straightConnector1">
             <a:avLst/>
@@ -15206,14 +15258,14 @@
       </p:cxnSp>
       <p:cxnSp>
         <p:nvCxnSpPr>
-          <p:cNvPr id="260" name="Straight Arrow Connector 8"/>
+          <p:cNvPr id="261" name="Straight Arrow Connector 8"/>
           <p:cNvCxnSpPr/>
           <p:nvPr/>
         </p:nvCxnSpPr>
         <p:spPr>
           <a:xfrm>
             <a:off x="0" y="2781360"/>
-            <a:ext cx="1830960" cy="2160"/>
+            <a:ext cx="1831320" cy="2520"/>
           </a:xfrm>
           <a:prstGeom prst="straightConnector1">
             <a:avLst/>
@@ -15229,14 +15281,14 @@
       </p:cxnSp>
       <p:cxnSp>
         <p:nvCxnSpPr>
-          <p:cNvPr id="261" name="Straight Arrow Connector 9"/>
+          <p:cNvPr id="262" name="Straight Arrow Connector 9"/>
           <p:cNvCxnSpPr/>
           <p:nvPr/>
         </p:nvCxnSpPr>
         <p:spPr>
           <a:xfrm flipH="1">
             <a:off x="0" y="3657600"/>
-            <a:ext cx="1830960" cy="2160"/>
+            <a:ext cx="1831320" cy="2520"/>
           </a:xfrm>
           <a:prstGeom prst="straightConnector1">
             <a:avLst/>
@@ -15251,14 +15303,14 @@
       </p:cxnSp>
       <p:sp>
         <p:nvSpPr>
-          <p:cNvPr id="262" name="Diamond 3"/>
+          <p:cNvPr id="263" name="Diamond 3"/>
           <p:cNvSpPr/>
           <p:nvPr/>
         </p:nvSpPr>
         <p:spPr>
           <a:xfrm>
             <a:off x="128520" y="6134040"/>
-            <a:ext cx="1569600" cy="385560"/>
+            <a:ext cx="1569240" cy="385200"/>
           </a:xfrm>
           <a:prstGeom prst="diamond">
             <a:avLst/>
@@ -15316,14 +15368,14 @@
       </p:sp>
       <p:sp>
         <p:nvSpPr>
-          <p:cNvPr id="263" name="Oval 2"/>
+          <p:cNvPr id="264" name="Oval 2"/>
           <p:cNvSpPr/>
           <p:nvPr/>
         </p:nvSpPr>
         <p:spPr>
           <a:xfrm>
             <a:off x="302760" y="5454000"/>
-            <a:ext cx="1221120" cy="385560"/>
+            <a:ext cx="1220760" cy="385200"/>
           </a:xfrm>
           <a:prstGeom prst="ellipse">
             <a:avLst/>
@@ -15379,28 +15431,28 @@
       </p:sp>
       <p:grpSp>
         <p:nvGrpSpPr>
-          <p:cNvPr id="264" name="Group 3"/>
+          <p:cNvPr id="265" name="Group 3"/>
           <p:cNvGrpSpPr/>
           <p:nvPr/>
         </p:nvGrpSpPr>
         <p:grpSpPr>
           <a:xfrm>
             <a:off x="101160" y="336240"/>
-            <a:ext cx="1624320" cy="777960"/>
+            <a:ext cx="1623960" cy="777960"/>
             <a:chOff x="101160" y="336240"/>
-            <a:chExt cx="1624320" cy="777960"/>
+            <a:chExt cx="1623960" cy="777960"/>
           </a:xfrm>
         </p:grpSpPr>
         <p:sp>
           <p:nvSpPr>
-            <p:cNvPr id="265" name="TextBox 5"/>
+            <p:cNvPr id="266" name="TextBox 5"/>
             <p:cNvSpPr/>
             <p:nvPr/>
           </p:nvSpPr>
           <p:spPr>
             <a:xfrm>
               <a:off x="101160" y="336240"/>
-              <a:ext cx="1624320" cy="303120"/>
+              <a:ext cx="1623960" cy="303120"/>
             </a:xfrm>
             <a:prstGeom prst="rect">
               <a:avLst/>
@@ -15450,14 +15502,14 @@
         </p:sp>
         <p:sp>
           <p:nvSpPr>
-            <p:cNvPr id="266" name="TextBox 6"/>
+            <p:cNvPr id="267" name="TextBox 6"/>
             <p:cNvSpPr/>
             <p:nvPr/>
           </p:nvSpPr>
           <p:spPr>
             <a:xfrm>
               <a:off x="101160" y="597600"/>
-              <a:ext cx="1624320" cy="516600"/>
+              <a:ext cx="1623960" cy="516600"/>
             </a:xfrm>
             <a:prstGeom prst="rect">
               <a:avLst/>
@@ -15541,14 +15593,14 @@
       </p:grpSp>
       <p:sp>
         <p:nvSpPr>
-          <p:cNvPr id="267" name="Diamond 4"/>
+          <p:cNvPr id="268" name="Diamond 4"/>
           <p:cNvSpPr/>
           <p:nvPr/>
         </p:nvSpPr>
         <p:spPr>
           <a:xfrm>
             <a:off x="128520" y="4629600"/>
-            <a:ext cx="1569600" cy="530280"/>
+            <a:ext cx="1569240" cy="529920"/>
           </a:xfrm>
           <a:prstGeom prst="diamond">
             <a:avLst/>
@@ -15629,14 +15681,14 @@
       </p:sp>
       <p:cxnSp>
         <p:nvCxnSpPr>
-          <p:cNvPr id="268" name="Straight Arrow Connector 10"/>
+          <p:cNvPr id="269" name="Straight Arrow Connector 10"/>
           <p:cNvCxnSpPr/>
           <p:nvPr/>
         </p:nvCxnSpPr>
         <p:spPr>
           <a:xfrm>
             <a:off x="0" y="3365640"/>
-            <a:ext cx="1830960" cy="2160"/>
+            <a:ext cx="1831320" cy="2520"/>
           </a:xfrm>
           <a:prstGeom prst="straightConnector1">
             <a:avLst/>
@@ -15651,14 +15703,14 @@
       </p:cxnSp>
       <p:sp>
         <p:nvSpPr>
-          <p:cNvPr id="269" name="Isosceles Triangle 2"/>
+          <p:cNvPr id="270" name="Isosceles Triangle 2"/>
           <p:cNvSpPr/>
           <p:nvPr/>
         </p:nvSpPr>
         <p:spPr>
           <a:xfrm>
             <a:off x="673200" y="3949920"/>
-            <a:ext cx="480600" cy="385560"/>
+            <a:ext cx="480240" cy="385200"/>
           </a:xfrm>
           <a:prstGeom prst="triangle">
             <a:avLst>
@@ -15718,28 +15770,28 @@
       </p:sp>
       <p:grpSp>
         <p:nvGrpSpPr>
-          <p:cNvPr id="270" name="Group 4"/>
+          <p:cNvPr id="271" name="Group 4"/>
           <p:cNvGrpSpPr/>
           <p:nvPr/>
         </p:nvGrpSpPr>
         <p:grpSpPr>
           <a:xfrm>
             <a:off x="101160" y="1413000"/>
-            <a:ext cx="1624320" cy="777960"/>
+            <a:ext cx="1623960" cy="777960"/>
             <a:chOff x="101160" y="1413000"/>
-            <a:chExt cx="1624320" cy="777960"/>
+            <a:chExt cx="1623960" cy="777960"/>
           </a:xfrm>
         </p:grpSpPr>
         <p:sp>
           <p:nvSpPr>
-            <p:cNvPr id="271" name="TextBox 7"/>
+            <p:cNvPr id="272" name="TextBox 7"/>
             <p:cNvSpPr/>
             <p:nvPr/>
           </p:nvSpPr>
           <p:spPr>
             <a:xfrm>
               <a:off x="101160" y="1413000"/>
-              <a:ext cx="1624320" cy="303120"/>
+              <a:ext cx="1623960" cy="303120"/>
             </a:xfrm>
             <a:prstGeom prst="rect">
               <a:avLst/>
@@ -15790,14 +15842,14 @@
         </p:sp>
         <p:sp>
           <p:nvSpPr>
-            <p:cNvPr id="272" name="TextBox 8"/>
+            <p:cNvPr id="273" name="TextBox 8"/>
             <p:cNvSpPr/>
             <p:nvPr/>
           </p:nvSpPr>
           <p:spPr>
             <a:xfrm>
               <a:off x="101160" y="1674360"/>
-              <a:ext cx="1624320" cy="516600"/>
+              <a:ext cx="1623960" cy="516600"/>
             </a:xfrm>
             <a:prstGeom prst="rect">
               <a:avLst/>
@@ -15882,28 +15934,28 @@
       </p:grpSp>
       <p:grpSp>
         <p:nvGrpSpPr>
-          <p:cNvPr id="273" name="Group 5"/>
+          <p:cNvPr id="274" name="Group 5"/>
           <p:cNvGrpSpPr/>
           <p:nvPr/>
         </p:nvGrpSpPr>
         <p:grpSpPr>
           <a:xfrm>
             <a:off x="4089240" y="885600"/>
-            <a:ext cx="1852920" cy="2070360"/>
+            <a:ext cx="1852560" cy="2070360"/>
             <a:chOff x="4089240" y="885600"/>
-            <a:chExt cx="1852920" cy="2070360"/>
+            <a:chExt cx="1852560" cy="2070360"/>
           </a:xfrm>
         </p:grpSpPr>
         <p:sp>
           <p:nvSpPr>
-            <p:cNvPr id="274" name="TextBox 22"/>
+            <p:cNvPr id="275" name="TextBox 22"/>
             <p:cNvSpPr/>
             <p:nvPr/>
           </p:nvSpPr>
           <p:spPr>
             <a:xfrm>
               <a:off x="4089240" y="885600"/>
-              <a:ext cx="1852920" cy="303120"/>
+              <a:ext cx="1852560" cy="303120"/>
             </a:xfrm>
             <a:prstGeom prst="rect">
               <a:avLst/>
@@ -15953,14 +16005,14 @@
         </p:sp>
         <p:sp>
           <p:nvSpPr>
-            <p:cNvPr id="275" name="TextBox 29"/>
+            <p:cNvPr id="276" name="TextBox 29"/>
             <p:cNvSpPr/>
             <p:nvPr/>
           </p:nvSpPr>
           <p:spPr>
             <a:xfrm>
               <a:off x="4089240" y="1158480"/>
-              <a:ext cx="1852920" cy="1797480"/>
+              <a:ext cx="1852560" cy="1797480"/>
             </a:xfrm>
             <a:prstGeom prst="rect">
               <a:avLst/>

</xml_diff>

<commit_message>
Made the Diagram a little more vissualy appealing
</commit_message>
<xml_diff>
--- a/documentation/Database Design.pptx
+++ b/documentation/Database Design.pptx
@@ -71,7 +71,43 @@
                 </a:solidFill>
                 <a:latin typeface="Arial"/>
               </a:rPr>
-              <a:t>Click to move the slide</a:t>
+              <a:t>Click </a:t>
+            </a:r>
+            <a:r>
+              <a:rPr b="0" lang="en-US" sz="4400" spc="-1" strike="noStrike">
+                <a:solidFill>
+                  <a:srgbClr val="000000"/>
+                </a:solidFill>
+                <a:latin typeface="Arial"/>
+              </a:rPr>
+              <a:t>to </a:t>
+            </a:r>
+            <a:r>
+              <a:rPr b="0" lang="en-US" sz="4400" spc="-1" strike="noStrike">
+                <a:solidFill>
+                  <a:srgbClr val="000000"/>
+                </a:solidFill>
+                <a:latin typeface="Arial"/>
+              </a:rPr>
+              <a:t>move </a:t>
+            </a:r>
+            <a:r>
+              <a:rPr b="0" lang="en-US" sz="4400" spc="-1" strike="noStrike">
+                <a:solidFill>
+                  <a:srgbClr val="000000"/>
+                </a:solidFill>
+                <a:latin typeface="Arial"/>
+              </a:rPr>
+              <a:t>the </a:t>
+            </a:r>
+            <a:r>
+              <a:rPr b="0" lang="en-US" sz="4400" spc="-1" strike="noStrike">
+                <a:solidFill>
+                  <a:srgbClr val="000000"/>
+                </a:solidFill>
+                <a:latin typeface="Arial"/>
+              </a:rPr>
+              <a:t>slide</a:t>
             </a:r>
             <a:endParaRPr b="0" lang="en-US" sz="4400" spc="-1" strike="noStrike">
               <a:solidFill>
@@ -120,7 +156,25 @@
                 </a:solidFill>
                 <a:latin typeface="Arial"/>
               </a:rPr>
-              <a:t>Click to edit the notes format</a:t>
+              <a:t>Click to edit </a:t>
+            </a:r>
+            <a:r>
+              <a:rPr b="0" lang="en-US" sz="2000" spc="-1" strike="noStrike">
+                <a:solidFill>
+                  <a:srgbClr val="000000"/>
+                </a:solidFill>
+                <a:latin typeface="Arial"/>
+              </a:rPr>
+              <a:t>the notes </a:t>
+            </a:r>
+            <a:r>
+              <a:rPr b="0" lang="en-US" sz="2000" spc="-1" strike="noStrike">
+                <a:solidFill>
+                  <a:srgbClr val="000000"/>
+                </a:solidFill>
+                <a:latin typeface="Arial"/>
+              </a:rPr>
+              <a:t>format</a:t>
             </a:r>
             <a:endParaRPr b="0" lang="en-US" sz="2000" spc="-1" strike="noStrike">
               <a:solidFill>
@@ -342,7 +396,7 @@
             <a:pPr indent="0" algn="r">
               <a:buNone/>
             </a:pPr>
-            <a:fld id="{94E36001-2D8E-4055-AFE5-C691EDE18371}" type="slidenum">
+            <a:fld id="{19214865-96FE-4E28-9A5F-E5F87E37A0BC}" type="slidenum">
               <a:rPr b="0" lang="en-US" sz="1400" spc="-1" strike="noStrike">
                 <a:solidFill>
                   <a:srgbClr val="000000"/>
@@ -385,7 +439,7 @@
       </p:grpSpPr>
       <p:sp>
         <p:nvSpPr>
-          <p:cNvPr id="277" name="PlaceHolder 1"/>
+          <p:cNvPr id="276" name="PlaceHolder 1"/>
           <p:cNvSpPr>
             <a:spLocks noGrp="1"/>
           </p:cNvSpPr>
@@ -408,7 +462,7 @@
       </p:sp>
       <p:sp>
         <p:nvSpPr>
-          <p:cNvPr id="278" name="PlaceHolder 2"/>
+          <p:cNvPr id="277" name="PlaceHolder 2"/>
           <p:cNvSpPr>
             <a:spLocks noGrp="1"/>
           </p:cNvSpPr>
@@ -448,7 +502,7 @@
       </p:sp>
       <p:sp>
         <p:nvSpPr>
-          <p:cNvPr id="279" name="PlaceHolder 3"/>
+          <p:cNvPr id="278" name="PlaceHolder 3"/>
           <p:cNvSpPr>
             <a:spLocks noGrp="1"/>
           </p:cNvSpPr>
@@ -501,7 +555,7 @@
                 <a:tab algn="l" pos="0"/>
               </a:tabLst>
             </a:pPr>
-            <a:fld id="{2EF3F997-A115-4D24-AF98-514885E67761}" type="slidenum">
+            <a:fld id="{2CBA7338-C5C1-4318-A803-4DE136ED9486}" type="slidenum">
               <a:rPr b="0" lang="en-US" sz="1200" spc="-1" strike="noStrike">
                 <a:solidFill>
                   <a:schemeClr val="dk1"/>
@@ -544,7 +598,7 @@
       </p:grpSpPr>
       <p:sp>
         <p:nvSpPr>
-          <p:cNvPr id="280" name="PlaceHolder 1"/>
+          <p:cNvPr id="279" name="PlaceHolder 1"/>
           <p:cNvSpPr>
             <a:spLocks noGrp="1"/>
           </p:cNvSpPr>
@@ -567,7 +621,7 @@
       </p:sp>
       <p:sp>
         <p:nvSpPr>
-          <p:cNvPr id="281" name="PlaceHolder 2"/>
+          <p:cNvPr id="280" name="PlaceHolder 2"/>
           <p:cNvSpPr>
             <a:spLocks noGrp="1"/>
           </p:cNvSpPr>
@@ -607,7 +661,7 @@
       </p:sp>
       <p:sp>
         <p:nvSpPr>
-          <p:cNvPr id="282" name="PlaceHolder 3"/>
+          <p:cNvPr id="281" name="PlaceHolder 3"/>
           <p:cNvSpPr>
             <a:spLocks noGrp="1"/>
           </p:cNvSpPr>
@@ -660,7 +714,7 @@
                 <a:tab algn="l" pos="0"/>
               </a:tabLst>
             </a:pPr>
-            <a:fld id="{97CDABAE-55A7-41F6-B538-83605A45BA37}" type="slidenum">
+            <a:fld id="{5779E28B-ED7B-4C1D-A2FC-2721BB40B028}" type="slidenum">
               <a:rPr b="0" lang="en-US" sz="1200" spc="-1" strike="noStrike">
                 <a:solidFill>
                   <a:schemeClr val="dk1"/>
@@ -703,7 +757,7 @@
       </p:grpSpPr>
       <p:sp>
         <p:nvSpPr>
-          <p:cNvPr id="283" name="PlaceHolder 1"/>
+          <p:cNvPr id="282" name="PlaceHolder 1"/>
           <p:cNvSpPr>
             <a:spLocks noGrp="1"/>
           </p:cNvSpPr>
@@ -726,7 +780,7 @@
       </p:sp>
       <p:sp>
         <p:nvSpPr>
-          <p:cNvPr id="284" name="PlaceHolder 2"/>
+          <p:cNvPr id="283" name="PlaceHolder 2"/>
           <p:cNvSpPr>
             <a:spLocks noGrp="1"/>
           </p:cNvSpPr>
@@ -766,7 +820,7 @@
       </p:sp>
       <p:sp>
         <p:nvSpPr>
-          <p:cNvPr id="285" name="PlaceHolder 3"/>
+          <p:cNvPr id="284" name="PlaceHolder 3"/>
           <p:cNvSpPr>
             <a:spLocks noGrp="1"/>
           </p:cNvSpPr>
@@ -819,7 +873,7 @@
                 <a:tab algn="l" pos="0"/>
               </a:tabLst>
             </a:pPr>
-            <a:fld id="{B4FC46B9-E0C5-43A7-BCF7-A0E004EADD98}" type="slidenum">
+            <a:fld id="{4582C4C1-9304-487F-8DB1-6CA34C1A4FD9}" type="slidenum">
               <a:rPr b="0" lang="en-US" sz="1200" spc="-1" strike="noStrike">
                 <a:solidFill>
                   <a:schemeClr val="dk1"/>
@@ -862,7 +916,7 @@
       </p:grpSpPr>
       <p:sp>
         <p:nvSpPr>
-          <p:cNvPr id="286" name="PlaceHolder 1"/>
+          <p:cNvPr id="285" name="PlaceHolder 1"/>
           <p:cNvSpPr>
             <a:spLocks noGrp="1"/>
           </p:cNvSpPr>
@@ -885,7 +939,7 @@
       </p:sp>
       <p:sp>
         <p:nvSpPr>
-          <p:cNvPr id="287" name="PlaceHolder 2"/>
+          <p:cNvPr id="286" name="PlaceHolder 2"/>
           <p:cNvSpPr>
             <a:spLocks noGrp="1"/>
           </p:cNvSpPr>
@@ -925,7 +979,7 @@
       </p:sp>
       <p:sp>
         <p:nvSpPr>
-          <p:cNvPr id="288" name="PlaceHolder 3"/>
+          <p:cNvPr id="287" name="PlaceHolder 3"/>
           <p:cNvSpPr>
             <a:spLocks noGrp="1"/>
           </p:cNvSpPr>
@@ -978,7 +1032,7 @@
                 <a:tab algn="l" pos="0"/>
               </a:tabLst>
             </a:pPr>
-            <a:fld id="{56802E33-0C96-4FBF-A01A-3166B4355AD8}" type="slidenum">
+            <a:fld id="{26EA503C-AD49-419D-B563-4D7E181C7BCD}" type="slidenum">
               <a:rPr b="0" lang="en-US" sz="1200" spc="-1" strike="noStrike">
                 <a:solidFill>
                   <a:schemeClr val="dk1"/>
@@ -1053,7 +1107,7 @@
         <p:txBody>
           <a:bodyPr/>
           <a:p>
-            <a:fld id="{114551AE-3135-446F-8AE5-4B2124DCAB0C}" type="slidenum">
+            <a:fld id="{4D4A8B6D-B95C-410E-BFF3-EBEBA43C4F43}" type="slidenum">
               <a:t>&lt;#&gt;</a:t>
             </a:fld>
           </a:p>
@@ -1262,7 +1316,7 @@
         <p:txBody>
           <a:bodyPr/>
           <a:p>
-            <a:fld id="{60C29D11-8088-4711-A3CB-5CE03B4BB7CB}" type="slidenum">
+            <a:fld id="{CF740611-C4FF-4739-A895-0AABCE218351}" type="slidenum">
               <a:t>&lt;#&gt;</a:t>
             </a:fld>
           </a:p>
@@ -1557,7 +1611,7 @@
         <p:txBody>
           <a:bodyPr/>
           <a:p>
-            <a:fld id="{AF0D271E-5E80-4C7E-A95F-6AB60031DF9E}" type="slidenum">
+            <a:fld id="{0E225103-C784-419E-96DC-07C15F7D674E}" type="slidenum">
               <a:t>&lt;#&gt;</a:t>
             </a:fld>
           </a:p>
@@ -1938,7 +1992,7 @@
         <p:txBody>
           <a:bodyPr/>
           <a:p>
-            <a:fld id="{77310E96-5347-448E-8EC5-372A839C32AD}" type="slidenum">
+            <a:fld id="{E7CFFD13-B777-4776-9550-4CC6F2DCCE24}" type="slidenum">
               <a:t>&lt;#&gt;</a:t>
             </a:fld>
           </a:p>
@@ -2101,7 +2155,7 @@
         <p:txBody>
           <a:bodyPr/>
           <a:p>
-            <a:fld id="{DB023E8E-CCBE-4A6B-A766-7B020AE05BC1}" type="slidenum">
+            <a:fld id="{6A2D946C-BEE1-4DED-BB50-CCF8373391B1}" type="slidenum">
               <a:t>&lt;#&gt;</a:t>
             </a:fld>
           </a:p>
@@ -2267,7 +2321,7 @@
         <p:txBody>
           <a:bodyPr/>
           <a:p>
-            <a:fld id="{28A82B62-1A16-4439-92F2-636448A41624}" type="slidenum">
+            <a:fld id="{7952FECD-8777-482A-84F3-FF34E85A61F0}" type="slidenum">
               <a:t>&lt;#&gt;</a:t>
             </a:fld>
           </a:p>
@@ -2476,7 +2530,7 @@
         <p:txBody>
           <a:bodyPr/>
           <a:p>
-            <a:fld id="{A7BF43D1-2853-4B81-ABF1-FB1DCC06A941}" type="slidenum">
+            <a:fld id="{5D75EA4B-DD62-40CE-ACF9-7E77681E6E7A}" type="slidenum">
               <a:t>&lt;#&gt;</a:t>
             </a:fld>
           </a:p>
@@ -2599,7 +2653,7 @@
         <p:txBody>
           <a:bodyPr/>
           <a:p>
-            <a:fld id="{7B99A9C3-EA87-41C7-90C0-676D759353DB}" type="slidenum">
+            <a:fld id="{D932476D-C86C-413D-9CF9-2C36325F0A52}" type="slidenum">
               <a:t>&lt;#&gt;</a:t>
             </a:fld>
           </a:p>
@@ -2720,7 +2774,7 @@
         <p:txBody>
           <a:bodyPr/>
           <a:p>
-            <a:fld id="{1C1D8BF8-559B-48E4-8487-1FCEA1BF276D}" type="slidenum">
+            <a:fld id="{4F073223-E361-4641-8AAE-03DC86099D11}" type="slidenum">
               <a:t>&lt;#&gt;</a:t>
             </a:fld>
           </a:p>
@@ -2972,7 +3026,7 @@
         <p:txBody>
           <a:bodyPr/>
           <a:p>
-            <a:fld id="{12D07B1D-B61C-4C70-B818-050AC07A62B1}" type="slidenum">
+            <a:fld id="{5BF69484-1C81-4BEA-A348-38601189A9BF}" type="slidenum">
               <a:t>&lt;#&gt;</a:t>
             </a:fld>
           </a:p>
@@ -3224,7 +3278,7 @@
         <p:txBody>
           <a:bodyPr/>
           <a:p>
-            <a:fld id="{8A5276FE-B525-4B6E-9562-45779AE7A137}" type="slidenum">
+            <a:fld id="{40E17DFE-4636-4DF3-84C9-450106A2C0FA}" type="slidenum">
               <a:t>&lt;#&gt;</a:t>
             </a:fld>
           </a:p>
@@ -3476,7 +3530,7 @@
         <p:txBody>
           <a:bodyPr/>
           <a:p>
-            <a:fld id="{7CD022DD-C551-4693-ABFD-8CF59862E282}" type="slidenum">
+            <a:fld id="{99D4D5B9-E769-4A0B-9373-A7963F52D4E7}" type="slidenum">
               <a:t>&lt;#&gt;</a:t>
             </a:fld>
           </a:p>
@@ -3631,7 +3685,25 @@
                 </a:solidFill>
                 <a:latin typeface="Arial"/>
               </a:rPr>
-              <a:t>Click to edit the title text format</a:t>
+              <a:t>Click to edit </a:t>
+            </a:r>
+            <a:r>
+              <a:rPr b="0" lang="en-US" sz="1800" spc="-1" strike="noStrike">
+                <a:solidFill>
+                  <a:srgbClr val="000000"/>
+                </a:solidFill>
+                <a:latin typeface="Arial"/>
+              </a:rPr>
+              <a:t>the title text </a:t>
+            </a:r>
+            <a:r>
+              <a:rPr b="0" lang="en-US" sz="1800" spc="-1" strike="noStrike">
+                <a:solidFill>
+                  <a:srgbClr val="000000"/>
+                </a:solidFill>
+                <a:latin typeface="Arial"/>
+              </a:rPr>
+              <a:t>format</a:t>
             </a:r>
             <a:endParaRPr b="0" lang="en-US" sz="1800" spc="-1" strike="noStrike">
               <a:solidFill>
@@ -4445,7 +4517,7 @@
                 <a:tab algn="l" pos="0"/>
               </a:tabLst>
             </a:pPr>
-            <a:fld id="{3E547995-03C9-4C39-963A-9058221B37C9}" type="slidenum">
+            <a:fld id="{CB238C96-1A44-46E3-AE2B-7B674389ED69}" type="slidenum">
               <a:rPr b="0" lang="en-US" sz="1200" spc="-1" strike="noStrike">
                 <a:solidFill>
                   <a:schemeClr val="dk1">
@@ -5083,7 +5155,7 @@
         </p:nvSpPr>
         <p:spPr>
           <a:xfrm>
-            <a:off x="2489040" y="0"/>
+            <a:off x="2541600" y="228600"/>
             <a:ext cx="1623960" cy="303120"/>
           </a:xfrm>
           <a:prstGeom prst="rect">
@@ -5140,8 +5212,8 @@
         </p:nvSpPr>
         <p:spPr>
           <a:xfrm>
-            <a:off x="2489040" y="261360"/>
-            <a:ext cx="1623960" cy="1157040"/>
+            <a:off x="2541600" y="489960"/>
+            <a:ext cx="1623960" cy="1370520"/>
           </a:xfrm>
           <a:prstGeom prst="rect">
             <a:avLst/>
@@ -5301,6 +5373,33 @@
               <a:latin typeface="Arial"/>
             </a:endParaRPr>
           </a:p>
+          <a:p>
+            <a:pPr marL="304920" indent="-304920" defTabSz="914400">
+              <a:lnSpc>
+                <a:spcPct val="100000"/>
+              </a:lnSpc>
+              <a:buClr>
+                <a:srgbClr val="000000"/>
+              </a:buClr>
+              <a:buFont typeface="OpenSymbol"/>
+              <a:buChar char="-"/>
+            </a:pPr>
+            <a:r>
+              <a:rPr b="0" lang="en-US" sz="1400" spc="-1" strike="noStrike">
+                <a:solidFill>
+                  <a:schemeClr val="dk1"/>
+                </a:solidFill>
+                <a:latin typeface="Calibri"/>
+              </a:rPr>
+              <a:t>Level</a:t>
+            </a:r>
+            <a:endParaRPr b="0" lang="en-US" sz="1400" spc="-1" strike="noStrike">
+              <a:solidFill>
+                <a:srgbClr val="000000"/>
+              </a:solidFill>
+              <a:latin typeface="Arial"/>
+            </a:endParaRPr>
+          </a:p>
         </p:txBody>
       </p:sp>
       <p:sp>
@@ -5311,7 +5410,7 @@
         </p:nvSpPr>
         <p:spPr>
           <a:xfrm>
-            <a:off x="6603840" y="0"/>
+            <a:off x="6656400" y="228600"/>
             <a:ext cx="1623960" cy="303120"/>
           </a:xfrm>
           <a:prstGeom prst="rect">
@@ -5368,7 +5467,7 @@
         </p:nvSpPr>
         <p:spPr>
           <a:xfrm>
-            <a:off x="6603840" y="261360"/>
+            <a:off x="6656400" y="489960"/>
             <a:ext cx="1623960" cy="516600"/>
           </a:xfrm>
           <a:prstGeom prst="rect">
@@ -5458,7 +5557,7 @@
         </p:nvSpPr>
         <p:spPr>
           <a:xfrm>
-            <a:off x="6603840" y="0"/>
+            <a:off x="6656400" y="228600"/>
             <a:ext cx="1623960" cy="303120"/>
           </a:xfrm>
           <a:prstGeom prst="rect">
@@ -5515,7 +5614,7 @@
         </p:nvSpPr>
         <p:spPr>
           <a:xfrm>
-            <a:off x="6603840" y="261360"/>
+            <a:off x="6656400" y="489960"/>
             <a:ext cx="1623960" cy="730080"/>
           </a:xfrm>
           <a:prstGeom prst="rect">
@@ -5973,7 +6072,7 @@
         </p:nvSpPr>
         <p:spPr>
           <a:xfrm>
-            <a:off x="4372560" y="345960"/>
+            <a:off x="4426920" y="914400"/>
             <a:ext cx="1569240" cy="385200"/>
           </a:xfrm>
           <a:prstGeom prst="diamond">
@@ -6040,9 +6139,9 @@
           <p:nvPr/>
         </p:nvCxnSpPr>
         <p:spPr>
-          <a:xfrm flipH="1" flipV="1">
-            <a:off x="5941800" y="538560"/>
-            <a:ext cx="662400" cy="88200"/>
+          <a:xfrm flipH="1">
+            <a:off x="5996160" y="855000"/>
+            <a:ext cx="660600" cy="252360"/>
           </a:xfrm>
           <a:prstGeom prst="straightConnector1">
             <a:avLst/>
@@ -6064,7 +6163,7 @@
         </p:nvSpPr>
         <p:spPr>
           <a:xfrm>
-            <a:off x="5744520" y="1600200"/>
+            <a:off x="6255720" y="1828800"/>
             <a:ext cx="1797840" cy="385200"/>
           </a:xfrm>
           <a:prstGeom prst="diamond">
@@ -6132,8 +6231,8 @@
         </p:nvCxnSpPr>
         <p:spPr>
           <a:xfrm flipV="1">
-            <a:off x="6643440" y="991440"/>
-            <a:ext cx="772560" cy="609120"/>
+            <a:off x="7154640" y="1220040"/>
+            <a:ext cx="313920" cy="609120"/>
           </a:xfrm>
           <a:prstGeom prst="straightConnector1">
             <a:avLst/>
@@ -6150,14 +6249,15 @@
         <p:nvCxnSpPr>
           <p:cNvPr id="78" name="Straight Arrow Connector 14"/>
           <p:cNvCxnSpPr>
+            <a:stCxn id="79" idx="0"/>
             <a:endCxn id="76" idx="2"/>
           </p:cNvCxnSpPr>
           <p:nvPr/>
         </p:nvCxnSpPr>
         <p:spPr>
           <a:xfrm flipH="1" flipV="1">
-            <a:off x="6643440" y="1985400"/>
-            <a:ext cx="432000" cy="758880"/>
+            <a:off x="7154640" y="2214000"/>
+            <a:ext cx="453960" cy="529560"/>
           </a:xfrm>
           <a:prstGeom prst="straightConnector1">
             <a:avLst/>
@@ -6173,7 +6273,7 @@
       </p:cxnSp>
       <p:sp>
         <p:nvSpPr>
-          <p:cNvPr id="79" name="Diamond 7"/>
+          <p:cNvPr id="80" name="Diamond 7"/>
           <p:cNvSpPr/>
           <p:nvPr/>
         </p:nvSpPr>
@@ -6238,27 +6338,27 @@
       </p:sp>
       <p:grpSp>
         <p:nvGrpSpPr>
-          <p:cNvPr id="80" name="Group 8"/>
+          <p:cNvPr id="81" name="Group 8"/>
           <p:cNvGrpSpPr/>
           <p:nvPr/>
         </p:nvGrpSpPr>
         <p:grpSpPr>
           <a:xfrm>
-            <a:off x="6147720" y="2743200"/>
+            <a:off x="6681960" y="2743200"/>
             <a:ext cx="1852560" cy="1216440"/>
-            <a:chOff x="6147720" y="2743200"/>
+            <a:chOff x="6681960" y="2743200"/>
             <a:chExt cx="1852560" cy="1216440"/>
           </a:xfrm>
         </p:grpSpPr>
         <p:sp>
           <p:nvSpPr>
-            <p:cNvPr id="81" name="TextBox 33"/>
+            <p:cNvPr id="82" name="TextBox 33"/>
             <p:cNvSpPr/>
             <p:nvPr/>
           </p:nvSpPr>
           <p:spPr>
             <a:xfrm>
-              <a:off x="6147720" y="2743200"/>
+              <a:off x="6681960" y="2743200"/>
               <a:ext cx="1852560" cy="303120"/>
             </a:xfrm>
             <a:prstGeom prst="rect">
@@ -6309,13 +6409,13 @@
         </p:sp>
         <p:sp>
           <p:nvSpPr>
-            <p:cNvPr id="82" name="TextBox 34"/>
+            <p:cNvPr id="83" name="TextBox 34"/>
             <p:cNvSpPr/>
             <p:nvPr/>
           </p:nvSpPr>
           <p:spPr>
             <a:xfrm>
-              <a:off x="6147720" y="3016080"/>
+              <a:off x="6681960" y="3016080"/>
               <a:ext cx="1852560" cy="943560"/>
             </a:xfrm>
             <a:prstGeom prst="rect">
@@ -6456,13 +6556,13 @@
       </p:grpSp>
       <p:sp>
         <p:nvSpPr>
-          <p:cNvPr id="83" name="Isosceles Triangle 3"/>
+          <p:cNvPr id="84" name="Isosceles Triangle 3"/>
           <p:cNvSpPr/>
           <p:nvPr/>
         </p:nvSpPr>
         <p:spPr>
           <a:xfrm>
-            <a:off x="7315200" y="4414680"/>
+            <a:off x="9173520" y="3501000"/>
             <a:ext cx="480240" cy="385200"/>
           </a:xfrm>
           <a:prstGeom prst="triangle">
@@ -6523,13 +6623,13 @@
       </p:sp>
       <p:sp>
         <p:nvSpPr>
-          <p:cNvPr id="84" name="TextBox 25"/>
+          <p:cNvPr id="85" name="TextBox 25"/>
           <p:cNvSpPr/>
           <p:nvPr/>
         </p:nvSpPr>
         <p:spPr>
           <a:xfrm>
-            <a:off x="8686800" y="3200400"/>
+            <a:off x="10568160" y="2743200"/>
             <a:ext cx="1623960" cy="303120"/>
           </a:xfrm>
           <a:prstGeom prst="rect">
@@ -6580,13 +6680,13 @@
       </p:sp>
       <p:sp>
         <p:nvSpPr>
-          <p:cNvPr id="85" name="TextBox 28"/>
+          <p:cNvPr id="86" name="TextBox 28"/>
           <p:cNvSpPr/>
           <p:nvPr/>
         </p:nvSpPr>
         <p:spPr>
           <a:xfrm>
-            <a:off x="8686800" y="3505680"/>
+            <a:off x="10568160" y="3048480"/>
             <a:ext cx="1623960" cy="1370520"/>
           </a:xfrm>
           <a:prstGeom prst="rect">
@@ -6736,17 +6836,17 @@
       </p:sp>
       <p:cxnSp>
         <p:nvCxnSpPr>
-          <p:cNvPr id="86" name="Straight Arrow Connector 15"/>
+          <p:cNvPr id="87" name="Straight Arrow Connector 15"/>
           <p:cNvCxnSpPr>
-            <a:stCxn id="83" idx="4"/>
-            <a:endCxn id="85" idx="1"/>
+            <a:stCxn id="84" idx="5"/>
+            <a:endCxn id="86" idx="1"/>
           </p:cNvCxnSpPr>
           <p:nvPr/>
         </p:nvCxnSpPr>
         <p:spPr>
-          <a:xfrm flipV="1">
-            <a:off x="7795440" y="4190760"/>
-            <a:ext cx="891720" cy="609480"/>
+          <a:xfrm>
+            <a:off x="9533880" y="3693600"/>
+            <a:ext cx="1034640" cy="40320"/>
           </a:xfrm>
           <a:prstGeom prst="straightConnector1">
             <a:avLst/>
@@ -6761,17 +6861,17 @@
       </p:cxnSp>
       <p:cxnSp>
         <p:nvCxnSpPr>
-          <p:cNvPr id="87" name="Straight Arrow Connector 16"/>
+          <p:cNvPr id="88" name="Straight Arrow Connector 16"/>
           <p:cNvCxnSpPr>
-            <a:stCxn id="83" idx="0"/>
-            <a:endCxn id="80" idx="2"/>
+            <a:stCxn id="84" idx="1"/>
+            <a:endCxn id="81" idx="3"/>
           </p:cNvCxnSpPr>
           <p:nvPr/>
         </p:nvCxnSpPr>
         <p:spPr>
           <a:xfrm flipH="1" flipV="1">
-            <a:off x="7074000" y="3959640"/>
-            <a:ext cx="481680" cy="455400"/>
+            <a:off x="8534520" y="3351240"/>
+            <a:ext cx="759240" cy="342720"/>
           </a:xfrm>
           <a:prstGeom prst="straightConnector1">
             <a:avLst/>
@@ -6786,13 +6886,13 @@
       </p:cxnSp>
       <p:sp>
         <p:nvSpPr>
-          <p:cNvPr id="88" name="TextBox 35"/>
+          <p:cNvPr id="89" name="TextBox 35"/>
           <p:cNvSpPr/>
           <p:nvPr/>
         </p:nvSpPr>
         <p:spPr>
           <a:xfrm>
-            <a:off x="2032200" y="2436840"/>
+            <a:off x="2086200" y="3336840"/>
             <a:ext cx="1623960" cy="303120"/>
           </a:xfrm>
           <a:prstGeom prst="rect">
@@ -6843,13 +6943,13 @@
       </p:sp>
       <p:sp>
         <p:nvSpPr>
-          <p:cNvPr id="89" name="TextBox 36"/>
+          <p:cNvPr id="90" name="TextBox 36"/>
           <p:cNvSpPr/>
           <p:nvPr/>
         </p:nvSpPr>
         <p:spPr>
           <a:xfrm>
-            <a:off x="2032200" y="2698200"/>
+            <a:off x="2086200" y="3598200"/>
             <a:ext cx="1623960" cy="516600"/>
           </a:xfrm>
           <a:prstGeom prst="rect">
@@ -6933,13 +7033,13 @@
       </p:sp>
       <p:sp>
         <p:nvSpPr>
-          <p:cNvPr id="90" name="TextBox 37"/>
+          <p:cNvPr id="91" name="TextBox 37"/>
           <p:cNvSpPr/>
           <p:nvPr/>
         </p:nvSpPr>
         <p:spPr>
           <a:xfrm>
-            <a:off x="2032200" y="2436840"/>
+            <a:off x="2086200" y="3336840"/>
             <a:ext cx="1623960" cy="303120"/>
           </a:xfrm>
           <a:prstGeom prst="rect">
@@ -6990,13 +7090,13 @@
       </p:sp>
       <p:sp>
         <p:nvSpPr>
-          <p:cNvPr id="91" name="TextBox 38"/>
+          <p:cNvPr id="92" name="TextBox 38"/>
           <p:cNvSpPr/>
           <p:nvPr/>
         </p:nvSpPr>
         <p:spPr>
           <a:xfrm>
-            <a:off x="2032200" y="2698200"/>
+            <a:off x="2086200" y="3598200"/>
             <a:ext cx="1623960" cy="516600"/>
           </a:xfrm>
           <a:prstGeom prst="rect">
@@ -7080,13 +7180,13 @@
       </p:sp>
       <p:sp>
         <p:nvSpPr>
-          <p:cNvPr id="92" name="Diamond 8"/>
+          <p:cNvPr id="93" name="Diamond 8"/>
           <p:cNvSpPr/>
           <p:nvPr/>
         </p:nvSpPr>
         <p:spPr>
           <a:xfrm>
-            <a:off x="1829160" y="1828800"/>
+            <a:off x="1883160" y="2514600"/>
             <a:ext cx="1827000" cy="385200"/>
           </a:xfrm>
           <a:prstGeom prst="diamond">
@@ -7145,13 +7245,13 @@
       </p:sp>
       <p:sp>
         <p:nvSpPr>
-          <p:cNvPr id="93" name="Oval 3"/>
+          <p:cNvPr id="94" name="Oval 3"/>
           <p:cNvSpPr/>
           <p:nvPr/>
         </p:nvSpPr>
         <p:spPr>
           <a:xfrm>
-            <a:off x="3886200" y="1442160"/>
+            <a:off x="3481560" y="2899800"/>
             <a:ext cx="1598400" cy="385200"/>
           </a:xfrm>
           <a:prstGeom prst="ellipse">
@@ -7195,7 +7295,7 @@
                 </a:solidFill>
                 <a:latin typeface="Calibri"/>
               </a:rPr>
-              <a:t>DateTime</a:t>
+              <a:t>Moment</a:t>
             </a:r>
             <a:endParaRPr b="0" lang="en-US" sz="1410" spc="-1" strike="noStrike">
               <a:solidFill>
@@ -7208,17 +7308,17 @@
       </p:sp>
       <p:cxnSp>
         <p:nvCxnSpPr>
-          <p:cNvPr id="94" name="Straight Arrow Connector 36"/>
+          <p:cNvPr id="95" name="Straight Arrow Connector 36"/>
           <p:cNvCxnSpPr>
-            <a:stCxn id="92" idx="3"/>
-            <a:endCxn id="93" idx="2"/>
+            <a:stCxn id="93" idx="3"/>
+            <a:endCxn id="94" idx="0"/>
           </p:cNvCxnSpPr>
           <p:nvPr/>
         </p:nvCxnSpPr>
         <p:spPr>
-          <a:xfrm flipV="1">
-            <a:off x="3656160" y="1634760"/>
-            <a:ext cx="230400" cy="387000"/>
+          <a:xfrm>
+            <a:off x="3710160" y="2707200"/>
+            <a:ext cx="570960" cy="192960"/>
           </a:xfrm>
           <a:prstGeom prst="straightConnector1">
             <a:avLst/>
@@ -7233,17 +7333,17 @@
       </p:cxnSp>
       <p:cxnSp>
         <p:nvCxnSpPr>
-          <p:cNvPr id="95" name="Straight Arrow Connector 37"/>
+          <p:cNvPr id="96" name="Straight Arrow Connector 37"/>
           <p:cNvCxnSpPr>
-            <a:stCxn id="90" idx="-1"/>
-            <a:endCxn id="92" idx="2"/>
+            <a:stCxn id="91" idx="-1"/>
+            <a:endCxn id="93" idx="2"/>
           </p:cNvCxnSpPr>
           <p:nvPr/>
         </p:nvCxnSpPr>
         <p:spPr>
           <a:xfrm flipH="1" flipV="1">
-            <a:off x="2742840" y="2214000"/>
-            <a:ext cx="101520" cy="223200"/>
+            <a:off x="2796840" y="2899800"/>
+            <a:ext cx="101520" cy="437400"/>
           </a:xfrm>
           <a:prstGeom prst="straightConnector1">
             <a:avLst/>
@@ -7258,17 +7358,17 @@
       </p:cxnSp>
       <p:cxnSp>
         <p:nvCxnSpPr>
-          <p:cNvPr id="96" name="Straight Arrow Connector 38"/>
+          <p:cNvPr id="97" name="Straight Arrow Connector 38"/>
           <p:cNvCxnSpPr>
-            <a:stCxn id="92" idx="0"/>
+            <a:stCxn id="93" idx="0"/>
             <a:endCxn id="63" idx="2"/>
           </p:cNvCxnSpPr>
           <p:nvPr/>
         </p:nvCxnSpPr>
         <p:spPr>
           <a:xfrm flipV="1">
-            <a:off x="2742840" y="1418400"/>
-            <a:ext cx="558360" cy="410760"/>
+            <a:off x="2796840" y="1860480"/>
+            <a:ext cx="556920" cy="654480"/>
           </a:xfrm>
           <a:prstGeom prst="straightConnector1">
             <a:avLst/>
@@ -7283,13 +7383,13 @@
       </p:cxnSp>
       <p:sp>
         <p:nvSpPr>
-          <p:cNvPr id="97" name="TextBox 43"/>
+          <p:cNvPr id="98" name="TextBox 43"/>
           <p:cNvSpPr/>
           <p:nvPr/>
         </p:nvSpPr>
         <p:spPr>
           <a:xfrm>
-            <a:off x="10491120" y="1275120"/>
+            <a:off x="10543680" y="457200"/>
             <a:ext cx="1623960" cy="303120"/>
           </a:xfrm>
           <a:prstGeom prst="rect">
@@ -7340,13 +7440,13 @@
       </p:sp>
       <p:sp>
         <p:nvSpPr>
-          <p:cNvPr id="98" name="TextBox 44"/>
+          <p:cNvPr id="99" name="TextBox 44"/>
           <p:cNvSpPr/>
           <p:nvPr/>
         </p:nvSpPr>
         <p:spPr>
           <a:xfrm>
-            <a:off x="10491120" y="1536480"/>
+            <a:off x="10543680" y="718560"/>
             <a:ext cx="1623960" cy="516600"/>
           </a:xfrm>
           <a:prstGeom prst="rect">
@@ -7430,13 +7530,13 @@
       </p:sp>
       <p:sp>
         <p:nvSpPr>
-          <p:cNvPr id="99" name="TextBox 45"/>
+          <p:cNvPr id="100" name="TextBox 45"/>
           <p:cNvSpPr/>
           <p:nvPr/>
         </p:nvSpPr>
         <p:spPr>
           <a:xfrm>
-            <a:off x="10491120" y="1275120"/>
+            <a:off x="10543680" y="457200"/>
             <a:ext cx="1623960" cy="303120"/>
           </a:xfrm>
           <a:prstGeom prst="rect">
@@ -7487,13 +7587,13 @@
       </p:sp>
       <p:sp>
         <p:nvSpPr>
-          <p:cNvPr id="100" name="TextBox 46"/>
+          <p:cNvPr id="101" name="TextBox 46"/>
           <p:cNvSpPr/>
           <p:nvPr/>
         </p:nvSpPr>
         <p:spPr>
           <a:xfrm>
-            <a:off x="10491120" y="1536480"/>
+            <a:off x="10543680" y="718560"/>
             <a:ext cx="1623960" cy="1584000"/>
           </a:xfrm>
           <a:prstGeom prst="rect">
@@ -7685,13 +7785,13 @@
       </p:sp>
       <p:sp>
         <p:nvSpPr>
-          <p:cNvPr id="101" name="Diamond 20"/>
+          <p:cNvPr id="102" name="Diamond 20"/>
           <p:cNvSpPr/>
           <p:nvPr/>
         </p:nvSpPr>
         <p:spPr>
           <a:xfrm>
-            <a:off x="8078040" y="1516320"/>
+            <a:off x="8282160" y="1443600"/>
             <a:ext cx="2055960" cy="385200"/>
           </a:xfrm>
           <a:prstGeom prst="diamond">
@@ -7750,17 +7850,17 @@
       </p:sp>
       <p:cxnSp>
         <p:nvCxnSpPr>
-          <p:cNvPr id="102" name="Straight Arrow Connector 35"/>
+          <p:cNvPr id="103" name="Straight Arrow Connector 35"/>
           <p:cNvCxnSpPr>
-            <a:stCxn id="101" idx="2"/>
-            <a:endCxn id="84" idx="0"/>
+            <a:stCxn id="102" idx="2"/>
+            <a:endCxn id="86" idx="1"/>
           </p:cNvCxnSpPr>
           <p:nvPr/>
         </p:nvCxnSpPr>
         <p:spPr>
           <a:xfrm>
-            <a:off x="9106200" y="1901520"/>
-            <a:ext cx="392760" cy="1299240"/>
+            <a:off x="9310320" y="1828800"/>
+            <a:ext cx="1258200" cy="1905120"/>
           </a:xfrm>
           <a:prstGeom prst="straightConnector1">
             <a:avLst/>
@@ -7775,17 +7875,17 @@
       </p:cxnSp>
       <p:cxnSp>
         <p:nvCxnSpPr>
-          <p:cNvPr id="103" name="Straight Arrow Connector 43"/>
+          <p:cNvPr id="104" name="Straight Arrow Connector 43"/>
           <p:cNvCxnSpPr>
-            <a:stCxn id="100" idx="1"/>
-            <a:endCxn id="101" idx="2"/>
+            <a:stCxn id="101" idx="1"/>
+            <a:endCxn id="102" idx="3"/>
           </p:cNvCxnSpPr>
           <p:nvPr/>
         </p:nvCxnSpPr>
         <p:spPr>
-          <a:xfrm flipH="1" flipV="1">
-            <a:off x="9106200" y="1901520"/>
-            <a:ext cx="1385280" cy="427320"/>
+          <a:xfrm flipH="1">
+            <a:off x="10338120" y="1510560"/>
+            <a:ext cx="205920" cy="126000"/>
           </a:xfrm>
           <a:prstGeom prst="straightConnector1">
             <a:avLst/>
@@ -7800,17 +7900,17 @@
       </p:cxnSp>
       <p:cxnSp>
         <p:nvCxnSpPr>
-          <p:cNvPr id="104" name="Straight Arrow Connector 49"/>
+          <p:cNvPr id="105" name="Straight Arrow Connector 49"/>
           <p:cNvCxnSpPr>
-            <a:stCxn id="101" idx="0"/>
+            <a:stCxn id="102" idx="0"/>
             <a:endCxn id="67" idx="2"/>
           </p:cNvCxnSpPr>
           <p:nvPr/>
         </p:nvCxnSpPr>
         <p:spPr>
           <a:xfrm flipH="1" flipV="1">
-            <a:off x="7415640" y="991440"/>
-            <a:ext cx="1690920" cy="525240"/>
+            <a:off x="7468200" y="1220040"/>
+            <a:ext cx="1842480" cy="223920"/>
           </a:xfrm>
           <a:prstGeom prst="straightConnector1">
             <a:avLst/>
@@ -7825,19 +7925,78 @@
       </p:cxnSp>
       <p:sp>
         <p:nvSpPr>
-          <p:cNvPr id="105" name="Oval 6"/>
+          <p:cNvPr id="106" name="TextBox 74"/>
           <p:cNvSpPr/>
           <p:nvPr/>
         </p:nvSpPr>
         <p:spPr>
           <a:xfrm>
-            <a:off x="7084440" y="2131560"/>
-            <a:ext cx="1220760" cy="385200"/>
-          </a:xfrm>
-          <a:prstGeom prst="ellipse">
-            <a:avLst/>
-          </a:prstGeom>
-          <a:noFill/>
+            <a:off x="5412240" y="5029200"/>
+            <a:ext cx="1623960" cy="303120"/>
+          </a:xfrm>
+          <a:prstGeom prst="rect">
+            <a:avLst/>
+          </a:prstGeom>
+          <a:solidFill>
+            <a:schemeClr val="bg1"/>
+          </a:solidFill>
+          <a:ln w="0">
+            <a:solidFill>
+              <a:srgbClr val="000000"/>
+            </a:solidFill>
+          </a:ln>
+        </p:spPr>
+        <p:style>
+          <a:lnRef idx="0"/>
+          <a:fillRef idx="0"/>
+          <a:effectRef idx="0"/>
+          <a:fontRef idx="minor"/>
+        </p:style>
+        <p:txBody>
+          <a:bodyPr lIns="90000" rIns="90000" tIns="45000" bIns="45000" anchor="t">
+            <a:spAutoFit/>
+          </a:bodyPr>
+          <a:p>
+            <a:pPr algn="ctr" defTabSz="914400">
+              <a:lnSpc>
+                <a:spcPct val="100000"/>
+              </a:lnSpc>
+            </a:pPr>
+            <a:r>
+              <a:rPr b="0" lang="en-US" sz="1400" spc="-1" strike="noStrike">
+                <a:solidFill>
+                  <a:schemeClr val="dk1"/>
+                </a:solidFill>
+                <a:latin typeface="Calibri"/>
+              </a:rPr>
+              <a:t>Package</a:t>
+            </a:r>
+            <a:endParaRPr b="0" lang="en-US" sz="1400" spc="-1" strike="noStrike">
+              <a:solidFill>
+                <a:srgbClr val="000000"/>
+              </a:solidFill>
+              <a:latin typeface="Arial"/>
+            </a:endParaRPr>
+          </a:p>
+        </p:txBody>
+      </p:sp>
+      <p:sp>
+        <p:nvSpPr>
+          <p:cNvPr id="107" name="Diamond 22"/>
+          <p:cNvSpPr/>
+          <p:nvPr/>
+        </p:nvSpPr>
+        <p:spPr>
+          <a:xfrm>
+            <a:off x="3710160" y="4343400"/>
+            <a:ext cx="1827360" cy="385200"/>
+          </a:xfrm>
+          <a:prstGeom prst="diamond">
+            <a:avLst/>
+          </a:prstGeom>
+          <a:solidFill>
+            <a:schemeClr val="bg1"/>
+          </a:solidFill>
           <a:ln>
             <a:solidFill>
               <a:srgbClr val="000000"/>
@@ -7869,15 +8028,15 @@
               </a:lnSpc>
             </a:pPr>
             <a:r>
-              <a:rPr b="0" lang="en-US" sz="1410" spc="-1" strike="noStrike">
+              <a:rPr b="0" lang="en-US" sz="1400" spc="-1" strike="noStrike">
                 <a:solidFill>
                   <a:schemeClr val="dk1"/>
                 </a:solidFill>
                 <a:latin typeface="Calibri"/>
               </a:rPr>
-              <a:t>Level</a:t>
-            </a:r>
-            <a:endParaRPr b="0" lang="en-US" sz="1410" spc="-1" strike="noStrike">
+              <a:t>Contains</a:t>
+            </a:r>
+            <a:endParaRPr b="0" lang="en-US" sz="1400" spc="-1" strike="noStrike">
               <a:solidFill>
                 <a:srgbClr val="000000"/>
               </a:solidFill>
@@ -7888,21 +8047,47 @@
       </p:sp>
       <p:cxnSp>
         <p:nvCxnSpPr>
-          <p:cNvPr id="106" name="Straight Arrow Connector 50"/>
+          <p:cNvPr id="108" name="Straight Arrow Connector 59"/>
           <p:cNvCxnSpPr>
-            <a:stCxn id="101" idx="1"/>
-            <a:endCxn id="105" idx="0"/>
+            <a:stCxn id="92" idx="2"/>
+            <a:endCxn id="107" idx="1"/>
           </p:cNvCxnSpPr>
           <p:nvPr/>
         </p:nvCxnSpPr>
         <p:spPr>
-          <a:xfrm flipH="1">
-            <a:off x="7695000" y="1708920"/>
-            <a:ext cx="383400" cy="423000"/>
+          <a:xfrm>
+            <a:off x="2898000" y="4114800"/>
+            <a:ext cx="812520" cy="421560"/>
           </a:xfrm>
           <a:prstGeom prst="straightConnector1">
             <a:avLst/>
           </a:prstGeom>
+          <a:ln cap="sq" w="76200">
+            <a:solidFill>
+              <a:srgbClr val="000000"/>
+            </a:solidFill>
+            <a:round/>
+            <a:tailEnd len="sm" type="triangle" w="sm"/>
+          </a:ln>
+        </p:spPr>
+      </p:cxnSp>
+      <p:cxnSp>
+        <p:nvCxnSpPr>
+          <p:cNvPr id="109" name="Straight Arrow Connector 60"/>
+          <p:cNvCxnSpPr>
+            <a:stCxn id="107" idx="2"/>
+            <a:endCxn id="106" idx="1"/>
+          </p:cNvCxnSpPr>
+          <p:nvPr/>
+        </p:nvCxnSpPr>
+        <p:spPr>
+          <a:xfrm>
+            <a:off x="4623840" y="4728600"/>
+            <a:ext cx="788760" cy="452520"/>
+          </a:xfrm>
+          <a:prstGeom prst="straightConnector1">
+            <a:avLst/>
+          </a:prstGeom>
           <a:ln w="25400">
             <a:solidFill>
               <a:srgbClr val="000000"/>
@@ -7911,73 +8096,41 @@
           </a:ln>
         </p:spPr>
       </p:cxnSp>
-      <p:sp>
-        <p:nvSpPr>
-          <p:cNvPr id="107" name="TextBox 74"/>
+      <p:cxnSp>
+        <p:nvCxnSpPr>
+          <p:cNvPr id="110" name="Straight Arrow Connector 61"/>
+          <p:cNvCxnSpPr>
+            <a:stCxn id="111" idx="0"/>
+            <a:endCxn id="63" idx="2"/>
+          </p:cNvCxnSpPr>
+          <p:nvPr/>
+        </p:nvCxnSpPr>
+        <p:spPr>
+          <a:xfrm flipH="1" flipV="1">
+            <a:off x="3353400" y="1860480"/>
+            <a:ext cx="2187000" cy="1340280"/>
+          </a:xfrm>
+          <a:prstGeom prst="straightConnector1">
+            <a:avLst/>
+          </a:prstGeom>
+          <a:ln w="25400">
+            <a:solidFill>
+              <a:srgbClr val="000000"/>
+            </a:solidFill>
+            <a:round/>
+          </a:ln>
+        </p:spPr>
+      </p:cxnSp>
+      <p:sp>
+        <p:nvSpPr>
+          <p:cNvPr id="111" name="Diamond 24"/>
           <p:cNvSpPr/>
           <p:nvPr/>
         </p:nvSpPr>
         <p:spPr>
           <a:xfrm>
-            <a:off x="4547880" y="5640480"/>
-            <a:ext cx="1623960" cy="303120"/>
-          </a:xfrm>
-          <a:prstGeom prst="rect">
-            <a:avLst/>
-          </a:prstGeom>
-          <a:solidFill>
-            <a:schemeClr val="bg1"/>
-          </a:solidFill>
-          <a:ln w="0">
-            <a:solidFill>
-              <a:srgbClr val="000000"/>
-            </a:solidFill>
-          </a:ln>
-        </p:spPr>
-        <p:style>
-          <a:lnRef idx="0"/>
-          <a:fillRef idx="0"/>
-          <a:effectRef idx="0"/>
-          <a:fontRef idx="minor"/>
-        </p:style>
-        <p:txBody>
-          <a:bodyPr lIns="90000" rIns="90000" tIns="45000" bIns="45000" anchor="t">
-            <a:spAutoFit/>
-          </a:bodyPr>
-          <a:p>
-            <a:pPr algn="ctr" defTabSz="914400">
-              <a:lnSpc>
-                <a:spcPct val="100000"/>
-              </a:lnSpc>
-            </a:pPr>
-            <a:r>
-              <a:rPr b="0" lang="en-US" sz="1400" spc="-1" strike="noStrike">
-                <a:solidFill>
-                  <a:schemeClr val="dk1"/>
-                </a:solidFill>
-                <a:latin typeface="Calibri"/>
-              </a:rPr>
-              <a:t>Package</a:t>
-            </a:r>
-            <a:endParaRPr b="0" lang="en-US" sz="1400" spc="-1" strike="noStrike">
-              <a:solidFill>
-                <a:srgbClr val="000000"/>
-              </a:solidFill>
-              <a:latin typeface="Arial"/>
-            </a:endParaRPr>
-          </a:p>
-        </p:txBody>
-      </p:sp>
-      <p:sp>
-        <p:nvSpPr>
-          <p:cNvPr id="108" name="Diamond 22"/>
-          <p:cNvSpPr/>
-          <p:nvPr/>
-        </p:nvSpPr>
-        <p:spPr>
-          <a:xfrm>
-            <a:off x="2971800" y="3500280"/>
-            <a:ext cx="1827360" cy="385200"/>
+            <a:off x="4626720" y="3200400"/>
+            <a:ext cx="1826640" cy="684360"/>
           </a:xfrm>
           <a:prstGeom prst="diamond">
             <a:avLst/>
@@ -8022,7 +8175,7 @@
                 </a:solidFill>
                 <a:latin typeface="Calibri"/>
               </a:rPr>
-              <a:t>Contains</a:t>
+              <a:t>Wheel of Fortune</a:t>
             </a:r>
             <a:endParaRPr b="0" lang="en-US" sz="1400" spc="-1" strike="noStrike">
               <a:solidFill>
@@ -8035,93 +8188,44 @@
       </p:sp>
       <p:cxnSp>
         <p:nvCxnSpPr>
-          <p:cNvPr id="109" name="Straight Arrow Connector 59"/>
+          <p:cNvPr id="112" name="Straight Arrow Connector 62"/>
           <p:cNvCxnSpPr>
-            <a:stCxn id="107" idx="1"/>
-            <a:endCxn id="108" idx="2"/>
+            <a:stCxn id="106" idx="0"/>
+            <a:endCxn id="111" idx="2"/>
           </p:cNvCxnSpPr>
           <p:nvPr/>
         </p:nvCxnSpPr>
         <p:spPr>
           <a:xfrm flipH="1" flipV="1">
-            <a:off x="3885480" y="3885480"/>
-            <a:ext cx="662760" cy="1906920"/>
+            <a:off x="5540040" y="3884760"/>
+            <a:ext cx="684360" cy="1144800"/>
           </a:xfrm>
           <a:prstGeom prst="straightConnector1">
             <a:avLst/>
           </a:prstGeom>
-          <a:ln cap="sq" w="76200">
+          <a:ln w="25400">
             <a:solidFill>
               <a:srgbClr val="000000"/>
             </a:solidFill>
             <a:round/>
-            <a:tailEnd len="sm" type="triangle" w="sm"/>
           </a:ln>
         </p:spPr>
       </p:cxnSp>
-      <p:cxnSp>
-        <p:nvCxnSpPr>
-          <p:cNvPr id="110" name="Straight Arrow Connector 60"/>
-          <p:cNvCxnSpPr>
-            <a:stCxn id="91" idx="2"/>
-            <a:endCxn id="108" idx="0"/>
-          </p:cNvCxnSpPr>
-          <p:nvPr/>
-        </p:nvCxnSpPr>
-        <p:spPr>
-          <a:xfrm>
-            <a:off x="2844000" y="3214800"/>
-            <a:ext cx="1041840" cy="285840"/>
-          </a:xfrm>
-          <a:prstGeom prst="straightConnector1">
-            <a:avLst/>
-          </a:prstGeom>
-          <a:ln w="25400">
-            <a:solidFill>
-              <a:srgbClr val="000000"/>
-            </a:solidFill>
-            <a:round/>
-          </a:ln>
-        </p:spPr>
-      </p:cxnSp>
-      <p:cxnSp>
-        <p:nvCxnSpPr>
-          <p:cNvPr id="111" name="Straight Arrow Connector 61"/>
-          <p:cNvCxnSpPr>
-            <a:stCxn id="112" idx="3"/>
-            <a:endCxn id="63" idx="2"/>
-          </p:cNvCxnSpPr>
-          <p:nvPr/>
-        </p:nvCxnSpPr>
-        <p:spPr>
-          <a:xfrm flipH="1" flipV="1">
-            <a:off x="3300840" y="1418400"/>
-            <a:ext cx="3556800" cy="3496320"/>
-          </a:xfrm>
-          <a:prstGeom prst="straightConnector1">
-            <a:avLst/>
-          </a:prstGeom>
-          <a:ln w="25400">
-            <a:solidFill>
-              <a:srgbClr val="000000"/>
-            </a:solidFill>
-            <a:round/>
-          </a:ln>
-        </p:spPr>
-      </p:cxnSp>
-      <p:sp>
-        <p:nvSpPr>
-          <p:cNvPr id="112" name="Diamond 24"/>
+      <p:sp>
+        <p:nvSpPr>
+          <p:cNvPr id="113" name="Isosceles Triangle 4"/>
           <p:cNvSpPr/>
           <p:nvPr/>
         </p:nvSpPr>
         <p:spPr>
           <a:xfrm>
-            <a:off x="4801320" y="4572000"/>
-            <a:ext cx="2055960" cy="684360"/>
-          </a:xfrm>
-          <a:prstGeom prst="diamond">
-            <a:avLst/>
+            <a:off x="2693880" y="4415400"/>
+            <a:ext cx="480240" cy="385200"/>
+          </a:xfrm>
+          <a:prstGeom prst="triangle">
+            <a:avLst>
+              <a:gd name="adj" fmla="val 50000"/>
+            </a:avLst>
           </a:prstGeom>
           <a:solidFill>
             <a:schemeClr val="bg1"/>
@@ -8147,7 +8251,7 @@
           <a:fontRef idx="minor"/>
         </p:style>
         <p:txBody>
-          <a:bodyPr lIns="90000" rIns="90000" tIns="45000" bIns="45000" anchor="ctr">
+          <a:bodyPr wrap="none" lIns="0" rIns="0" tIns="0" bIns="0" anchor="ctr">
             <a:noAutofit/>
           </a:bodyPr>
           <a:p>
@@ -8163,7 +8267,7 @@
                 </a:solidFill>
                 <a:latin typeface="Calibri"/>
               </a:rPr>
-              <a:t>Weel of Fortune</a:t>
+              <a:t>ISA</a:t>
             </a:r>
             <a:endParaRPr b="0" lang="en-US" sz="1400" spc="-1" strike="noStrike">
               <a:solidFill>
@@ -8176,17 +8280,17 @@
       </p:sp>
       <p:cxnSp>
         <p:nvCxnSpPr>
-          <p:cNvPr id="113" name="Straight Arrow Connector 62"/>
+          <p:cNvPr id="114" name="Straight Arrow Connector 74"/>
           <p:cNvCxnSpPr>
-            <a:stCxn id="107" idx="0"/>
-            <a:endCxn id="112" idx="2"/>
+            <a:stCxn id="113" idx="0"/>
+            <a:endCxn id="92" idx="2"/>
           </p:cNvCxnSpPr>
           <p:nvPr/>
         </p:nvCxnSpPr>
         <p:spPr>
-          <a:xfrm flipV="1">
-            <a:off x="5359680" y="5256360"/>
-            <a:ext cx="470160" cy="384480"/>
+          <a:xfrm flipH="1" flipV="1">
+            <a:off x="2898000" y="4114800"/>
+            <a:ext cx="36360" cy="300960"/>
           </a:xfrm>
           <a:prstGeom prst="straightConnector1">
             <a:avLst/>
@@ -8201,19 +8305,222 @@
       </p:cxnSp>
       <p:sp>
         <p:nvSpPr>
-          <p:cNvPr id="114" name="Isosceles Triangle 4"/>
+          <p:cNvPr id="115" name="TextBox 39"/>
           <p:cNvSpPr/>
           <p:nvPr/>
         </p:nvSpPr>
         <p:spPr>
           <a:xfrm>
-            <a:off x="2490840" y="4343400"/>
-            <a:ext cx="480240" cy="385200"/>
-          </a:xfrm>
-          <a:prstGeom prst="triangle">
-            <a:avLst>
-              <a:gd name="adj" fmla="val 50000"/>
-            </a:avLst>
+            <a:off x="2109960" y="5163480"/>
+            <a:ext cx="1623960" cy="303120"/>
+          </a:xfrm>
+          <a:prstGeom prst="rect">
+            <a:avLst/>
+          </a:prstGeom>
+          <a:solidFill>
+            <a:schemeClr val="bg1"/>
+          </a:solidFill>
+          <a:ln w="0">
+            <a:solidFill>
+              <a:srgbClr val="000000"/>
+            </a:solidFill>
+          </a:ln>
+        </p:spPr>
+        <p:style>
+          <a:lnRef idx="0"/>
+          <a:fillRef idx="0"/>
+          <a:effectRef idx="0"/>
+          <a:fontRef idx="minor"/>
+        </p:style>
+        <p:txBody>
+          <a:bodyPr lIns="90000" rIns="90000" tIns="45000" bIns="45000" anchor="t">
+            <a:spAutoFit/>
+          </a:bodyPr>
+          <a:p>
+            <a:pPr algn="ctr" defTabSz="914400">
+              <a:lnSpc>
+                <a:spcPct val="100000"/>
+              </a:lnSpc>
+            </a:pPr>
+            <a:r>
+              <a:rPr b="0" lang="en-US" sz="1400" spc="-1" strike="noStrike">
+                <a:solidFill>
+                  <a:schemeClr val="dk1"/>
+                </a:solidFill>
+                <a:latin typeface="Calibri"/>
+              </a:rPr>
+              <a:t>Entity</a:t>
+            </a:r>
+            <a:endParaRPr b="0" lang="en-US" sz="1400" spc="-1" strike="noStrike">
+              <a:solidFill>
+                <a:srgbClr val="000000"/>
+              </a:solidFill>
+              <a:latin typeface="Arial"/>
+            </a:endParaRPr>
+          </a:p>
+        </p:txBody>
+      </p:sp>
+      <p:sp>
+        <p:nvSpPr>
+          <p:cNvPr id="116" name="TextBox 41"/>
+          <p:cNvSpPr/>
+          <p:nvPr/>
+        </p:nvSpPr>
+        <p:spPr>
+          <a:xfrm>
+            <a:off x="2109960" y="5163480"/>
+            <a:ext cx="1623960" cy="303120"/>
+          </a:xfrm>
+          <a:prstGeom prst="rect">
+            <a:avLst/>
+          </a:prstGeom>
+          <a:solidFill>
+            <a:schemeClr val="bg1"/>
+          </a:solidFill>
+          <a:ln w="0">
+            <a:solidFill>
+              <a:srgbClr val="000000"/>
+            </a:solidFill>
+          </a:ln>
+        </p:spPr>
+        <p:style>
+          <a:lnRef idx="0"/>
+          <a:fillRef idx="0"/>
+          <a:effectRef idx="0"/>
+          <a:fontRef idx="minor"/>
+        </p:style>
+        <p:txBody>
+          <a:bodyPr lIns="90000" rIns="90000" tIns="45000" bIns="45000" anchor="t">
+            <a:spAutoFit/>
+          </a:bodyPr>
+          <a:p>
+            <a:pPr algn="ctr" defTabSz="914400">
+              <a:lnSpc>
+                <a:spcPct val="100000"/>
+              </a:lnSpc>
+            </a:pPr>
+            <a:r>
+              <a:rPr b="0" lang="en-US" sz="1400" spc="-1" strike="noStrike">
+                <a:solidFill>
+                  <a:schemeClr val="dk1"/>
+                </a:solidFill>
+                <a:latin typeface="Calibri"/>
+              </a:rPr>
+              <a:t>Quest</a:t>
+            </a:r>
+            <a:endParaRPr b="0" lang="en-US" sz="1400" spc="-1" strike="noStrike">
+              <a:solidFill>
+                <a:srgbClr val="000000"/>
+              </a:solidFill>
+              <a:latin typeface="Arial"/>
+            </a:endParaRPr>
+          </a:p>
+        </p:txBody>
+      </p:sp>
+      <p:sp>
+        <p:nvSpPr>
+          <p:cNvPr id="117" name="TextBox 42"/>
+          <p:cNvSpPr/>
+          <p:nvPr/>
+        </p:nvSpPr>
+        <p:spPr>
+          <a:xfrm>
+            <a:off x="2109960" y="5424840"/>
+            <a:ext cx="1623960" cy="364680"/>
+          </a:xfrm>
+          <a:prstGeom prst="rect">
+            <a:avLst/>
+          </a:prstGeom>
+          <a:solidFill>
+            <a:schemeClr val="bg1"/>
+          </a:solidFill>
+          <a:ln w="0">
+            <a:solidFill>
+              <a:srgbClr val="000000"/>
+            </a:solidFill>
+          </a:ln>
+        </p:spPr>
+        <p:style>
+          <a:lnRef idx="0"/>
+          <a:fillRef idx="0"/>
+          <a:effectRef idx="0"/>
+          <a:fontRef idx="minor"/>
+        </p:style>
+        <p:txBody>
+          <a:bodyPr lIns="90000" rIns="90000" tIns="45000" bIns="45000" anchor="t">
+            <a:spAutoFit/>
+          </a:bodyPr>
+          <a:p>
+            <a:pPr algn="ctr">
+              <a:lnSpc>
+                <a:spcPct val="100000"/>
+              </a:lnSpc>
+            </a:pPr>
+            <a:r>
+              <a:rPr b="0" lang="en-US" sz="1300" spc="-1" strike="noStrike">
+                <a:solidFill>
+                  <a:srgbClr val="000000"/>
+                </a:solidFill>
+                <a:latin typeface="Arial"/>
+              </a:rPr>
+              <a:t>Deadline</a:t>
+            </a:r>
+            <a:r>
+              <a:rPr b="0" lang="en-US" sz="1800" spc="-1" strike="noStrike">
+                <a:solidFill>
+                  <a:srgbClr val="000000"/>
+                </a:solidFill>
+                <a:latin typeface="Arial"/>
+              </a:rPr>
+              <a:t> </a:t>
+            </a:r>
+            <a:endParaRPr b="0" lang="en-US" sz="1800" spc="-1" strike="noStrike">
+              <a:solidFill>
+                <a:srgbClr val="000000"/>
+              </a:solidFill>
+              <a:latin typeface="Arial"/>
+            </a:endParaRPr>
+          </a:p>
+        </p:txBody>
+      </p:sp>
+      <p:cxnSp>
+        <p:nvCxnSpPr>
+          <p:cNvPr id="118" name="Straight Arrow Connector 75"/>
+          <p:cNvCxnSpPr>
+            <a:stCxn id="113" idx="3"/>
+            <a:endCxn id="116" idx="0"/>
+          </p:cNvCxnSpPr>
+          <p:nvPr/>
+        </p:nvCxnSpPr>
+        <p:spPr>
+          <a:xfrm flipH="1">
+            <a:off x="2921760" y="4800600"/>
+            <a:ext cx="12600" cy="363240"/>
+          </a:xfrm>
+          <a:prstGeom prst="straightConnector1">
+            <a:avLst/>
+          </a:prstGeom>
+          <a:ln w="25400">
+            <a:solidFill>
+              <a:srgbClr val="000000"/>
+            </a:solidFill>
+            <a:round/>
+          </a:ln>
+        </p:spPr>
+      </p:cxnSp>
+      <p:sp>
+        <p:nvSpPr>
+          <p:cNvPr id="119" name="Diamond 30"/>
+          <p:cNvSpPr/>
+          <p:nvPr/>
+        </p:nvSpPr>
+        <p:spPr>
+          <a:xfrm>
+            <a:off x="7627320" y="4800600"/>
+            <a:ext cx="1569240" cy="385200"/>
+          </a:xfrm>
+          <a:prstGeom prst="diamond">
+            <a:avLst/>
           </a:prstGeom>
           <a:solidFill>
             <a:schemeClr val="bg1"/>
@@ -8239,7 +8546,7 @@
           <a:fontRef idx="minor"/>
         </p:style>
         <p:txBody>
-          <a:bodyPr wrap="none" lIns="0" rIns="0" tIns="0" bIns="0" anchor="ctr">
+          <a:bodyPr lIns="90000" rIns="90000" tIns="45000" bIns="45000" anchor="ctr">
             <a:noAutofit/>
           </a:bodyPr>
           <a:p>
@@ -8255,7 +8562,7 @@
                 </a:solidFill>
                 <a:latin typeface="Calibri"/>
               </a:rPr>
-              <a:t>ISA</a:t>
+              <a:t>Costs</a:t>
             </a:r>
             <a:endParaRPr b="0" lang="en-US" sz="1400" spc="-1" strike="noStrike">
               <a:solidFill>
@@ -8266,237 +8573,16 @@
           </a:p>
         </p:txBody>
       </p:sp>
-      <p:cxnSp>
-        <p:nvCxnSpPr>
-          <p:cNvPr id="115" name="Straight Arrow Connector 74"/>
-          <p:cNvCxnSpPr>
-            <a:stCxn id="114" idx="0"/>
-            <a:endCxn id="91" idx="2"/>
-          </p:cNvCxnSpPr>
-          <p:nvPr/>
-        </p:nvCxnSpPr>
-        <p:spPr>
-          <a:xfrm flipV="1">
-            <a:off x="2730960" y="3214800"/>
-            <a:ext cx="113400" cy="1128960"/>
-          </a:xfrm>
-          <a:prstGeom prst="straightConnector1">
-            <a:avLst/>
-          </a:prstGeom>
-          <a:ln w="25400">
-            <a:solidFill>
-              <a:srgbClr val="000000"/>
-            </a:solidFill>
-            <a:round/>
-          </a:ln>
-        </p:spPr>
-      </p:cxnSp>
-      <p:sp>
-        <p:nvSpPr>
-          <p:cNvPr id="116" name="TextBox 39"/>
+      <p:sp>
+        <p:nvSpPr>
+          <p:cNvPr id="120" name="Diamond 31"/>
           <p:cNvSpPr/>
           <p:nvPr/>
         </p:nvSpPr>
         <p:spPr>
           <a:xfrm>
-            <a:off x="2057400" y="5257800"/>
-            <a:ext cx="1623960" cy="303120"/>
-          </a:xfrm>
-          <a:prstGeom prst="rect">
-            <a:avLst/>
-          </a:prstGeom>
-          <a:solidFill>
-            <a:schemeClr val="bg1"/>
-          </a:solidFill>
-          <a:ln w="0">
-            <a:solidFill>
-              <a:srgbClr val="000000"/>
-            </a:solidFill>
-          </a:ln>
-        </p:spPr>
-        <p:style>
-          <a:lnRef idx="0"/>
-          <a:fillRef idx="0"/>
-          <a:effectRef idx="0"/>
-          <a:fontRef idx="minor"/>
-        </p:style>
-        <p:txBody>
-          <a:bodyPr lIns="90000" rIns="90000" tIns="45000" bIns="45000" anchor="t">
-            <a:spAutoFit/>
-          </a:bodyPr>
-          <a:p>
-            <a:pPr algn="ctr" defTabSz="914400">
-              <a:lnSpc>
-                <a:spcPct val="100000"/>
-              </a:lnSpc>
-            </a:pPr>
-            <a:r>
-              <a:rPr b="0" lang="en-US" sz="1400" spc="-1" strike="noStrike">
-                <a:solidFill>
-                  <a:schemeClr val="dk1"/>
-                </a:solidFill>
-                <a:latin typeface="Calibri"/>
-              </a:rPr>
-              <a:t>Entity</a:t>
-            </a:r>
-            <a:endParaRPr b="0" lang="en-US" sz="1400" spc="-1" strike="noStrike">
-              <a:solidFill>
-                <a:srgbClr val="000000"/>
-              </a:solidFill>
-              <a:latin typeface="Arial"/>
-            </a:endParaRPr>
-          </a:p>
-        </p:txBody>
-      </p:sp>
-      <p:sp>
-        <p:nvSpPr>
-          <p:cNvPr id="117" name="TextBox 41"/>
-          <p:cNvSpPr/>
-          <p:nvPr/>
-        </p:nvSpPr>
-        <p:spPr>
-          <a:xfrm>
-            <a:off x="2057400" y="5257800"/>
-            <a:ext cx="1623960" cy="303120"/>
-          </a:xfrm>
-          <a:prstGeom prst="rect">
-            <a:avLst/>
-          </a:prstGeom>
-          <a:solidFill>
-            <a:schemeClr val="bg1"/>
-          </a:solidFill>
-          <a:ln w="0">
-            <a:solidFill>
-              <a:srgbClr val="000000"/>
-            </a:solidFill>
-          </a:ln>
-        </p:spPr>
-        <p:style>
-          <a:lnRef idx="0"/>
-          <a:fillRef idx="0"/>
-          <a:effectRef idx="0"/>
-          <a:fontRef idx="minor"/>
-        </p:style>
-        <p:txBody>
-          <a:bodyPr lIns="90000" rIns="90000" tIns="45000" bIns="45000" anchor="t">
-            <a:spAutoFit/>
-          </a:bodyPr>
-          <a:p>
-            <a:pPr algn="ctr" defTabSz="914400">
-              <a:lnSpc>
-                <a:spcPct val="100000"/>
-              </a:lnSpc>
-            </a:pPr>
-            <a:r>
-              <a:rPr b="0" lang="en-US" sz="1400" spc="-1" strike="noStrike">
-                <a:solidFill>
-                  <a:schemeClr val="dk1"/>
-                </a:solidFill>
-                <a:latin typeface="Calibri"/>
-              </a:rPr>
-              <a:t>Daily Quest</a:t>
-            </a:r>
-            <a:endParaRPr b="0" lang="en-US" sz="1400" spc="-1" strike="noStrike">
-              <a:solidFill>
-                <a:srgbClr val="000000"/>
-              </a:solidFill>
-              <a:latin typeface="Arial"/>
-            </a:endParaRPr>
-          </a:p>
-        </p:txBody>
-      </p:sp>
-      <p:sp>
-        <p:nvSpPr>
-          <p:cNvPr id="118" name="TextBox 42"/>
-          <p:cNvSpPr/>
-          <p:nvPr/>
-        </p:nvSpPr>
-        <p:spPr>
-          <a:xfrm>
-            <a:off x="2057400" y="5519160"/>
-            <a:ext cx="1623960" cy="363960"/>
-          </a:xfrm>
-          <a:prstGeom prst="rect">
-            <a:avLst/>
-          </a:prstGeom>
-          <a:solidFill>
-            <a:schemeClr val="bg1"/>
-          </a:solidFill>
-          <a:ln w="0">
-            <a:solidFill>
-              <a:srgbClr val="000000"/>
-            </a:solidFill>
-          </a:ln>
-        </p:spPr>
-        <p:style>
-          <a:lnRef idx="0"/>
-          <a:fillRef idx="0"/>
-          <a:effectRef idx="0"/>
-          <a:fontRef idx="minor"/>
-        </p:style>
-        <p:txBody>
-          <a:bodyPr lIns="90000" rIns="90000" tIns="45000" bIns="45000" anchor="t">
-            <a:spAutoFit/>
-          </a:bodyPr>
-          <a:p>
-            <a:pPr>
-              <a:lnSpc>
-                <a:spcPct val="100000"/>
-              </a:lnSpc>
-            </a:pPr>
-            <a:r>
-              <a:rPr b="0" lang="en-US" sz="1800" spc="-1" strike="noStrike">
-                <a:solidFill>
-                  <a:srgbClr val="000000"/>
-                </a:solidFill>
-                <a:latin typeface="Arial"/>
-              </a:rPr>
-              <a:t>Deadline </a:t>
-            </a:r>
-            <a:endParaRPr b="0" lang="en-US" sz="1800" spc="-1" strike="noStrike">
-              <a:solidFill>
-                <a:srgbClr val="000000"/>
-              </a:solidFill>
-              <a:latin typeface="Arial"/>
-            </a:endParaRPr>
-          </a:p>
-        </p:txBody>
-      </p:sp>
-      <p:cxnSp>
-        <p:nvCxnSpPr>
-          <p:cNvPr id="119" name="Straight Arrow Connector 75"/>
-          <p:cNvCxnSpPr>
-            <a:stCxn id="114" idx="3"/>
-            <a:endCxn id="117" idx="0"/>
-          </p:cNvCxnSpPr>
-          <p:nvPr/>
-        </p:nvCxnSpPr>
-        <p:spPr>
-          <a:xfrm>
-            <a:off x="2730960" y="4728600"/>
-            <a:ext cx="138600" cy="529560"/>
-          </a:xfrm>
-          <a:prstGeom prst="straightConnector1">
-            <a:avLst/>
-          </a:prstGeom>
-          <a:ln w="25400">
-            <a:solidFill>
-              <a:srgbClr val="000000"/>
-            </a:solidFill>
-            <a:round/>
-          </a:ln>
-        </p:spPr>
-      </p:cxnSp>
-      <p:sp>
-        <p:nvSpPr>
-          <p:cNvPr id="120" name="Diamond 30"/>
-          <p:cNvSpPr/>
-          <p:nvPr/>
-        </p:nvSpPr>
-        <p:spPr>
-          <a:xfrm>
-            <a:off x="6431400" y="5329440"/>
-            <a:ext cx="1569240" cy="385200"/>
+            <a:off x="7627320" y="5329800"/>
+            <a:ext cx="1797840" cy="385200"/>
           </a:xfrm>
           <a:prstGeom prst="diamond">
             <a:avLst/>
@@ -8541,7 +8627,7 @@
                 </a:solidFill>
                 <a:latin typeface="Calibri"/>
               </a:rPr>
-              <a:t>Costs</a:t>
+              <a:t>Drawback</a:t>
             </a:r>
             <a:endParaRPr b="0" lang="en-US" sz="1400" spc="-1" strike="noStrike">
               <a:solidFill>
@@ -8552,23 +8638,148 @@
           </a:p>
         </p:txBody>
       </p:sp>
-      <p:sp>
-        <p:nvSpPr>
-          <p:cNvPr id="121" name="Diamond 31"/>
+      <p:cxnSp>
+        <p:nvCxnSpPr>
+          <p:cNvPr id="121" name="Straight Arrow Connector 76"/>
+          <p:cNvCxnSpPr>
+            <a:stCxn id="86" idx="1"/>
+            <a:endCxn id="119" idx="3"/>
+          </p:cNvCxnSpPr>
+          <p:nvPr/>
+        </p:nvCxnSpPr>
+        <p:spPr>
+          <a:xfrm flipH="1">
+            <a:off x="9196560" y="3733560"/>
+            <a:ext cx="1371960" cy="1260000"/>
+          </a:xfrm>
+          <a:prstGeom prst="straightConnector1">
+            <a:avLst/>
+          </a:prstGeom>
+          <a:ln cap="sq" w="76200">
+            <a:solidFill>
+              <a:srgbClr val="000000"/>
+            </a:solidFill>
+            <a:round/>
+            <a:tailEnd len="sm" type="triangle" w="sm"/>
+          </a:ln>
+        </p:spPr>
+      </p:cxnSp>
+      <p:cxnSp>
+        <p:nvCxnSpPr>
+          <p:cNvPr id="122" name="Straight Arrow Connector 77"/>
+          <p:cNvCxnSpPr>
+            <a:stCxn id="119" idx="1"/>
+            <a:endCxn id="106" idx="3"/>
+          </p:cNvCxnSpPr>
+          <p:nvPr/>
+        </p:nvCxnSpPr>
+        <p:spPr>
+          <a:xfrm flipH="1">
+            <a:off x="7036200" y="4993200"/>
+            <a:ext cx="591480" cy="187920"/>
+          </a:xfrm>
+          <a:prstGeom prst="straightConnector1">
+            <a:avLst/>
+          </a:prstGeom>
+          <a:ln w="25400">
+            <a:solidFill>
+              <a:srgbClr val="000000"/>
+            </a:solidFill>
+            <a:round/>
+          </a:ln>
+        </p:spPr>
+      </p:cxnSp>
+      <p:cxnSp>
+        <p:nvCxnSpPr>
+          <p:cNvPr id="123" name="Straight Arrow Connector 78"/>
+          <p:cNvCxnSpPr>
+            <a:stCxn id="120" idx="1"/>
+            <a:endCxn id="106" idx="3"/>
+          </p:cNvCxnSpPr>
+          <p:nvPr/>
+        </p:nvCxnSpPr>
+        <p:spPr>
+          <a:xfrm flipH="1" flipV="1">
+            <a:off x="7036200" y="5180760"/>
+            <a:ext cx="591480" cy="342000"/>
+          </a:xfrm>
+          <a:prstGeom prst="straightConnector1">
+            <a:avLst/>
+          </a:prstGeom>
+          <a:ln w="25400">
+            <a:solidFill>
+              <a:srgbClr val="000000"/>
+            </a:solidFill>
+            <a:round/>
+          </a:ln>
+        </p:spPr>
+      </p:cxnSp>
+      <p:cxnSp>
+        <p:nvCxnSpPr>
+          <p:cNvPr id="124" name="Straight Arrow Connector 79"/>
+          <p:cNvCxnSpPr>
+            <a:stCxn id="86" idx="1"/>
+            <a:endCxn id="120" idx="3"/>
+          </p:cNvCxnSpPr>
+          <p:nvPr/>
+        </p:nvCxnSpPr>
+        <p:spPr>
+          <a:xfrm flipH="1">
+            <a:off x="9425160" y="3733560"/>
+            <a:ext cx="1143360" cy="1789200"/>
+          </a:xfrm>
+          <a:prstGeom prst="straightConnector1">
+            <a:avLst/>
+          </a:prstGeom>
+          <a:ln cap="sq" w="76200">
+            <a:solidFill>
+              <a:srgbClr val="000000"/>
+            </a:solidFill>
+            <a:round/>
+            <a:tailEnd len="sm" type="triangle" w="sm"/>
+          </a:ln>
+        </p:spPr>
+      </p:cxnSp>
+      <p:cxnSp>
+        <p:nvCxnSpPr>
+          <p:cNvPr id="125" name="Straight Arrow Connector 12"/>
+          <p:cNvCxnSpPr>
+            <a:stCxn id="74" idx="1"/>
+            <a:endCxn id="63" idx="3"/>
+          </p:cNvCxnSpPr>
+          <p:nvPr/>
+        </p:nvCxnSpPr>
+        <p:spPr>
+          <a:xfrm flipH="1">
+            <a:off x="4165560" y="1107000"/>
+            <a:ext cx="261720" cy="68400"/>
+          </a:xfrm>
+          <a:prstGeom prst="straightConnector1">
+            <a:avLst/>
+          </a:prstGeom>
+          <a:ln w="25400">
+            <a:solidFill>
+              <a:srgbClr val="000000"/>
+            </a:solidFill>
+            <a:round/>
+          </a:ln>
+        </p:spPr>
+      </p:cxnSp>
+      <p:sp>
+        <p:nvSpPr>
+          <p:cNvPr id="126" name="Oval 6"/>
           <p:cNvSpPr/>
           <p:nvPr/>
         </p:nvSpPr>
         <p:spPr>
           <a:xfrm>
-            <a:off x="6431400" y="5786640"/>
-            <a:ext cx="1797840" cy="385200"/>
-          </a:xfrm>
-          <a:prstGeom prst="diamond">
-            <a:avLst/>
-          </a:prstGeom>
-          <a:solidFill>
-            <a:schemeClr val="bg1"/>
-          </a:solidFill>
+            <a:off x="8053560" y="2057400"/>
+            <a:ext cx="1220760" cy="385200"/>
+          </a:xfrm>
+          <a:prstGeom prst="ellipse">
+            <a:avLst/>
+          </a:prstGeom>
+          <a:noFill/>
           <a:ln>
             <a:solidFill>
               <a:srgbClr val="000000"/>
@@ -8600,15 +8811,15 @@
               </a:lnSpc>
             </a:pPr>
             <a:r>
-              <a:rPr b="0" lang="en-US" sz="1400" spc="-1" strike="noStrike">
+              <a:rPr b="0" lang="en-US" sz="1410" spc="-1" strike="noStrike">
                 <a:solidFill>
                   <a:schemeClr val="dk1"/>
                 </a:solidFill>
                 <a:latin typeface="Calibri"/>
               </a:rPr>
-              <a:t>Drawback</a:t>
-            </a:r>
-            <a:endParaRPr b="0" lang="en-US" sz="1400" spc="-1" strike="noStrike">
+              <a:t>Level</a:t>
+            </a:r>
+            <a:endParaRPr b="0" lang="en-US" sz="1410" spc="-1" strike="noStrike">
               <a:solidFill>
                 <a:srgbClr val="000000"/>
               </a:solidFill>
@@ -8619,119 +8830,17 @@
       </p:sp>
       <p:cxnSp>
         <p:nvCxnSpPr>
-          <p:cNvPr id="122" name="Straight Arrow Connector 76"/>
+          <p:cNvPr id="127" name="Straight Arrow Connector 50"/>
           <p:cNvCxnSpPr>
-            <a:stCxn id="85" idx="1"/>
-            <a:endCxn id="120" idx="3"/>
+            <a:stCxn id="126" idx="0"/>
+            <a:endCxn id="102" idx="2"/>
           </p:cNvCxnSpPr>
           <p:nvPr/>
         </p:nvCxnSpPr>
         <p:spPr>
-          <a:xfrm flipH="1">
-            <a:off x="8000640" y="4190760"/>
-            <a:ext cx="686520" cy="1331640"/>
-          </a:xfrm>
-          <a:prstGeom prst="straightConnector1">
-            <a:avLst/>
-          </a:prstGeom>
-          <a:ln cap="sq" w="76200">
-            <a:solidFill>
-              <a:srgbClr val="000000"/>
-            </a:solidFill>
-            <a:round/>
-            <a:tailEnd len="sm" type="triangle" w="sm"/>
-          </a:ln>
-        </p:spPr>
-      </p:cxnSp>
-      <p:cxnSp>
-        <p:nvCxnSpPr>
-          <p:cNvPr id="123" name="Straight Arrow Connector 77"/>
-          <p:cNvCxnSpPr>
-            <a:stCxn id="120" idx="1"/>
-            <a:endCxn id="107" idx="3"/>
-          </p:cNvCxnSpPr>
-          <p:nvPr/>
-        </p:nvCxnSpPr>
-        <p:spPr>
-          <a:xfrm flipH="1">
-            <a:off x="6171840" y="5522040"/>
-            <a:ext cx="259920" cy="270360"/>
-          </a:xfrm>
-          <a:prstGeom prst="straightConnector1">
-            <a:avLst/>
-          </a:prstGeom>
-          <a:ln w="25400">
-            <a:solidFill>
-              <a:srgbClr val="000000"/>
-            </a:solidFill>
-            <a:round/>
-          </a:ln>
-        </p:spPr>
-      </p:cxnSp>
-      <p:cxnSp>
-        <p:nvCxnSpPr>
-          <p:cNvPr id="124" name="Straight Arrow Connector 78"/>
-          <p:cNvCxnSpPr>
-            <a:stCxn id="121" idx="1"/>
-            <a:endCxn id="107" idx="3"/>
-          </p:cNvCxnSpPr>
-          <p:nvPr/>
-        </p:nvCxnSpPr>
-        <p:spPr>
-          <a:xfrm flipH="1" flipV="1">
-            <a:off x="6171840" y="5792040"/>
-            <a:ext cx="259920" cy="187560"/>
-          </a:xfrm>
-          <a:prstGeom prst="straightConnector1">
-            <a:avLst/>
-          </a:prstGeom>
-          <a:ln w="25400">
-            <a:solidFill>
-              <a:srgbClr val="000000"/>
-            </a:solidFill>
-            <a:round/>
-          </a:ln>
-        </p:spPr>
-      </p:cxnSp>
-      <p:cxnSp>
-        <p:nvCxnSpPr>
-          <p:cNvPr id="125" name="Straight Arrow Connector 79"/>
-          <p:cNvCxnSpPr>
-            <a:stCxn id="85" idx="1"/>
-            <a:endCxn id="121" idx="3"/>
-          </p:cNvCxnSpPr>
-          <p:nvPr/>
-        </p:nvCxnSpPr>
-        <p:spPr>
-          <a:xfrm flipH="1">
-            <a:off x="8229240" y="4190760"/>
-            <a:ext cx="457920" cy="1788840"/>
-          </a:xfrm>
-          <a:prstGeom prst="straightConnector1">
-            <a:avLst/>
-          </a:prstGeom>
-          <a:ln cap="sq" w="76200">
-            <a:solidFill>
-              <a:srgbClr val="000000"/>
-            </a:solidFill>
-            <a:round/>
-            <a:tailEnd len="sm" type="triangle" w="sm"/>
-          </a:ln>
-        </p:spPr>
-      </p:cxnSp>
-      <p:cxnSp>
-        <p:nvCxnSpPr>
-          <p:cNvPr id="126" name="Straight Arrow Connector 12"/>
-          <p:cNvCxnSpPr>
-            <a:stCxn id="74" idx="1"/>
-            <a:endCxn id="63" idx="3"/>
-          </p:cNvCxnSpPr>
-          <p:nvPr/>
-        </p:nvCxnSpPr>
-        <p:spPr>
-          <a:xfrm flipH="1">
-            <a:off x="4113000" y="538560"/>
-            <a:ext cx="259920" cy="301680"/>
+          <a:xfrm flipV="1">
+            <a:off x="8664120" y="1828800"/>
+            <a:ext cx="646560" cy="228960"/>
           </a:xfrm>
           <a:prstGeom prst="straightConnector1">
             <a:avLst/>
@@ -8776,7 +8885,7 @@
       </p:grpSpPr>
       <p:cxnSp>
         <p:nvCxnSpPr>
-          <p:cNvPr id="127" name="Straight Arrow Connector 1"/>
+          <p:cNvPr id="128" name="Straight Arrow Connector 1"/>
           <p:cNvCxnSpPr/>
           <p:nvPr/>
         </p:nvCxnSpPr>
@@ -8799,7 +8908,7 @@
       </p:cxnSp>
       <p:cxnSp>
         <p:nvCxnSpPr>
-          <p:cNvPr id="128" name="Straight Arrow Connector 2"/>
+          <p:cNvPr id="129" name="Straight Arrow Connector 2"/>
           <p:cNvCxnSpPr/>
           <p:nvPr/>
         </p:nvCxnSpPr>
@@ -8822,7 +8931,7 @@
       </p:cxnSp>
       <p:cxnSp>
         <p:nvCxnSpPr>
-          <p:cNvPr id="129" name="Straight Arrow Connector 3"/>
+          <p:cNvPr id="130" name="Straight Arrow Connector 3"/>
           <p:cNvCxnSpPr/>
           <p:nvPr/>
         </p:nvCxnSpPr>
@@ -8845,7 +8954,7 @@
       </p:cxnSp>
       <p:cxnSp>
         <p:nvCxnSpPr>
-          <p:cNvPr id="130" name="Straight Arrow Connector 4"/>
+          <p:cNvPr id="131" name="Straight Arrow Connector 4"/>
           <p:cNvCxnSpPr/>
           <p:nvPr/>
         </p:nvCxnSpPr>
@@ -8867,7 +8976,7 @@
       </p:cxnSp>
       <p:sp>
         <p:nvSpPr>
-          <p:cNvPr id="131" name="Diamond 1"/>
+          <p:cNvPr id="132" name="Diamond 1"/>
           <p:cNvSpPr/>
           <p:nvPr/>
         </p:nvSpPr>
@@ -8932,7 +9041,7 @@
       </p:sp>
       <p:sp>
         <p:nvSpPr>
-          <p:cNvPr id="132" name="Oval 1"/>
+          <p:cNvPr id="133" name="Oval 1"/>
           <p:cNvSpPr/>
           <p:nvPr/>
         </p:nvSpPr>
@@ -8995,7 +9104,7 @@
       </p:sp>
       <p:grpSp>
         <p:nvGrpSpPr>
-          <p:cNvPr id="133" name="Group 1"/>
+          <p:cNvPr id="134" name="Group 1"/>
           <p:cNvGrpSpPr/>
           <p:nvPr/>
         </p:nvGrpSpPr>
@@ -9009,7 +9118,7 @@
         </p:grpSpPr>
         <p:sp>
           <p:nvSpPr>
-            <p:cNvPr id="134" name="TextBox 1"/>
+            <p:cNvPr id="135" name="TextBox 1"/>
             <p:cNvSpPr/>
             <p:nvPr/>
           </p:nvSpPr>
@@ -9066,7 +9175,7 @@
         </p:sp>
         <p:sp>
           <p:nvSpPr>
-            <p:cNvPr id="135" name="TextBox 2"/>
+            <p:cNvPr id="136" name="TextBox 2"/>
             <p:cNvSpPr/>
             <p:nvPr/>
           </p:nvSpPr>
@@ -9157,7 +9266,7 @@
       </p:grpSp>
       <p:sp>
         <p:nvSpPr>
-          <p:cNvPr id="136" name="Diamond 2"/>
+          <p:cNvPr id="137" name="Diamond 2"/>
           <p:cNvSpPr/>
           <p:nvPr/>
         </p:nvSpPr>
@@ -9245,7 +9354,7 @@
       </p:sp>
       <p:cxnSp>
         <p:nvCxnSpPr>
-          <p:cNvPr id="137" name="Straight Arrow Connector 5"/>
+          <p:cNvPr id="138" name="Straight Arrow Connector 5"/>
           <p:cNvCxnSpPr/>
           <p:nvPr/>
         </p:nvCxnSpPr>
@@ -9267,7 +9376,7 @@
       </p:cxnSp>
       <p:sp>
         <p:nvSpPr>
-          <p:cNvPr id="138" name="Isosceles Triangle 1"/>
+          <p:cNvPr id="139" name="Isosceles Triangle 1"/>
           <p:cNvSpPr/>
           <p:nvPr/>
         </p:nvSpPr>
@@ -9334,7 +9443,7 @@
       </p:sp>
       <p:grpSp>
         <p:nvGrpSpPr>
-          <p:cNvPr id="139" name="Group 2"/>
+          <p:cNvPr id="140" name="Group 2"/>
           <p:cNvGrpSpPr/>
           <p:nvPr/>
         </p:nvGrpSpPr>
@@ -9348,7 +9457,7 @@
         </p:grpSpPr>
         <p:sp>
           <p:nvSpPr>
-            <p:cNvPr id="140" name="TextBox 3"/>
+            <p:cNvPr id="141" name="TextBox 3"/>
             <p:cNvSpPr/>
             <p:nvPr/>
           </p:nvSpPr>
@@ -9406,7 +9515,7 @@
         </p:sp>
         <p:sp>
           <p:nvSpPr>
-            <p:cNvPr id="141" name="TextBox 4"/>
+            <p:cNvPr id="142" name="TextBox 4"/>
             <p:cNvSpPr/>
             <p:nvPr/>
           </p:nvSpPr>
@@ -9498,7 +9607,7 @@
       </p:grpSp>
       <p:sp>
         <p:nvSpPr>
-          <p:cNvPr id="142" name="TextBox 19"/>
+          <p:cNvPr id="143" name="TextBox 19"/>
           <p:cNvSpPr/>
           <p:nvPr/>
         </p:nvSpPr>
@@ -9555,7 +9664,7 @@
       </p:sp>
       <p:sp>
         <p:nvSpPr>
-          <p:cNvPr id="143" name="TextBox 20"/>
+          <p:cNvPr id="144" name="TextBox 20"/>
           <p:cNvSpPr/>
           <p:nvPr/>
         </p:nvSpPr>
@@ -9672,27 +9781,27 @@
       </p:sp>
       <p:grpSp>
         <p:nvGrpSpPr>
-          <p:cNvPr id="144" name="Group 6"/>
+          <p:cNvPr id="145" name="Group 6"/>
           <p:cNvGrpSpPr/>
           <p:nvPr/>
         </p:nvGrpSpPr>
         <p:grpSpPr>
           <a:xfrm>
-            <a:off x="4343400" y="4114800"/>
+            <a:off x="4572000" y="4274280"/>
             <a:ext cx="1623960" cy="991440"/>
-            <a:chOff x="4343400" y="4114800"/>
+            <a:chOff x="4572000" y="4274280"/>
             <a:chExt cx="1623960" cy="991440"/>
           </a:xfrm>
         </p:grpSpPr>
         <p:sp>
           <p:nvSpPr>
-            <p:cNvPr id="145" name="TextBox 21"/>
+            <p:cNvPr id="146" name="TextBox 21"/>
             <p:cNvSpPr/>
             <p:nvPr/>
           </p:nvSpPr>
           <p:spPr>
             <a:xfrm>
-              <a:off x="4343400" y="4114800"/>
+              <a:off x="4572000" y="4274280"/>
               <a:ext cx="1623960" cy="303120"/>
             </a:xfrm>
             <a:prstGeom prst="rect">
@@ -9743,13 +9852,13 @@
         </p:sp>
         <p:sp>
           <p:nvSpPr>
-            <p:cNvPr id="146" name="TextBox 30"/>
+            <p:cNvPr id="147" name="TextBox 30"/>
             <p:cNvSpPr/>
             <p:nvPr/>
           </p:nvSpPr>
           <p:spPr>
             <a:xfrm>
-              <a:off x="4343400" y="4376160"/>
+              <a:off x="4572000" y="4535640"/>
               <a:ext cx="1623960" cy="730080"/>
             </a:xfrm>
             <a:prstGeom prst="rect">
@@ -9861,13 +9970,13 @@
       </p:grpSp>
       <p:sp>
         <p:nvSpPr>
-          <p:cNvPr id="147" name="Diamond 9"/>
+          <p:cNvPr id="148" name="Diamond 9"/>
           <p:cNvSpPr/>
           <p:nvPr/>
         </p:nvSpPr>
         <p:spPr>
           <a:xfrm>
-            <a:off x="2743200" y="2356560"/>
+            <a:off x="3231360" y="2899800"/>
             <a:ext cx="1569240" cy="385200"/>
           </a:xfrm>
           <a:prstGeom prst="diamond">
@@ -9926,13 +10035,13 @@
       </p:sp>
       <p:sp>
         <p:nvSpPr>
-          <p:cNvPr id="148" name="Diamond 10"/>
+          <p:cNvPr id="149" name="Diamond 10"/>
           <p:cNvSpPr/>
           <p:nvPr/>
         </p:nvSpPr>
         <p:spPr>
           <a:xfrm>
-            <a:off x="4572000" y="2355120"/>
+            <a:off x="4602960" y="2585160"/>
             <a:ext cx="1797840" cy="386640"/>
           </a:xfrm>
           <a:prstGeom prst="diamond">
@@ -9991,17 +10100,17 @@
       </p:sp>
       <p:cxnSp>
         <p:nvCxnSpPr>
-          <p:cNvPr id="149" name="Straight Arrow Connector 24"/>
+          <p:cNvPr id="150" name="Straight Arrow Connector 24"/>
           <p:cNvCxnSpPr>
-            <a:stCxn id="144" idx="0"/>
-            <a:endCxn id="147" idx="2"/>
+            <a:stCxn id="145" idx="0"/>
+            <a:endCxn id="148" idx="2"/>
           </p:cNvCxnSpPr>
           <p:nvPr/>
         </p:nvCxnSpPr>
         <p:spPr>
           <a:xfrm flipH="1" flipV="1">
-            <a:off x="3528000" y="2741760"/>
-            <a:ext cx="1627560" cy="1373400"/>
+            <a:off x="4016160" y="3285000"/>
+            <a:ext cx="1368000" cy="989640"/>
           </a:xfrm>
           <a:prstGeom prst="straightConnector1">
             <a:avLst/>
@@ -10017,17 +10126,17 @@
       </p:cxnSp>
       <p:cxnSp>
         <p:nvCxnSpPr>
-          <p:cNvPr id="150" name="Straight Arrow Connector 18"/>
+          <p:cNvPr id="151" name="Straight Arrow Connector 18"/>
           <p:cNvCxnSpPr>
-            <a:stCxn id="148" idx="0"/>
-            <a:endCxn id="143" idx="2"/>
+            <a:stCxn id="149" idx="0"/>
+            <a:endCxn id="144" idx="2"/>
           </p:cNvCxnSpPr>
           <p:nvPr/>
         </p:nvCxnSpPr>
         <p:spPr>
           <a:xfrm flipV="1">
-            <a:off x="5470920" y="1448640"/>
-            <a:ext cx="116280" cy="906840"/>
+            <a:off x="5501880" y="1448640"/>
+            <a:ext cx="85320" cy="1136880"/>
           </a:xfrm>
           <a:prstGeom prst="straightConnector1">
             <a:avLst/>
@@ -10042,17 +10151,17 @@
       </p:cxnSp>
       <p:cxnSp>
         <p:nvCxnSpPr>
-          <p:cNvPr id="151" name="Straight Arrow Connector 17"/>
+          <p:cNvPr id="152" name="Straight Arrow Connector 17"/>
           <p:cNvCxnSpPr>
-            <a:stCxn id="144" idx="0"/>
-            <a:endCxn id="148" idx="2"/>
+            <a:stCxn id="145" idx="0"/>
+            <a:endCxn id="149" idx="2"/>
           </p:cNvCxnSpPr>
           <p:nvPr/>
         </p:nvCxnSpPr>
         <p:spPr>
           <a:xfrm flipV="1">
-            <a:off x="5155200" y="2741760"/>
-            <a:ext cx="316080" cy="1373400"/>
+            <a:off x="5383800" y="2971800"/>
+            <a:ext cx="118440" cy="1302840"/>
           </a:xfrm>
           <a:prstGeom prst="straightConnector1">
             <a:avLst/>
@@ -10067,17 +10176,17 @@
       </p:cxnSp>
       <p:cxnSp>
         <p:nvCxnSpPr>
-          <p:cNvPr id="152" name="Straight Arrow Connector 23"/>
+          <p:cNvPr id="153" name="Straight Arrow Connector 23"/>
           <p:cNvCxnSpPr>
-            <a:stCxn id="143" idx="2"/>
-            <a:endCxn id="147" idx="0"/>
+            <a:stCxn id="144" idx="2"/>
+            <a:endCxn id="148" idx="0"/>
           </p:cNvCxnSpPr>
           <p:nvPr/>
         </p:nvCxnSpPr>
         <p:spPr>
           <a:xfrm flipH="1">
-            <a:off x="3528000" y="1448640"/>
-            <a:ext cx="2059200" cy="908280"/>
+            <a:off x="4016160" y="1448640"/>
+            <a:ext cx="1571040" cy="1451520"/>
           </a:xfrm>
           <a:prstGeom prst="straightConnector1">
             <a:avLst/>
@@ -10092,13 +10201,13 @@
       </p:cxnSp>
       <p:sp>
         <p:nvSpPr>
-          <p:cNvPr id="153" name="Diamond 11"/>
+          <p:cNvPr id="154" name="Diamond 11"/>
           <p:cNvSpPr/>
           <p:nvPr/>
         </p:nvSpPr>
         <p:spPr>
           <a:xfrm>
-            <a:off x="2743200" y="300240"/>
+            <a:off x="2743200" y="457200"/>
             <a:ext cx="1569240" cy="385200"/>
           </a:xfrm>
           <a:prstGeom prst="diamond">
@@ -10157,17 +10266,17 @@
       </p:sp>
       <p:cxnSp>
         <p:nvCxnSpPr>
-          <p:cNvPr id="154" name="Straight Arrow Connector 25"/>
+          <p:cNvPr id="155" name="Straight Arrow Connector 25"/>
           <p:cNvCxnSpPr>
-            <a:stCxn id="143" idx="1"/>
-            <a:endCxn id="153" idx="3"/>
+            <a:stCxn id="144" idx="1"/>
+            <a:endCxn id="154" idx="3"/>
           </p:cNvCxnSpPr>
           <p:nvPr/>
         </p:nvCxnSpPr>
         <p:spPr>
           <a:xfrm flipH="1" flipV="1">
-            <a:off x="4312440" y="492840"/>
-            <a:ext cx="462960" cy="591120"/>
+            <a:off x="4312440" y="649800"/>
+            <a:ext cx="462960" cy="434160"/>
           </a:xfrm>
           <a:prstGeom prst="straightConnector1">
             <a:avLst/>
@@ -10182,17 +10291,17 @@
       </p:cxnSp>
       <p:cxnSp>
         <p:nvCxnSpPr>
-          <p:cNvPr id="155" name="Straight Arrow Connector 26"/>
+          <p:cNvPr id="156" name="Straight Arrow Connector 26"/>
           <p:cNvCxnSpPr>
-            <a:stCxn id="143" idx="2"/>
-            <a:endCxn id="153" idx="2"/>
+            <a:stCxn id="144" idx="1"/>
+            <a:endCxn id="154" idx="2"/>
           </p:cNvCxnSpPr>
           <p:nvPr/>
         </p:nvCxnSpPr>
         <p:spPr>
           <a:xfrm flipH="1" flipV="1">
-            <a:off x="3528000" y="685440"/>
-            <a:ext cx="2059200" cy="763560"/>
+            <a:off x="3528000" y="842400"/>
+            <a:ext cx="1247400" cy="241560"/>
           </a:xfrm>
           <a:prstGeom prst="straightConnector1">
             <a:avLst/>
@@ -10207,7 +10316,7 @@
       </p:cxnSp>
       <p:grpSp>
         <p:nvGrpSpPr>
-          <p:cNvPr id="156" name="Group 7"/>
+          <p:cNvPr id="157" name="Group 7"/>
           <p:cNvGrpSpPr/>
           <p:nvPr/>
         </p:nvGrpSpPr>
@@ -10221,7 +10330,7 @@
         </p:grpSpPr>
         <p:sp>
           <p:nvSpPr>
-            <p:cNvPr id="157" name="TextBox 31"/>
+            <p:cNvPr id="158" name="TextBox 31"/>
             <p:cNvSpPr/>
             <p:nvPr/>
           </p:nvSpPr>
@@ -10278,7 +10387,7 @@
         </p:sp>
         <p:sp>
           <p:nvSpPr>
-            <p:cNvPr id="158" name="TextBox 32"/>
+            <p:cNvPr id="159" name="TextBox 32"/>
             <p:cNvSpPr/>
             <p:nvPr/>
           </p:nvSpPr>
@@ -10396,7 +10505,7 @@
       </p:grpSp>
       <p:sp>
         <p:nvSpPr>
-          <p:cNvPr id="159" name="Diamond 12"/>
+          <p:cNvPr id="160" name="Diamond 12"/>
           <p:cNvSpPr/>
           <p:nvPr/>
         </p:nvSpPr>
@@ -10461,7 +10570,7 @@
       </p:sp>
       <p:sp>
         <p:nvSpPr>
-          <p:cNvPr id="160" name="Diamond 13"/>
+          <p:cNvPr id="161" name="Diamond 13"/>
           <p:cNvSpPr/>
           <p:nvPr/>
         </p:nvSpPr>
@@ -10526,7 +10635,7 @@
       </p:sp>
       <p:cxnSp>
         <p:nvCxnSpPr>
-          <p:cNvPr id="161" name="Straight Arrow Connector 27"/>
+          <p:cNvPr id="162" name="Straight Arrow Connector 27"/>
           <p:cNvCxnSpPr/>
           <p:nvPr/>
         </p:nvCxnSpPr>
@@ -10548,10 +10657,10 @@
       </p:cxnSp>
       <p:cxnSp>
         <p:nvCxnSpPr>
-          <p:cNvPr id="162" name="Straight Arrow Connector 28"/>
+          <p:cNvPr id="163" name="Straight Arrow Connector 28"/>
           <p:cNvCxnSpPr>
-            <a:stCxn id="160" idx="1"/>
-            <a:endCxn id="143" idx="3"/>
+            <a:stCxn id="161" idx="1"/>
+            <a:endCxn id="144" idx="3"/>
           </p:cNvCxnSpPr>
           <p:nvPr/>
         </p:nvCxnSpPr>
@@ -10573,7 +10682,7 @@
       </p:cxnSp>
       <p:sp>
         <p:nvSpPr>
-          <p:cNvPr id="163" name="Diamond 14"/>
+          <p:cNvPr id="164" name="Diamond 14"/>
           <p:cNvSpPr/>
           <p:nvPr/>
         </p:nvSpPr>
@@ -10638,10 +10747,10 @@
       </p:sp>
       <p:cxnSp>
         <p:nvCxnSpPr>
-          <p:cNvPr id="164" name="Straight Arrow Connector 30"/>
+          <p:cNvPr id="165" name="Straight Arrow Connector 30"/>
           <p:cNvCxnSpPr>
-            <a:stCxn id="156" idx="0"/>
-            <a:endCxn id="160" idx="3"/>
+            <a:stCxn id="157" idx="0"/>
+            <a:endCxn id="161" idx="3"/>
           </p:cNvCxnSpPr>
           <p:nvPr/>
         </p:nvCxnSpPr>
@@ -10664,13 +10773,13 @@
       </p:cxnSp>
       <p:sp>
         <p:nvSpPr>
-          <p:cNvPr id="165" name="Diamond 15"/>
+          <p:cNvPr id="166" name="Diamond 15"/>
           <p:cNvSpPr/>
           <p:nvPr/>
         </p:nvSpPr>
         <p:spPr>
           <a:xfrm>
-            <a:off x="6429960" y="2356560"/>
+            <a:off x="6629400" y="2514600"/>
             <a:ext cx="1569240" cy="385200"/>
           </a:xfrm>
           <a:prstGeom prst="diamond">
@@ -10729,17 +10838,17 @@
       </p:sp>
       <p:cxnSp>
         <p:nvCxnSpPr>
-          <p:cNvPr id="166" name="Straight Arrow Connector 32"/>
+          <p:cNvPr id="167" name="Straight Arrow Connector 32"/>
           <p:cNvCxnSpPr>
-            <a:stCxn id="156" idx="2"/>
-            <a:endCxn id="165" idx="3"/>
+            <a:stCxn id="157" idx="2"/>
+            <a:endCxn id="166" idx="3"/>
           </p:cNvCxnSpPr>
           <p:nvPr/>
         </p:nvCxnSpPr>
         <p:spPr>
           <a:xfrm flipH="1">
-            <a:off x="7999200" y="1828800"/>
-            <a:ext cx="1499760" cy="720720"/>
+            <a:off x="8198640" y="1828800"/>
+            <a:ext cx="1300320" cy="878760"/>
           </a:xfrm>
           <a:prstGeom prst="straightConnector1">
             <a:avLst/>
@@ -10754,17 +10863,17 @@
       </p:cxnSp>
       <p:cxnSp>
         <p:nvCxnSpPr>
-          <p:cNvPr id="167" name="Straight Arrow Connector 33"/>
+          <p:cNvPr id="168" name="Straight Arrow Connector 33"/>
           <p:cNvCxnSpPr>
-            <a:stCxn id="165" idx="1"/>
-            <a:endCxn id="144" idx="3"/>
+            <a:stCxn id="166" idx="1"/>
+            <a:endCxn id="145" idx="3"/>
           </p:cNvCxnSpPr>
           <p:nvPr/>
         </p:nvCxnSpPr>
         <p:spPr>
           <a:xfrm flipH="1">
-            <a:off x="5967360" y="2549160"/>
-            <a:ext cx="462960" cy="2061720"/>
+            <a:off x="6195960" y="2707200"/>
+            <a:ext cx="433800" cy="2063160"/>
           </a:xfrm>
           <a:prstGeom prst="straightConnector1">
             <a:avLst/>
@@ -10779,10 +10888,10 @@
       </p:cxnSp>
       <p:cxnSp>
         <p:nvCxnSpPr>
-          <p:cNvPr id="168" name="Straight Arrow Connector 34"/>
+          <p:cNvPr id="169" name="Straight Arrow Connector 34"/>
           <p:cNvCxnSpPr>
-            <a:stCxn id="156" idx="1"/>
-            <a:endCxn id="163" idx="3"/>
+            <a:stCxn id="157" idx="1"/>
+            <a:endCxn id="164" idx="3"/>
           </p:cNvCxnSpPr>
           <p:nvPr/>
         </p:nvCxnSpPr>
@@ -10804,10 +10913,10 @@
       </p:cxnSp>
       <p:cxnSp>
         <p:nvCxnSpPr>
-          <p:cNvPr id="169" name="Straight Arrow Connector 31"/>
+          <p:cNvPr id="170" name="Straight Arrow Connector 31"/>
           <p:cNvCxnSpPr>
-            <a:stCxn id="163" idx="1"/>
-            <a:endCxn id="143" idx="2"/>
+            <a:stCxn id="164" idx="1"/>
+            <a:endCxn id="144" idx="2"/>
           </p:cNvCxnSpPr>
           <p:nvPr/>
         </p:nvCxnSpPr>
@@ -10829,27 +10938,27 @@
       </p:cxnSp>
       <p:grpSp>
         <p:nvGrpSpPr>
-          <p:cNvPr id="170" name="Group 9"/>
+          <p:cNvPr id="171" name="Group 9"/>
           <p:cNvGrpSpPr/>
           <p:nvPr/>
         </p:nvGrpSpPr>
         <p:grpSpPr>
           <a:xfrm>
-            <a:off x="8433000" y="4392720"/>
+            <a:off x="9576000" y="4343400"/>
             <a:ext cx="1623960" cy="564480"/>
-            <a:chOff x="8433000" y="4392720"/>
+            <a:chOff x="9576000" y="4343400"/>
             <a:chExt cx="1623960" cy="564480"/>
           </a:xfrm>
         </p:grpSpPr>
         <p:sp>
           <p:nvSpPr>
-            <p:cNvPr id="171" name="TextBox 47"/>
+            <p:cNvPr id="172" name="TextBox 47"/>
             <p:cNvSpPr/>
             <p:nvPr/>
           </p:nvSpPr>
           <p:spPr>
             <a:xfrm>
-              <a:off x="8433000" y="4392720"/>
+              <a:off x="9576000" y="4343400"/>
               <a:ext cx="1623960" cy="303120"/>
             </a:xfrm>
             <a:prstGeom prst="rect">
@@ -10900,13 +11009,13 @@
         </p:sp>
         <p:sp>
           <p:nvSpPr>
-            <p:cNvPr id="172" name="TextBox 48"/>
+            <p:cNvPr id="173" name="TextBox 48"/>
             <p:cNvSpPr/>
             <p:nvPr/>
           </p:nvSpPr>
           <p:spPr>
             <a:xfrm>
-              <a:off x="8433000" y="4654080"/>
+              <a:off x="9576000" y="4604760"/>
               <a:ext cx="1623960" cy="303120"/>
             </a:xfrm>
             <a:prstGeom prst="rect">
@@ -10942,16 +11051,7 @@
                 <a:buFont typeface="OpenSymbol"/>
                 <a:buChar char="-"/>
               </a:pPr>
-              <a:r>
-                <a:rPr b="0" lang="en-US" sz="1400" spc="-1" strike="noStrike">
-                  <a:solidFill>
-                    <a:schemeClr val="dk1"/>
-                  </a:solidFill>
-                  <a:latin typeface="Calibri"/>
-                </a:rPr>
-                <a:t> </a:t>
-              </a:r>
-              <a:endParaRPr b="0" lang="en-US" sz="1400" spc="-1" strike="noStrike">
+              <a:endParaRPr b="0" lang="en-US" sz="1800" spc="-1" strike="noStrike">
                 <a:solidFill>
                   <a:srgbClr val="000000"/>
                 </a:solidFill>
@@ -10963,7 +11063,7 @@
       </p:grpSp>
       <p:grpSp>
         <p:nvGrpSpPr>
-          <p:cNvPr id="173" name="Group 11"/>
+          <p:cNvPr id="174" name="Group 11"/>
           <p:cNvGrpSpPr/>
           <p:nvPr/>
         </p:nvGrpSpPr>
@@ -10977,7 +11077,7 @@
         </p:grpSpPr>
         <p:sp>
           <p:nvSpPr>
-            <p:cNvPr id="174" name="TextBox 51"/>
+            <p:cNvPr id="175" name="TextBox 51"/>
             <p:cNvSpPr/>
             <p:nvPr/>
           </p:nvSpPr>
@@ -11034,7 +11134,7 @@
         </p:sp>
         <p:sp>
           <p:nvSpPr>
-            <p:cNvPr id="175" name="TextBox 52"/>
+            <p:cNvPr id="176" name="TextBox 52"/>
             <p:cNvSpPr/>
             <p:nvPr/>
           </p:nvSpPr>
@@ -11125,27 +11225,27 @@
       </p:grpSp>
       <p:grpSp>
         <p:nvGrpSpPr>
-          <p:cNvPr id="176" name="Group 14"/>
+          <p:cNvPr id="177" name="Group 14"/>
           <p:cNvGrpSpPr/>
           <p:nvPr/>
         </p:nvGrpSpPr>
         <p:grpSpPr>
           <a:xfrm>
-            <a:off x="6400800" y="4205880"/>
+            <a:off x="7214400" y="4359960"/>
             <a:ext cx="1623960" cy="564120"/>
-            <a:chOff x="6400800" y="4205880"/>
+            <a:chOff x="7214400" y="4359960"/>
             <a:chExt cx="1623960" cy="564120"/>
           </a:xfrm>
         </p:grpSpPr>
         <p:sp>
           <p:nvSpPr>
-            <p:cNvPr id="177" name="TextBox 55"/>
+            <p:cNvPr id="178" name="TextBox 55"/>
             <p:cNvSpPr/>
             <p:nvPr/>
           </p:nvSpPr>
           <p:spPr>
             <a:xfrm>
-              <a:off x="6400800" y="4205880"/>
+              <a:off x="7214400" y="4359960"/>
               <a:ext cx="1623960" cy="303120"/>
             </a:xfrm>
             <a:prstGeom prst="rect">
@@ -11196,13 +11296,13 @@
         </p:sp>
         <p:sp>
           <p:nvSpPr>
-            <p:cNvPr id="178" name="TextBox 56"/>
+            <p:cNvPr id="179" name="TextBox 56"/>
             <p:cNvSpPr/>
             <p:nvPr/>
           </p:nvSpPr>
           <p:spPr>
             <a:xfrm>
-              <a:off x="6400800" y="4467240"/>
+              <a:off x="7214400" y="4621320"/>
               <a:ext cx="1623960" cy="302760"/>
             </a:xfrm>
             <a:prstGeom prst="rect">
@@ -11245,13 +11345,13 @@
       </p:grpSp>
       <p:sp>
         <p:nvSpPr>
-          <p:cNvPr id="179" name="Isosceles Triangle 6"/>
+          <p:cNvPr id="180" name="Isosceles Triangle 6"/>
           <p:cNvSpPr/>
           <p:nvPr/>
         </p:nvSpPr>
         <p:spPr>
           <a:xfrm>
-            <a:off x="9601200" y="2127960"/>
+            <a:off x="9144000" y="2057400"/>
             <a:ext cx="480240" cy="385200"/>
           </a:xfrm>
           <a:prstGeom prst="triangle">
@@ -11312,17 +11412,16 @@
       </p:sp>
       <p:cxnSp>
         <p:nvCxnSpPr>
-          <p:cNvPr id="180" name="Straight Arrow Connector 51"/>
+          <p:cNvPr id="181" name="Straight Arrow Connector 51"/>
           <p:cNvCxnSpPr>
-            <a:stCxn id="181" idx="2"/>
-            <a:endCxn id="176" idx="0"/>
+            <a:stCxn id="182" idx="3"/>
           </p:cNvCxnSpPr>
           <p:nvPr/>
         </p:nvCxnSpPr>
         <p:spPr>
           <a:xfrm flipH="1">
-            <a:off x="7212600" y="4114440"/>
-            <a:ext cx="765360" cy="91800"/>
+            <a:off x="8026200" y="4114440"/>
+            <a:ext cx="1435680" cy="245880"/>
           </a:xfrm>
           <a:prstGeom prst="straightConnector1">
             <a:avLst/>
@@ -11337,17 +11436,17 @@
       </p:cxnSp>
       <p:cxnSp>
         <p:nvCxnSpPr>
-          <p:cNvPr id="182" name="Straight Arrow Connector 53"/>
+          <p:cNvPr id="183" name="Straight Arrow Connector 53"/>
           <p:cNvCxnSpPr>
-            <a:stCxn id="170" idx="0"/>
-            <a:endCxn id="181" idx="4"/>
+            <a:stCxn id="171" idx="0"/>
+            <a:endCxn id="182" idx="3"/>
           </p:cNvCxnSpPr>
           <p:nvPr/>
         </p:nvCxnSpPr>
         <p:spPr>
           <a:xfrm flipH="1" flipV="1">
-            <a:off x="8457840" y="4114440"/>
-            <a:ext cx="787320" cy="278640"/>
+            <a:off x="9461520" y="4114440"/>
+            <a:ext cx="926640" cy="229320"/>
           </a:xfrm>
           <a:prstGeom prst="straightConnector1">
             <a:avLst/>
@@ -11362,16 +11461,17 @@
       </p:cxnSp>
       <p:cxnSp>
         <p:nvCxnSpPr>
-          <p:cNvPr id="183" name="Straight Arrow Connector 54"/>
+          <p:cNvPr id="184" name="Straight Arrow Connector 54"/>
           <p:cNvCxnSpPr>
-            <a:stCxn id="179" idx="3"/>
+            <a:stCxn id="180" idx="3"/>
+            <a:endCxn id="185" idx="0"/>
           </p:cNvCxnSpPr>
           <p:nvPr/>
         </p:nvCxnSpPr>
         <p:spPr>
           <a:xfrm flipH="1">
-            <a:off x="8103240" y="2513160"/>
-            <a:ext cx="1738440" cy="367200"/>
+            <a:off x="9346320" y="2442600"/>
+            <a:ext cx="38160" cy="437400"/>
           </a:xfrm>
           <a:prstGeom prst="straightConnector1">
             <a:avLst/>
@@ -11386,17 +11486,17 @@
       </p:cxnSp>
       <p:cxnSp>
         <p:nvCxnSpPr>
-          <p:cNvPr id="184" name="Straight Arrow Connector 55"/>
+          <p:cNvPr id="186" name="Straight Arrow Connector 55"/>
           <p:cNvCxnSpPr>
-            <a:stCxn id="156" idx="2"/>
-            <a:endCxn id="179" idx="0"/>
+            <a:stCxn id="157" idx="2"/>
+            <a:endCxn id="180" idx="0"/>
           </p:cNvCxnSpPr>
           <p:nvPr/>
         </p:nvCxnSpPr>
         <p:spPr>
-          <a:xfrm>
-            <a:off x="9498600" y="1828800"/>
-            <a:ext cx="343080" cy="299520"/>
+          <a:xfrm flipH="1">
+            <a:off x="9384120" y="1828800"/>
+            <a:ext cx="114840" cy="228960"/>
           </a:xfrm>
           <a:prstGeom prst="straightConnector1">
             <a:avLst/>
@@ -11411,13 +11511,13 @@
       </p:cxnSp>
       <p:sp>
         <p:nvSpPr>
-          <p:cNvPr id="185" name="TextBox 73"/>
+          <p:cNvPr id="187" name="TextBox 73"/>
           <p:cNvSpPr/>
           <p:nvPr/>
         </p:nvSpPr>
         <p:spPr>
           <a:xfrm>
-            <a:off x="6629400" y="5715000"/>
+            <a:off x="7543800" y="5715000"/>
             <a:ext cx="1623960" cy="303120"/>
           </a:xfrm>
           <a:prstGeom prst="rect">
@@ -11468,13 +11568,13 @@
       </p:sp>
       <p:sp>
         <p:nvSpPr>
-          <p:cNvPr id="186" name="Diamond 21"/>
+          <p:cNvPr id="188" name="Diamond 21"/>
           <p:cNvSpPr/>
           <p:nvPr/>
         </p:nvSpPr>
         <p:spPr>
           <a:xfrm>
-            <a:off x="6400800" y="5029200"/>
+            <a:off x="7214400" y="5183280"/>
             <a:ext cx="1827360" cy="385200"/>
           </a:xfrm>
           <a:prstGeom prst="diamond">
@@ -11533,7 +11633,7 @@
       </p:sp>
       <p:cxnSp>
         <p:nvCxnSpPr>
-          <p:cNvPr id="187" name="Straight Arrow Connector 56"/>
+          <p:cNvPr id="189" name="Straight Arrow Connector 56"/>
           <p:cNvCxnSpPr/>
           <p:nvPr/>
         </p:nvCxnSpPr>
@@ -11555,27 +11655,27 @@
       </p:cxnSp>
       <p:grpSp>
         <p:nvGrpSpPr>
-          <p:cNvPr id="188" name="Group 12"/>
+          <p:cNvPr id="190" name="Group 12"/>
           <p:cNvGrpSpPr/>
           <p:nvPr/>
         </p:nvGrpSpPr>
         <p:grpSpPr>
           <a:xfrm>
-            <a:off x="7291080" y="2879640"/>
+            <a:off x="8534520" y="2879640"/>
             <a:ext cx="1623960" cy="564840"/>
-            <a:chOff x="7291080" y="2879640"/>
+            <a:chOff x="8534520" y="2879640"/>
             <a:chExt cx="1623960" cy="564840"/>
           </a:xfrm>
         </p:grpSpPr>
         <p:sp>
           <p:nvSpPr>
-            <p:cNvPr id="189" name="TextBox 23"/>
+            <p:cNvPr id="191" name="TextBox 23"/>
             <p:cNvSpPr/>
             <p:nvPr/>
           </p:nvSpPr>
           <p:spPr>
             <a:xfrm>
-              <a:off x="7291080" y="2879640"/>
+              <a:off x="8534520" y="2879640"/>
               <a:ext cx="1623960" cy="303120"/>
             </a:xfrm>
             <a:prstGeom prst="rect">
@@ -11626,13 +11726,13 @@
         </p:sp>
         <p:sp>
           <p:nvSpPr>
-            <p:cNvPr id="190" name="TextBox 24"/>
+            <p:cNvPr id="192" name="TextBox 24"/>
             <p:cNvSpPr/>
             <p:nvPr/>
           </p:nvSpPr>
           <p:spPr>
             <a:xfrm>
-              <a:off x="7291080" y="3141000"/>
+              <a:off x="8534520" y="3141000"/>
               <a:ext cx="1623960" cy="303480"/>
             </a:xfrm>
             <a:prstGeom prst="rect">
@@ -11675,27 +11775,27 @@
       </p:grpSp>
       <p:grpSp>
         <p:nvGrpSpPr>
-          <p:cNvPr id="191" name="Group 16"/>
+          <p:cNvPr id="193" name="Group 16"/>
           <p:cNvGrpSpPr/>
           <p:nvPr/>
         </p:nvGrpSpPr>
         <p:grpSpPr>
           <a:xfrm>
-            <a:off x="7291080" y="2879640"/>
+            <a:off x="8534520" y="2879640"/>
             <a:ext cx="1623960" cy="564480"/>
-            <a:chOff x="7291080" y="2879640"/>
+            <a:chOff x="8534520" y="2879640"/>
             <a:chExt cx="1623960" cy="564480"/>
           </a:xfrm>
         </p:grpSpPr>
         <p:sp>
           <p:nvSpPr>
-            <p:cNvPr id="192" name="TextBox 40"/>
+            <p:cNvPr id="194" name="TextBox 40"/>
             <p:cNvSpPr/>
             <p:nvPr/>
           </p:nvSpPr>
           <p:spPr>
             <a:xfrm>
-              <a:off x="7291080" y="2879640"/>
+              <a:off x="8534520" y="2879640"/>
               <a:ext cx="1623960" cy="303120"/>
             </a:xfrm>
             <a:prstGeom prst="rect">
@@ -11746,13 +11846,13 @@
         </p:sp>
         <p:sp>
           <p:nvSpPr>
-            <p:cNvPr id="193" name="TextBox 59"/>
+            <p:cNvPr id="195" name="TextBox 59"/>
             <p:cNvSpPr/>
             <p:nvPr/>
           </p:nvSpPr>
           <p:spPr>
             <a:xfrm>
-              <a:off x="7291080" y="3141000"/>
+              <a:off x="8534520" y="3141000"/>
               <a:ext cx="1623960" cy="303120"/>
             </a:xfrm>
             <a:prstGeom prst="rect">
@@ -11809,13 +11909,13 @@
       </p:grpSp>
       <p:sp>
         <p:nvSpPr>
-          <p:cNvPr id="181" name="Isosceles Triangle 7"/>
+          <p:cNvPr id="182" name="Isosceles Triangle 7"/>
           <p:cNvSpPr/>
           <p:nvPr/>
         </p:nvSpPr>
         <p:spPr>
           <a:xfrm>
-            <a:off x="7977600" y="3729240"/>
+            <a:off x="9221400" y="3729240"/>
             <a:ext cx="480240" cy="385200"/>
           </a:xfrm>
           <a:prstGeom prst="triangle">
@@ -11876,17 +11976,17 @@
       </p:sp>
       <p:cxnSp>
         <p:nvCxnSpPr>
-          <p:cNvPr id="194" name="Straight Arrow Connector 80"/>
+          <p:cNvPr id="196" name="Straight Arrow Connector 80"/>
           <p:cNvCxnSpPr>
-            <a:stCxn id="191" idx="2"/>
-            <a:endCxn id="181" idx="0"/>
+            <a:stCxn id="193" idx="2"/>
+            <a:endCxn id="182" idx="0"/>
           </p:cNvCxnSpPr>
           <p:nvPr/>
         </p:nvCxnSpPr>
         <p:spPr>
           <a:xfrm>
-            <a:off x="8102880" y="3444120"/>
-            <a:ext cx="115200" cy="285480"/>
+            <a:off x="9346320" y="3444120"/>
+            <a:ext cx="115560" cy="285480"/>
           </a:xfrm>
           <a:prstGeom prst="straightConnector1">
             <a:avLst/>
@@ -11901,13 +12001,13 @@
       </p:cxnSp>
       <p:cxnSp>
         <p:nvCxnSpPr>
-          <p:cNvPr id="195" name="Straight Arrow Connector 52"/>
+          <p:cNvPr id="197" name="Straight Arrow Connector 52"/>
           <p:cNvCxnSpPr/>
           <p:nvPr/>
         </p:nvCxnSpPr>
         <p:spPr>
           <a:xfrm>
-            <a:off x="7313400" y="3657600"/>
+            <a:off x="8556840" y="3657600"/>
             <a:ext cx="1831320" cy="2520"/>
           </a:xfrm>
           <a:prstGeom prst="straightConnector1">
@@ -11924,13 +12024,13 @@
       </p:cxnSp>
       <p:sp>
         <p:nvSpPr>
-          <p:cNvPr id="196" name=""/>
+          <p:cNvPr id="198" name=""/>
           <p:cNvSpPr/>
           <p:nvPr/>
         </p:nvSpPr>
         <p:spPr>
           <a:xfrm>
-            <a:off x="8458200" y="3382920"/>
+            <a:off x="9601200" y="3382920"/>
             <a:ext cx="914040" cy="345960"/>
           </a:xfrm>
           <a:prstGeom prst="rect">
@@ -11977,13 +12077,13 @@
       </p:sp>
       <p:sp>
         <p:nvSpPr>
-          <p:cNvPr id="197" name="TextBox 49"/>
+          <p:cNvPr id="199" name="TextBox 49"/>
           <p:cNvSpPr/>
           <p:nvPr/>
         </p:nvSpPr>
         <p:spPr>
           <a:xfrm>
-            <a:off x="1804680" y="1600200"/>
+            <a:off x="2057400" y="2132280"/>
             <a:ext cx="1623960" cy="303120"/>
           </a:xfrm>
           <a:prstGeom prst="rect">
@@ -12034,13 +12134,13 @@
       </p:sp>
       <p:sp>
         <p:nvSpPr>
-          <p:cNvPr id="198" name="TextBox 50"/>
+          <p:cNvPr id="200" name="TextBox 50"/>
           <p:cNvSpPr/>
           <p:nvPr/>
         </p:nvSpPr>
         <p:spPr>
           <a:xfrm>
-            <a:off x="1804680" y="1861560"/>
+            <a:off x="2057400" y="2393640"/>
             <a:ext cx="1623960" cy="195480"/>
           </a:xfrm>
           <a:prstGeom prst="rect">
@@ -12082,13 +12182,13 @@
       </p:sp>
       <p:sp>
         <p:nvSpPr>
-          <p:cNvPr id="199" name="Isosceles Triangle 8"/>
+          <p:cNvPr id="201" name="Isosceles Triangle 8"/>
           <p:cNvSpPr/>
           <p:nvPr/>
         </p:nvSpPr>
         <p:spPr>
           <a:xfrm>
-            <a:off x="3405600" y="986040"/>
+            <a:off x="2613960" y="1217880"/>
             <a:ext cx="480240" cy="385200"/>
           </a:xfrm>
           <a:prstGeom prst="triangle">
@@ -12149,17 +12249,17 @@
       </p:sp>
       <p:cxnSp>
         <p:nvCxnSpPr>
-          <p:cNvPr id="200" name="Straight Arrow Connector 81"/>
+          <p:cNvPr id="202" name="Straight Arrow Connector 81"/>
           <p:cNvCxnSpPr>
-            <a:stCxn id="199" idx="3"/>
-            <a:endCxn id="197" idx="0"/>
+            <a:stCxn id="201" idx="3"/>
+            <a:endCxn id="199" idx="0"/>
           </p:cNvCxnSpPr>
           <p:nvPr/>
         </p:nvCxnSpPr>
         <p:spPr>
-          <a:xfrm flipH="1">
-            <a:off x="2616480" y="1371240"/>
-            <a:ext cx="1029600" cy="229320"/>
+          <a:xfrm>
+            <a:off x="2854080" y="1603080"/>
+            <a:ext cx="15480" cy="529560"/>
           </a:xfrm>
           <a:prstGeom prst="straightConnector1">
             <a:avLst/>
@@ -12174,17 +12274,17 @@
       </p:cxnSp>
       <p:cxnSp>
         <p:nvCxnSpPr>
-          <p:cNvPr id="201" name="Straight Arrow Connector 82"/>
+          <p:cNvPr id="203" name="Straight Arrow Connector 82"/>
           <p:cNvCxnSpPr>
-            <a:stCxn id="199" idx="0"/>
-            <a:endCxn id="143" idx="1"/>
+            <a:stCxn id="201" idx="0"/>
+            <a:endCxn id="144" idx="1"/>
           </p:cNvCxnSpPr>
           <p:nvPr/>
         </p:nvCxnSpPr>
         <p:spPr>
-          <a:xfrm>
-            <a:off x="3645720" y="986040"/>
-            <a:ext cx="1129680" cy="97920"/>
+          <a:xfrm flipV="1">
+            <a:off x="2854080" y="1083600"/>
+            <a:ext cx="1921320" cy="134640"/>
           </a:xfrm>
           <a:prstGeom prst="straightConnector1">
             <a:avLst/>
@@ -12199,16 +12299,16 @@
       </p:cxnSp>
       <p:cxnSp>
         <p:nvCxnSpPr>
-          <p:cNvPr id="202" name="Straight Arrow Connector 83"/>
+          <p:cNvPr id="204" name="Straight Arrow Connector 83"/>
           <p:cNvCxnSpPr>
-            <a:stCxn id="176" idx="2"/>
-            <a:endCxn id="186" idx="0"/>
+            <a:stCxn id="177" idx="2"/>
+            <a:endCxn id="188" idx="0"/>
           </p:cNvCxnSpPr>
           <p:nvPr/>
         </p:nvCxnSpPr>
         <p:spPr>
           <a:xfrm>
-            <a:off x="7212600" y="4770000"/>
+            <a:off x="8026200" y="4924080"/>
             <a:ext cx="102240" cy="259560"/>
           </a:xfrm>
           <a:prstGeom prst="straightConnector1">
@@ -12225,17 +12325,17 @@
       </p:cxnSp>
       <p:cxnSp>
         <p:nvCxnSpPr>
-          <p:cNvPr id="203" name="Straight Arrow Connector 57"/>
+          <p:cNvPr id="205" name="Straight Arrow Connector 57"/>
           <p:cNvCxnSpPr>
-            <a:stCxn id="186" idx="2"/>
-            <a:endCxn id="185" idx="0"/>
+            <a:stCxn id="188" idx="2"/>
+            <a:endCxn id="187" idx="0"/>
           </p:cNvCxnSpPr>
           <p:nvPr/>
         </p:nvCxnSpPr>
         <p:spPr>
           <a:xfrm>
-            <a:off x="7314480" y="5414400"/>
-            <a:ext cx="127080" cy="300960"/>
+            <a:off x="8128080" y="5568480"/>
+            <a:ext cx="227880" cy="146880"/>
           </a:xfrm>
           <a:prstGeom prst="straightConnector1">
             <a:avLst/>
@@ -12280,7 +12380,7 @@
       </p:grpSpPr>
       <p:cxnSp>
         <p:nvCxnSpPr>
-          <p:cNvPr id="204" name="Straight Arrow Connector 44"/>
+          <p:cNvPr id="206" name="Straight Arrow Connector 44"/>
           <p:cNvCxnSpPr/>
           <p:nvPr/>
         </p:nvCxnSpPr>
@@ -12303,7 +12403,7 @@
       </p:cxnSp>
       <p:cxnSp>
         <p:nvCxnSpPr>
-          <p:cNvPr id="205" name="Straight Arrow Connector 45"/>
+          <p:cNvPr id="207" name="Straight Arrow Connector 45"/>
           <p:cNvCxnSpPr/>
           <p:nvPr/>
         </p:nvCxnSpPr>
@@ -12326,7 +12426,7 @@
       </p:cxnSp>
       <p:cxnSp>
         <p:nvCxnSpPr>
-          <p:cNvPr id="206" name="Straight Arrow Connector 46"/>
+          <p:cNvPr id="208" name="Straight Arrow Connector 46"/>
           <p:cNvCxnSpPr/>
           <p:nvPr/>
         </p:nvCxnSpPr>
@@ -12349,7 +12449,7 @@
       </p:cxnSp>
       <p:cxnSp>
         <p:nvCxnSpPr>
-          <p:cNvPr id="207" name="Straight Arrow Connector 47"/>
+          <p:cNvPr id="209" name="Straight Arrow Connector 47"/>
           <p:cNvCxnSpPr/>
           <p:nvPr/>
         </p:nvCxnSpPr>
@@ -12371,7 +12471,7 @@
       </p:cxnSp>
       <p:sp>
         <p:nvSpPr>
-          <p:cNvPr id="208" name="Diamond 17"/>
+          <p:cNvPr id="210" name="Diamond 17"/>
           <p:cNvSpPr/>
           <p:nvPr/>
         </p:nvSpPr>
@@ -12436,7 +12536,7 @@
       </p:sp>
       <p:sp>
         <p:nvSpPr>
-          <p:cNvPr id="209" name="Oval 4"/>
+          <p:cNvPr id="211" name="Oval 4"/>
           <p:cNvSpPr/>
           <p:nvPr/>
         </p:nvSpPr>
@@ -12499,7 +12599,7 @@
       </p:sp>
       <p:sp>
         <p:nvSpPr>
-          <p:cNvPr id="210" name="TextBox 53"/>
+          <p:cNvPr id="212" name="TextBox 53"/>
           <p:cNvSpPr/>
           <p:nvPr/>
         </p:nvSpPr>
@@ -12556,7 +12656,7 @@
       </p:sp>
       <p:sp>
         <p:nvSpPr>
-          <p:cNvPr id="211" name="TextBox 54"/>
+          <p:cNvPr id="213" name="TextBox 54"/>
           <p:cNvSpPr/>
           <p:nvPr/>
         </p:nvSpPr>
@@ -12646,7 +12746,7 @@
       </p:sp>
       <p:sp>
         <p:nvSpPr>
-          <p:cNvPr id="212" name="TextBox 72"/>
+          <p:cNvPr id="214" name="TextBox 72"/>
           <p:cNvSpPr/>
           <p:nvPr/>
         </p:nvSpPr>
@@ -12703,7 +12803,7 @@
       </p:sp>
       <p:sp>
         <p:nvSpPr>
-          <p:cNvPr id="213" name="Diamond 18"/>
+          <p:cNvPr id="215" name="Diamond 18"/>
           <p:cNvSpPr/>
           <p:nvPr/>
         </p:nvSpPr>
@@ -12791,7 +12891,7 @@
       </p:sp>
       <p:cxnSp>
         <p:nvCxnSpPr>
-          <p:cNvPr id="214" name="Straight Arrow Connector 48"/>
+          <p:cNvPr id="216" name="Straight Arrow Connector 48"/>
           <p:cNvCxnSpPr/>
           <p:nvPr/>
         </p:nvCxnSpPr>
@@ -12813,7 +12913,7 @@
       </p:cxnSp>
       <p:sp>
         <p:nvSpPr>
-          <p:cNvPr id="215" name="Isosceles Triangle 5"/>
+          <p:cNvPr id="217" name="Isosceles Triangle 5"/>
           <p:cNvSpPr/>
           <p:nvPr/>
         </p:nvSpPr>
@@ -12880,7 +12980,7 @@
       </p:sp>
       <p:grpSp>
         <p:nvGrpSpPr>
-          <p:cNvPr id="216" name="Group 15"/>
+          <p:cNvPr id="218" name="Group 15"/>
           <p:cNvGrpSpPr/>
           <p:nvPr/>
         </p:nvGrpSpPr>
@@ -12894,7 +12994,7 @@
         </p:grpSpPr>
         <p:sp>
           <p:nvSpPr>
-            <p:cNvPr id="217" name="TextBox 57"/>
+            <p:cNvPr id="219" name="TextBox 57"/>
             <p:cNvSpPr/>
             <p:nvPr/>
           </p:nvSpPr>
@@ -12952,7 +13052,7 @@
         </p:sp>
         <p:sp>
           <p:nvSpPr>
-            <p:cNvPr id="218" name="TextBox 58"/>
+            <p:cNvPr id="220" name="TextBox 58"/>
             <p:cNvSpPr/>
             <p:nvPr/>
           </p:nvSpPr>
@@ -13044,13 +13144,13 @@
       </p:grpSp>
       <p:sp>
         <p:nvSpPr>
-          <p:cNvPr id="219" name="TextBox 62"/>
+          <p:cNvPr id="221" name="TextBox 62"/>
           <p:cNvSpPr/>
           <p:nvPr/>
         </p:nvSpPr>
         <p:spPr>
           <a:xfrm>
-            <a:off x="7493400" y="746280"/>
+            <a:off x="5486400" y="531720"/>
             <a:ext cx="1623960" cy="303120"/>
           </a:xfrm>
           <a:prstGeom prst="rect">
@@ -13107,13 +13207,13 @@
       </p:sp>
       <p:sp>
         <p:nvSpPr>
-          <p:cNvPr id="220" name="TextBox 65"/>
+          <p:cNvPr id="222" name="TextBox 65"/>
           <p:cNvSpPr/>
           <p:nvPr/>
         </p:nvSpPr>
         <p:spPr>
           <a:xfrm>
-            <a:off x="7493400" y="443160"/>
+            <a:off x="5486400" y="228600"/>
             <a:ext cx="1623960" cy="303120"/>
           </a:xfrm>
           <a:prstGeom prst="rect">
@@ -13164,27 +13264,27 @@
       </p:sp>
       <p:grpSp>
         <p:nvGrpSpPr>
-          <p:cNvPr id="221" name="Group 17"/>
+          <p:cNvPr id="223" name="Group 17"/>
           <p:cNvGrpSpPr/>
           <p:nvPr/>
         </p:nvGrpSpPr>
         <p:grpSpPr>
           <a:xfrm>
-            <a:off x="5715000" y="3200400"/>
+            <a:off x="4319640" y="2422440"/>
             <a:ext cx="1623960" cy="777960"/>
-            <a:chOff x="5715000" y="3200400"/>
+            <a:chOff x="4319640" y="2422440"/>
             <a:chExt cx="1623960" cy="777960"/>
           </a:xfrm>
         </p:grpSpPr>
         <p:sp>
           <p:nvSpPr>
-            <p:cNvPr id="222" name="TextBox 61"/>
+            <p:cNvPr id="224" name="TextBox 61"/>
             <p:cNvSpPr/>
             <p:nvPr/>
           </p:nvSpPr>
           <p:spPr>
             <a:xfrm>
-              <a:off x="5715000" y="3200400"/>
+              <a:off x="4319640" y="2422440"/>
               <a:ext cx="1623960" cy="303120"/>
             </a:xfrm>
             <a:prstGeom prst="rect">
@@ -13235,13 +13335,13 @@
         </p:sp>
         <p:sp>
           <p:nvSpPr>
-            <p:cNvPr id="223" name="TextBox 63"/>
+            <p:cNvPr id="225" name="TextBox 63"/>
             <p:cNvSpPr/>
             <p:nvPr/>
           </p:nvSpPr>
           <p:spPr>
             <a:xfrm>
-              <a:off x="5715000" y="3461760"/>
+              <a:off x="4319640" y="2683800"/>
               <a:ext cx="1623960" cy="516600"/>
             </a:xfrm>
             <a:prstGeom prst="rect">
@@ -13326,27 +13426,27 @@
       </p:grpSp>
       <p:grpSp>
         <p:nvGrpSpPr>
-          <p:cNvPr id="224" name="Group 18"/>
+          <p:cNvPr id="226" name="Group 18"/>
           <p:cNvGrpSpPr/>
           <p:nvPr/>
         </p:nvGrpSpPr>
         <p:grpSpPr>
           <a:xfrm>
-            <a:off x="10058400" y="2482920"/>
+            <a:off x="9348840" y="2254320"/>
             <a:ext cx="1623960" cy="1631880"/>
-            <a:chOff x="10058400" y="2482920"/>
+            <a:chOff x="9348840" y="2254320"/>
             <a:chExt cx="1623960" cy="1631880"/>
           </a:xfrm>
         </p:grpSpPr>
         <p:sp>
           <p:nvSpPr>
-            <p:cNvPr id="225" name="TextBox 64"/>
+            <p:cNvPr id="227" name="TextBox 64"/>
             <p:cNvSpPr/>
             <p:nvPr/>
           </p:nvSpPr>
           <p:spPr>
             <a:xfrm>
-              <a:off x="10058400" y="2482920"/>
+              <a:off x="9348840" y="2254320"/>
               <a:ext cx="1623960" cy="303120"/>
             </a:xfrm>
             <a:prstGeom prst="rect">
@@ -13397,13 +13497,13 @@
         </p:sp>
         <p:sp>
           <p:nvSpPr>
-            <p:cNvPr id="226" name="TextBox 66"/>
+            <p:cNvPr id="228" name="TextBox 66"/>
             <p:cNvSpPr/>
             <p:nvPr/>
           </p:nvSpPr>
           <p:spPr>
             <a:xfrm>
-              <a:off x="10058400" y="2744280"/>
+              <a:off x="9348840" y="2515680"/>
               <a:ext cx="1623960" cy="1370520"/>
             </a:xfrm>
             <a:prstGeom prst="rect">
@@ -13596,7 +13696,7 @@
       </p:grpSp>
       <p:sp>
         <p:nvSpPr>
-          <p:cNvPr id="227" name="Diamond 19"/>
+          <p:cNvPr id="229" name="Diamond 19"/>
           <p:cNvSpPr/>
           <p:nvPr/>
         </p:nvSpPr>
@@ -13661,7 +13761,7 @@
       </p:sp>
       <p:sp>
         <p:nvSpPr>
-          <p:cNvPr id="228" name="Oval 5"/>
+          <p:cNvPr id="230" name="Oval 5"/>
           <p:cNvSpPr/>
           <p:nvPr/>
         </p:nvSpPr>
@@ -13724,27 +13824,27 @@
       </p:sp>
       <p:grpSp>
         <p:nvGrpSpPr>
-          <p:cNvPr id="229" name="Group 19"/>
+          <p:cNvPr id="231" name="Group 19"/>
           <p:cNvGrpSpPr/>
           <p:nvPr/>
         </p:nvGrpSpPr>
         <p:grpSpPr>
           <a:xfrm>
-            <a:off x="10058400" y="2482920"/>
+            <a:off x="9348840" y="2254320"/>
             <a:ext cx="1623960" cy="1631880"/>
-            <a:chOff x="10058400" y="2482920"/>
+            <a:chOff x="9348840" y="2254320"/>
             <a:chExt cx="1623960" cy="1631880"/>
           </a:xfrm>
         </p:grpSpPr>
         <p:sp>
           <p:nvSpPr>
-            <p:cNvPr id="230" name="TextBox 67"/>
+            <p:cNvPr id="232" name="TextBox 67"/>
             <p:cNvSpPr/>
             <p:nvPr/>
           </p:nvSpPr>
           <p:spPr>
             <a:xfrm>
-              <a:off x="10058400" y="2482920"/>
+              <a:off x="9348840" y="2254320"/>
               <a:ext cx="1623960" cy="303120"/>
             </a:xfrm>
             <a:prstGeom prst="rect">
@@ -13795,13 +13895,13 @@
         </p:sp>
         <p:sp>
           <p:nvSpPr>
-            <p:cNvPr id="231" name="TextBox 68"/>
+            <p:cNvPr id="233" name="TextBox 68"/>
             <p:cNvSpPr/>
             <p:nvPr/>
           </p:nvSpPr>
           <p:spPr>
             <a:xfrm>
-              <a:off x="10058400" y="2744280"/>
+              <a:off x="9348840" y="2515680"/>
               <a:ext cx="1623960" cy="1370520"/>
             </a:xfrm>
             <a:prstGeom prst="rect">
@@ -13994,27 +14094,27 @@
       </p:grpSp>
       <p:grpSp>
         <p:nvGrpSpPr>
-          <p:cNvPr id="232" name="Group 20"/>
+          <p:cNvPr id="234" name="Group 20"/>
           <p:cNvGrpSpPr/>
           <p:nvPr/>
         </p:nvGrpSpPr>
         <p:grpSpPr>
           <a:xfrm>
-            <a:off x="10058400" y="2482920"/>
+            <a:off x="9348840" y="2254320"/>
             <a:ext cx="1623960" cy="1631880"/>
-            <a:chOff x="10058400" y="2482920"/>
+            <a:chOff x="9348840" y="2254320"/>
             <a:chExt cx="1623960" cy="1631880"/>
           </a:xfrm>
         </p:grpSpPr>
         <p:sp>
           <p:nvSpPr>
-            <p:cNvPr id="233" name="TextBox 69"/>
+            <p:cNvPr id="235" name="TextBox 69"/>
             <p:cNvSpPr/>
             <p:nvPr/>
           </p:nvSpPr>
           <p:spPr>
             <a:xfrm>
-              <a:off x="10058400" y="2482920"/>
+              <a:off x="9348840" y="2254320"/>
               <a:ext cx="1623960" cy="303120"/>
             </a:xfrm>
             <a:prstGeom prst="rect">
@@ -14065,13 +14165,13 @@
         </p:sp>
         <p:sp>
           <p:nvSpPr>
-            <p:cNvPr id="234" name="TextBox 70"/>
+            <p:cNvPr id="236" name="TextBox 70"/>
             <p:cNvSpPr/>
             <p:nvPr/>
           </p:nvSpPr>
           <p:spPr>
             <a:xfrm>
-              <a:off x="10058400" y="2744280"/>
+              <a:off x="9348840" y="2515680"/>
               <a:ext cx="1623960" cy="1370520"/>
             </a:xfrm>
             <a:prstGeom prst="rect">
@@ -14264,13 +14364,13 @@
       </p:grpSp>
       <p:sp>
         <p:nvSpPr>
-          <p:cNvPr id="235" name="Diamond 25"/>
+          <p:cNvPr id="237" name="Diamond 25"/>
           <p:cNvSpPr/>
           <p:nvPr/>
         </p:nvSpPr>
         <p:spPr>
           <a:xfrm>
-            <a:off x="7772400" y="3339000"/>
+            <a:off x="6859440" y="2743200"/>
             <a:ext cx="1827360" cy="385200"/>
           </a:xfrm>
           <a:prstGeom prst="diamond">
@@ -14329,13 +14429,13 @@
       </p:sp>
       <p:sp>
         <p:nvSpPr>
-          <p:cNvPr id="236" name="Diamond 16"/>
+          <p:cNvPr id="238" name="Diamond 16"/>
           <p:cNvSpPr/>
           <p:nvPr/>
         </p:nvSpPr>
         <p:spPr>
           <a:xfrm>
-            <a:off x="9859320" y="1371600"/>
+            <a:off x="9149760" y="1143000"/>
             <a:ext cx="1797840" cy="385200"/>
           </a:xfrm>
           <a:prstGeom prst="diamond">
@@ -14394,17 +14494,17 @@
       </p:sp>
       <p:cxnSp>
         <p:nvCxnSpPr>
-          <p:cNvPr id="237" name="Straight Arrow Connector 65"/>
+          <p:cNvPr id="239" name="Straight Arrow Connector 65"/>
           <p:cNvCxnSpPr>
-            <a:stCxn id="219" idx="3"/>
-            <a:endCxn id="236" idx="0"/>
+            <a:stCxn id="221" idx="3"/>
+            <a:endCxn id="238" idx="0"/>
           </p:cNvCxnSpPr>
           <p:nvPr/>
         </p:nvCxnSpPr>
         <p:spPr>
           <a:xfrm>
-            <a:off x="9117360" y="897840"/>
-            <a:ext cx="1641240" cy="474120"/>
+            <a:off x="7110360" y="683280"/>
+            <a:ext cx="2938680" cy="460080"/>
           </a:xfrm>
           <a:prstGeom prst="straightConnector1">
             <a:avLst/>
@@ -14420,10 +14520,10 @@
       </p:cxnSp>
       <p:cxnSp>
         <p:nvCxnSpPr>
-          <p:cNvPr id="238" name="Straight Arrow Connector 40"/>
+          <p:cNvPr id="240" name="Straight Arrow Connector 40"/>
           <p:cNvCxnSpPr>
-            <a:stCxn id="227" idx="2"/>
-            <a:endCxn id="212" idx="0"/>
+            <a:stCxn id="229" idx="2"/>
+            <a:endCxn id="214" idx="0"/>
           </p:cNvCxnSpPr>
           <p:nvPr/>
         </p:nvCxnSpPr>
@@ -14445,17 +14545,17 @@
       </p:cxnSp>
       <p:cxnSp>
         <p:nvCxnSpPr>
-          <p:cNvPr id="239" name="Straight Arrow Connector 41"/>
+          <p:cNvPr id="241" name="Straight Arrow Connector 41"/>
           <p:cNvCxnSpPr>
-            <a:stCxn id="232" idx="2"/>
-            <a:endCxn id="227" idx="0"/>
+            <a:stCxn id="234" idx="2"/>
+            <a:endCxn id="229" idx="0"/>
           </p:cNvCxnSpPr>
           <p:nvPr/>
         </p:nvCxnSpPr>
         <p:spPr>
-          <a:xfrm flipH="1">
-            <a:off x="10186920" y="4114800"/>
-            <a:ext cx="683640" cy="457560"/>
+          <a:xfrm>
+            <a:off x="10160640" y="3886200"/>
+            <a:ext cx="26640" cy="686160"/>
           </a:xfrm>
           <a:prstGeom prst="straightConnector1">
             <a:avLst/>
@@ -14470,10 +14570,10 @@
       </p:cxnSp>
       <p:cxnSp>
         <p:nvCxnSpPr>
-          <p:cNvPr id="240" name="Straight Arrow Connector 42"/>
+          <p:cNvPr id="242" name="Straight Arrow Connector 42"/>
           <p:cNvCxnSpPr>
-            <a:stCxn id="227" idx="1"/>
-            <a:endCxn id="228" idx="6"/>
+            <a:stCxn id="229" idx="1"/>
+            <a:endCxn id="230" idx="6"/>
           </p:cNvCxnSpPr>
           <p:nvPr/>
         </p:nvCxnSpPr>
@@ -14495,7 +14595,7 @@
       </p:cxnSp>
       <p:sp>
         <p:nvSpPr>
-          <p:cNvPr id="241" name="Oval 7"/>
+          <p:cNvPr id="243" name="Oval 7"/>
           <p:cNvSpPr/>
           <p:nvPr/>
         </p:nvSpPr>
@@ -14558,10 +14658,10 @@
       </p:sp>
       <p:cxnSp>
         <p:nvCxnSpPr>
-          <p:cNvPr id="242" name="Straight Arrow Connector 66"/>
+          <p:cNvPr id="244" name="Straight Arrow Connector 66"/>
           <p:cNvCxnSpPr>
-            <a:stCxn id="227" idx="1"/>
-            <a:endCxn id="241" idx="6"/>
+            <a:stCxn id="229" idx="1"/>
+            <a:endCxn id="243" idx="6"/>
           </p:cNvCxnSpPr>
           <p:nvPr/>
         </p:nvCxnSpPr>
@@ -14583,17 +14683,17 @@
       </p:cxnSp>
       <p:cxnSp>
         <p:nvCxnSpPr>
-          <p:cNvPr id="243" name="Straight Arrow Connector 67"/>
+          <p:cNvPr id="245" name="Straight Arrow Connector 67"/>
           <p:cNvCxnSpPr>
-            <a:stCxn id="244" idx="1"/>
-            <a:endCxn id="245" idx="6"/>
+            <a:stCxn id="246" idx="1"/>
+            <a:endCxn id="247" idx="6"/>
           </p:cNvCxnSpPr>
           <p:nvPr/>
         </p:nvCxnSpPr>
         <p:spPr>
           <a:xfrm flipH="1">
-            <a:off x="4799160" y="1406160"/>
-            <a:ext cx="459000" cy="158400"/>
+            <a:off x="3656160" y="950400"/>
+            <a:ext cx="1800" cy="457560"/>
           </a:xfrm>
           <a:prstGeom prst="straightConnector1">
             <a:avLst/>
@@ -14608,13 +14708,13 @@
       </p:cxnSp>
       <p:sp>
         <p:nvSpPr>
-          <p:cNvPr id="246" name="Diamond 26"/>
+          <p:cNvPr id="248" name="Diamond 26"/>
           <p:cNvSpPr/>
           <p:nvPr/>
         </p:nvSpPr>
         <p:spPr>
           <a:xfrm>
-            <a:off x="7116120" y="1600200"/>
+            <a:off x="5257800" y="1215000"/>
             <a:ext cx="1569240" cy="385200"/>
           </a:xfrm>
           <a:prstGeom prst="diamond">
@@ -14673,13 +14773,13 @@
       </p:sp>
       <p:sp>
         <p:nvSpPr>
-          <p:cNvPr id="244" name="Diamond 27"/>
+          <p:cNvPr id="246" name="Diamond 27"/>
           <p:cNvSpPr/>
           <p:nvPr/>
         </p:nvSpPr>
         <p:spPr>
           <a:xfrm>
-            <a:off x="5257800" y="1213560"/>
+            <a:off x="3657600" y="757800"/>
             <a:ext cx="1569240" cy="385200"/>
           </a:xfrm>
           <a:prstGeom prst="diamond">
@@ -14738,13 +14838,13 @@
       </p:sp>
       <p:sp>
         <p:nvSpPr>
-          <p:cNvPr id="245" name="Oval 8"/>
+          <p:cNvPr id="247" name="Oval 8"/>
           <p:cNvSpPr/>
           <p:nvPr/>
         </p:nvSpPr>
         <p:spPr>
           <a:xfrm>
-            <a:off x="3200400" y="1371600"/>
+            <a:off x="2057400" y="1215000"/>
             <a:ext cx="1598760" cy="385200"/>
           </a:xfrm>
           <a:prstGeom prst="ellipse">
@@ -14801,17 +14901,17 @@
       </p:sp>
       <p:cxnSp>
         <p:nvCxnSpPr>
-          <p:cNvPr id="247" name="Straight Arrow Connector 68"/>
+          <p:cNvPr id="249" name="Straight Arrow Connector 68"/>
           <p:cNvCxnSpPr>
-            <a:stCxn id="221" idx="0"/>
-            <a:endCxn id="244" idx="2"/>
+            <a:stCxn id="223" idx="0"/>
+            <a:endCxn id="246" idx="2"/>
           </p:cNvCxnSpPr>
           <p:nvPr/>
         </p:nvCxnSpPr>
         <p:spPr>
           <a:xfrm flipH="1" flipV="1">
-            <a:off x="6042600" y="1598760"/>
-            <a:ext cx="484560" cy="1602000"/>
+            <a:off x="4442400" y="1143000"/>
+            <a:ext cx="689400" cy="1279800"/>
           </a:xfrm>
           <a:prstGeom prst="straightConnector1">
             <a:avLst/>
@@ -14827,17 +14927,17 @@
       </p:cxnSp>
       <p:cxnSp>
         <p:nvCxnSpPr>
-          <p:cNvPr id="248" name="Straight Arrow Connector 69"/>
+          <p:cNvPr id="250" name="Straight Arrow Connector 69"/>
           <p:cNvCxnSpPr>
-            <a:stCxn id="220" idx="1"/>
-            <a:endCxn id="244" idx="0"/>
+            <a:stCxn id="222" idx="1"/>
+            <a:endCxn id="246" idx="0"/>
           </p:cNvCxnSpPr>
           <p:nvPr/>
         </p:nvCxnSpPr>
         <p:spPr>
           <a:xfrm flipH="1">
-            <a:off x="6042600" y="594720"/>
-            <a:ext cx="1451160" cy="619200"/>
+            <a:off x="4442400" y="380160"/>
+            <a:ext cx="1044360" cy="378000"/>
           </a:xfrm>
           <a:prstGeom prst="straightConnector1">
             <a:avLst/>
@@ -14852,17 +14952,17 @@
       </p:cxnSp>
       <p:cxnSp>
         <p:nvCxnSpPr>
-          <p:cNvPr id="249" name="Straight Arrow Connector 70"/>
+          <p:cNvPr id="251" name="Straight Arrow Connector 70"/>
           <p:cNvCxnSpPr>
-            <a:stCxn id="221" idx="0"/>
-            <a:endCxn id="246" idx="2"/>
+            <a:stCxn id="223" idx="0"/>
+            <a:endCxn id="248" idx="2"/>
           </p:cNvCxnSpPr>
           <p:nvPr/>
         </p:nvCxnSpPr>
         <p:spPr>
           <a:xfrm flipV="1">
-            <a:off x="6526800" y="1985400"/>
-            <a:ext cx="1374480" cy="1215360"/>
+            <a:off x="5131440" y="1600200"/>
+            <a:ext cx="911520" cy="822600"/>
           </a:xfrm>
           <a:prstGeom prst="straightConnector1">
             <a:avLst/>
@@ -14878,17 +14978,17 @@
       </p:cxnSp>
       <p:cxnSp>
         <p:nvCxnSpPr>
-          <p:cNvPr id="250" name="Straight Arrow Connector 71"/>
+          <p:cNvPr id="252" name="Straight Arrow Connector 71"/>
           <p:cNvCxnSpPr>
-            <a:stCxn id="246" idx="0"/>
-            <a:endCxn id="219" idx="2"/>
+            <a:stCxn id="248" idx="0"/>
+            <a:endCxn id="221" idx="2"/>
           </p:cNvCxnSpPr>
           <p:nvPr/>
         </p:nvCxnSpPr>
         <p:spPr>
           <a:xfrm flipV="1">
-            <a:off x="7900920" y="1049400"/>
-            <a:ext cx="404640" cy="551160"/>
+            <a:off x="6042600" y="834840"/>
+            <a:ext cx="255960" cy="380520"/>
           </a:xfrm>
           <a:prstGeom prst="straightConnector1">
             <a:avLst/>
@@ -14903,17 +15003,17 @@
       </p:cxnSp>
       <p:cxnSp>
         <p:nvCxnSpPr>
-          <p:cNvPr id="251" name="Straight Arrow Connector 64"/>
+          <p:cNvPr id="253" name="Straight Arrow Connector 64"/>
           <p:cNvCxnSpPr>
-            <a:stCxn id="221" idx="3"/>
-            <a:endCxn id="235" idx="1"/>
+            <a:stCxn id="223" idx="3"/>
+            <a:endCxn id="237" idx="1"/>
           </p:cNvCxnSpPr>
           <p:nvPr/>
         </p:nvCxnSpPr>
         <p:spPr>
-          <a:xfrm flipV="1">
-            <a:off x="7338960" y="3531600"/>
-            <a:ext cx="433800" cy="57960"/>
+          <a:xfrm>
+            <a:off x="5943600" y="2811240"/>
+            <a:ext cx="916200" cy="124920"/>
           </a:xfrm>
           <a:prstGeom prst="straightConnector1">
             <a:avLst/>
@@ -14929,17 +15029,17 @@
       </p:cxnSp>
       <p:cxnSp>
         <p:nvCxnSpPr>
-          <p:cNvPr id="252" name="Straight Arrow Connector 63"/>
+          <p:cNvPr id="254" name="Straight Arrow Connector 63"/>
           <p:cNvCxnSpPr>
-            <a:stCxn id="232" idx="1"/>
-            <a:endCxn id="235" idx="3"/>
+            <a:stCxn id="234" idx="1"/>
+            <a:endCxn id="237" idx="3"/>
           </p:cNvCxnSpPr>
           <p:nvPr/>
         </p:nvCxnSpPr>
         <p:spPr>
-          <a:xfrm flipH="1">
-            <a:off x="9599760" y="3298680"/>
-            <a:ext cx="459000" cy="233280"/>
+          <a:xfrm flipH="1" flipV="1">
+            <a:off x="8686800" y="2935800"/>
+            <a:ext cx="662400" cy="134640"/>
           </a:xfrm>
           <a:prstGeom prst="straightConnector1">
             <a:avLst/>
@@ -14954,16 +15054,16 @@
       </p:cxnSp>
       <p:cxnSp>
         <p:nvCxnSpPr>
-          <p:cNvPr id="253" name="Straight Arrow Connector 39"/>
+          <p:cNvPr id="255" name="Straight Arrow Connector 39"/>
           <p:cNvCxnSpPr>
-            <a:stCxn id="232" idx="0"/>
-            <a:endCxn id="236" idx="2"/>
+            <a:stCxn id="234" idx="0"/>
+            <a:endCxn id="238" idx="2"/>
           </p:cNvCxnSpPr>
           <p:nvPr/>
         </p:nvCxnSpPr>
         <p:spPr>
           <a:xfrm flipH="1" flipV="1">
-            <a:off x="10758240" y="1756800"/>
+            <a:off x="10048680" y="1528200"/>
             <a:ext cx="112320" cy="726480"/>
           </a:xfrm>
           <a:prstGeom prst="straightConnector1">
@@ -14979,13 +15079,13 @@
       </p:cxnSp>
       <p:sp>
         <p:nvSpPr>
-          <p:cNvPr id="254" name="Diamond 29"/>
+          <p:cNvPr id="256" name="Diamond 29"/>
           <p:cNvSpPr/>
           <p:nvPr/>
         </p:nvSpPr>
         <p:spPr>
           <a:xfrm>
-            <a:off x="3657600" y="4343400"/>
+            <a:off x="2744640" y="3729600"/>
             <a:ext cx="1827360" cy="385200"/>
           </a:xfrm>
           <a:prstGeom prst="diamond">
@@ -15044,17 +15144,17 @@
       </p:sp>
       <p:cxnSp>
         <p:nvCxnSpPr>
-          <p:cNvPr id="255" name="Straight Arrow Connector 72"/>
+          <p:cNvPr id="257" name="Straight Arrow Connector 72"/>
           <p:cNvCxnSpPr>
-            <a:stCxn id="221" idx="1"/>
-            <a:endCxn id="254" idx="0"/>
+            <a:stCxn id="223" idx="1"/>
+            <a:endCxn id="256" idx="0"/>
           </p:cNvCxnSpPr>
           <p:nvPr/>
         </p:nvCxnSpPr>
         <p:spPr>
           <a:xfrm flipH="1">
-            <a:off x="4571280" y="3589200"/>
-            <a:ext cx="1144080" cy="754560"/>
+            <a:off x="3658320" y="2811240"/>
+            <a:ext cx="661680" cy="918720"/>
           </a:xfrm>
           <a:prstGeom prst="straightConnector1">
             <a:avLst/>
@@ -15069,17 +15169,17 @@
       </p:cxnSp>
       <p:cxnSp>
         <p:nvCxnSpPr>
-          <p:cNvPr id="256" name="Straight Arrow Connector 73"/>
+          <p:cNvPr id="258" name="Straight Arrow Connector 73"/>
           <p:cNvCxnSpPr>
-            <a:stCxn id="221" idx="2"/>
-            <a:endCxn id="254" idx="3"/>
+            <a:stCxn id="223" idx="2"/>
+            <a:endCxn id="256" idx="3"/>
           </p:cNvCxnSpPr>
           <p:nvPr/>
         </p:nvCxnSpPr>
         <p:spPr>
           <a:xfrm flipH="1">
-            <a:off x="5484960" y="3978360"/>
-            <a:ext cx="1042200" cy="558000"/>
+            <a:off x="4572000" y="3200400"/>
+            <a:ext cx="559800" cy="722160"/>
           </a:xfrm>
           <a:prstGeom prst="straightConnector1">
             <a:avLst/>
@@ -15094,7 +15194,7 @@
       </p:cxnSp>
       <p:sp>
         <p:nvSpPr>
-          <p:cNvPr id="257" name="Oval 9"/>
+          <p:cNvPr id="259" name="Oval 9"/>
           <p:cNvSpPr/>
           <p:nvPr/>
         </p:nvSpPr>
@@ -15157,10 +15257,10 @@
       </p:sp>
       <p:cxnSp>
         <p:nvCxnSpPr>
-          <p:cNvPr id="258" name="Straight Arrow Connector 58"/>
+          <p:cNvPr id="260" name="Straight Arrow Connector 58"/>
           <p:cNvCxnSpPr>
-            <a:stCxn id="227" idx="1"/>
-            <a:endCxn id="257" idx="6"/>
+            <a:stCxn id="229" idx="1"/>
+            <a:endCxn id="259" idx="6"/>
           </p:cNvCxnSpPr>
           <p:nvPr/>
         </p:nvCxnSpPr>
@@ -15212,7 +15312,7 @@
       </p:grpSpPr>
       <p:cxnSp>
         <p:nvCxnSpPr>
-          <p:cNvPr id="259" name="Straight Arrow Connector 6"/>
+          <p:cNvPr id="261" name="Straight Arrow Connector 6"/>
           <p:cNvCxnSpPr/>
           <p:nvPr/>
         </p:nvCxnSpPr>
@@ -15235,7 +15335,7 @@
       </p:cxnSp>
       <p:cxnSp>
         <p:nvCxnSpPr>
-          <p:cNvPr id="260" name="Straight Arrow Connector 7"/>
+          <p:cNvPr id="262" name="Straight Arrow Connector 7"/>
           <p:cNvCxnSpPr/>
           <p:nvPr/>
         </p:nvCxnSpPr>
@@ -15258,7 +15358,7 @@
       </p:cxnSp>
       <p:cxnSp>
         <p:nvCxnSpPr>
-          <p:cNvPr id="261" name="Straight Arrow Connector 8"/>
+          <p:cNvPr id="263" name="Straight Arrow Connector 8"/>
           <p:cNvCxnSpPr/>
           <p:nvPr/>
         </p:nvCxnSpPr>
@@ -15281,7 +15381,7 @@
       </p:cxnSp>
       <p:cxnSp>
         <p:nvCxnSpPr>
-          <p:cNvPr id="262" name="Straight Arrow Connector 9"/>
+          <p:cNvPr id="264" name="Straight Arrow Connector 9"/>
           <p:cNvCxnSpPr/>
           <p:nvPr/>
         </p:nvCxnSpPr>
@@ -15303,7 +15403,7 @@
       </p:cxnSp>
       <p:sp>
         <p:nvSpPr>
-          <p:cNvPr id="263" name="Diamond 3"/>
+          <p:cNvPr id="265" name="Diamond 3"/>
           <p:cNvSpPr/>
           <p:nvPr/>
         </p:nvSpPr>
@@ -15368,7 +15468,7 @@
       </p:sp>
       <p:sp>
         <p:nvSpPr>
-          <p:cNvPr id="264" name="Oval 2"/>
+          <p:cNvPr id="266" name="Oval 2"/>
           <p:cNvSpPr/>
           <p:nvPr/>
         </p:nvSpPr>
@@ -15431,7 +15531,7 @@
       </p:sp>
       <p:grpSp>
         <p:nvGrpSpPr>
-          <p:cNvPr id="265" name="Group 3"/>
+          <p:cNvPr id="267" name="Group 3"/>
           <p:cNvGrpSpPr/>
           <p:nvPr/>
         </p:nvGrpSpPr>
@@ -15445,7 +15545,7 @@
         </p:grpSpPr>
         <p:sp>
           <p:nvSpPr>
-            <p:cNvPr id="266" name="TextBox 5"/>
+            <p:cNvPr id="268" name="TextBox 5"/>
             <p:cNvSpPr/>
             <p:nvPr/>
           </p:nvSpPr>
@@ -15502,7 +15602,7 @@
         </p:sp>
         <p:sp>
           <p:nvSpPr>
-            <p:cNvPr id="267" name="TextBox 6"/>
+            <p:cNvPr id="269" name="TextBox 6"/>
             <p:cNvSpPr/>
             <p:nvPr/>
           </p:nvSpPr>
@@ -15593,7 +15693,7 @@
       </p:grpSp>
       <p:sp>
         <p:nvSpPr>
-          <p:cNvPr id="268" name="Diamond 4"/>
+          <p:cNvPr id="270" name="Diamond 4"/>
           <p:cNvSpPr/>
           <p:nvPr/>
         </p:nvSpPr>
@@ -15681,7 +15781,7 @@
       </p:sp>
       <p:cxnSp>
         <p:nvCxnSpPr>
-          <p:cNvPr id="269" name="Straight Arrow Connector 10"/>
+          <p:cNvPr id="271" name="Straight Arrow Connector 10"/>
           <p:cNvCxnSpPr/>
           <p:nvPr/>
         </p:nvCxnSpPr>
@@ -15703,7 +15803,7 @@
       </p:cxnSp>
       <p:sp>
         <p:nvSpPr>
-          <p:cNvPr id="270" name="Isosceles Triangle 2"/>
+          <p:cNvPr id="272" name="Isosceles Triangle 2"/>
           <p:cNvSpPr/>
           <p:nvPr/>
         </p:nvSpPr>
@@ -15770,7 +15870,7 @@
       </p:sp>
       <p:grpSp>
         <p:nvGrpSpPr>
-          <p:cNvPr id="271" name="Group 4"/>
+          <p:cNvPr id="273" name="Group 4"/>
           <p:cNvGrpSpPr/>
           <p:nvPr/>
         </p:nvGrpSpPr>
@@ -15784,7 +15884,7 @@
         </p:grpSpPr>
         <p:sp>
           <p:nvSpPr>
-            <p:cNvPr id="272" name="TextBox 7"/>
+            <p:cNvPr id="274" name="TextBox 7"/>
             <p:cNvSpPr/>
             <p:nvPr/>
           </p:nvSpPr>
@@ -15842,7 +15942,7 @@
         </p:sp>
         <p:sp>
           <p:nvSpPr>
-            <p:cNvPr id="273" name="TextBox 8"/>
+            <p:cNvPr id="275" name="TextBox 8"/>
             <p:cNvSpPr/>
             <p:nvPr/>
           </p:nvSpPr>
@@ -15921,288 +16021,6 @@
                   <a:latin typeface="Calibri"/>
                 </a:rPr>
                 <a:t>Attribute</a:t>
-              </a:r>
-              <a:endParaRPr b="0" lang="en-US" sz="1400" spc="-1" strike="noStrike">
-                <a:solidFill>
-                  <a:srgbClr val="000000"/>
-                </a:solidFill>
-                <a:latin typeface="Arial"/>
-              </a:endParaRPr>
-            </a:p>
-          </p:txBody>
-        </p:sp>
-      </p:grpSp>
-      <p:grpSp>
-        <p:nvGrpSpPr>
-          <p:cNvPr id="274" name="Group 5"/>
-          <p:cNvGrpSpPr/>
-          <p:nvPr/>
-        </p:nvGrpSpPr>
-        <p:grpSpPr>
-          <a:xfrm>
-            <a:off x="4089240" y="885600"/>
-            <a:ext cx="1852560" cy="2070360"/>
-            <a:chOff x="4089240" y="885600"/>
-            <a:chExt cx="1852560" cy="2070360"/>
-          </a:xfrm>
-        </p:grpSpPr>
-        <p:sp>
-          <p:nvSpPr>
-            <p:cNvPr id="275" name="TextBox 22"/>
-            <p:cNvSpPr/>
-            <p:nvPr/>
-          </p:nvSpPr>
-          <p:spPr>
-            <a:xfrm>
-              <a:off x="4089240" y="885600"/>
-              <a:ext cx="1852560" cy="303120"/>
-            </a:xfrm>
-            <a:prstGeom prst="rect">
-              <a:avLst/>
-            </a:prstGeom>
-            <a:solidFill>
-              <a:schemeClr val="bg1"/>
-            </a:solidFill>
-            <a:ln w="0">
-              <a:solidFill>
-                <a:srgbClr val="000000"/>
-              </a:solidFill>
-            </a:ln>
-          </p:spPr>
-          <p:style>
-            <a:lnRef idx="0"/>
-            <a:fillRef idx="0"/>
-            <a:effectRef idx="0"/>
-            <a:fontRef idx="minor"/>
-          </p:style>
-          <p:txBody>
-            <a:bodyPr lIns="90000" rIns="90000" tIns="45000" bIns="45000" anchor="t">
-              <a:spAutoFit/>
-            </a:bodyPr>
-            <a:p>
-              <a:pPr algn="ctr" defTabSz="914400">
-                <a:lnSpc>
-                  <a:spcPct val="100000"/>
-                </a:lnSpc>
-              </a:pPr>
-              <a:r>
-                <a:rPr b="0" lang="en-US" sz="1400" spc="-1" strike="noStrike">
-                  <a:solidFill>
-                    <a:schemeClr val="dk1"/>
-                  </a:solidFill>
-                  <a:latin typeface="Calibri"/>
-                </a:rPr>
-                <a:t>Buildable</a:t>
-              </a:r>
-              <a:endParaRPr b="0" lang="en-US" sz="1400" spc="-1" strike="noStrike">
-                <a:solidFill>
-                  <a:srgbClr val="000000"/>
-                </a:solidFill>
-                <a:latin typeface="Arial"/>
-              </a:endParaRPr>
-            </a:p>
-          </p:txBody>
-        </p:sp>
-        <p:sp>
-          <p:nvSpPr>
-            <p:cNvPr id="276" name="TextBox 29"/>
-            <p:cNvSpPr/>
-            <p:nvPr/>
-          </p:nvSpPr>
-          <p:spPr>
-            <a:xfrm>
-              <a:off x="4089240" y="1158480"/>
-              <a:ext cx="1852560" cy="1797480"/>
-            </a:xfrm>
-            <a:prstGeom prst="rect">
-              <a:avLst/>
-            </a:prstGeom>
-            <a:solidFill>
-              <a:schemeClr val="bg1"/>
-            </a:solidFill>
-            <a:ln w="0">
-              <a:solidFill>
-                <a:srgbClr val="000000"/>
-              </a:solidFill>
-            </a:ln>
-          </p:spPr>
-          <p:style>
-            <a:lnRef idx="0"/>
-            <a:fillRef idx="0"/>
-            <a:effectRef idx="0"/>
-            <a:fontRef idx="minor"/>
-          </p:style>
-          <p:txBody>
-            <a:bodyPr lIns="90000" rIns="90000" tIns="45000" bIns="45000" anchor="t">
-              <a:spAutoFit/>
-            </a:bodyPr>
-            <a:p>
-              <a:pPr marL="304920" indent="-304920" defTabSz="914400">
-                <a:lnSpc>
-                  <a:spcPct val="100000"/>
-                </a:lnSpc>
-                <a:buClr>
-                  <a:srgbClr val="000000"/>
-                </a:buClr>
-                <a:buFont typeface="OpenSymbol"/>
-                <a:buChar char="-"/>
-              </a:pPr>
-              <a:r>
-                <a:rPr b="0" lang="en-US" sz="1400" spc="-1" strike="noStrike" u="sng">
-                  <a:solidFill>
-                    <a:schemeClr val="dk1"/>
-                  </a:solidFill>
-                  <a:uFillTx/>
-                  <a:latin typeface="Calibri"/>
-                </a:rPr>
-                <a:t>Name</a:t>
-              </a:r>
-              <a:endParaRPr b="0" lang="en-US" sz="1400" spc="-1" strike="noStrike">
-                <a:solidFill>
-                  <a:srgbClr val="000000"/>
-                </a:solidFill>
-                <a:latin typeface="Arial"/>
-              </a:endParaRPr>
-            </a:p>
-            <a:p>
-              <a:pPr marL="304920" indent="-304920" defTabSz="914400">
-                <a:lnSpc>
-                  <a:spcPct val="100000"/>
-                </a:lnSpc>
-                <a:buClr>
-                  <a:srgbClr val="000000"/>
-                </a:buClr>
-                <a:buFont typeface="OpenSymbol"/>
-                <a:buChar char="-"/>
-              </a:pPr>
-              <a:r>
-                <a:rPr b="0" lang="en-US" sz="1400" spc="-1" strike="noStrike">
-                  <a:solidFill>
-                    <a:schemeClr val="dk1"/>
-                  </a:solidFill>
-                  <a:latin typeface="Calibri"/>
-                </a:rPr>
-                <a:t>Type</a:t>
-              </a:r>
-              <a:endParaRPr b="0" lang="en-US" sz="1400" spc="-1" strike="noStrike">
-                <a:solidFill>
-                  <a:srgbClr val="000000"/>
-                </a:solidFill>
-                <a:latin typeface="Arial"/>
-              </a:endParaRPr>
-            </a:p>
-            <a:p>
-              <a:pPr marL="304920" indent="-304920" defTabSz="914400">
-                <a:lnSpc>
-                  <a:spcPct val="100000"/>
-                </a:lnSpc>
-                <a:buClr>
-                  <a:srgbClr val="000000"/>
-                </a:buClr>
-                <a:buFont typeface="OpenSymbol"/>
-                <a:buChar char="-"/>
-              </a:pPr>
-              <a:r>
-                <a:rPr b="0" lang="en-US" sz="1400" spc="-1" strike="noStrike">
-                  <a:solidFill>
-                    <a:schemeClr val="dk1"/>
-                  </a:solidFill>
-                  <a:latin typeface="Calibri"/>
-                </a:rPr>
-                <a:t>Function: </a:t>
-              </a:r>
-              <a:br>
-                <a:rPr sz="1400"/>
-              </a:br>
-              <a:r>
-                <a:rPr b="0" lang="en-US" sz="1400" spc="-1" strike="noStrike">
-                  <a:solidFill>
-                    <a:schemeClr val="dk1"/>
-                  </a:solidFill>
-                  <a:latin typeface="Calibri"/>
-                </a:rPr>
-                <a:t>Bread = f(t*level)</a:t>
-              </a:r>
-              <a:endParaRPr b="0" lang="en-US" sz="1400" spc="-1" strike="noStrike">
-                <a:solidFill>
-                  <a:srgbClr val="000000"/>
-                </a:solidFill>
-                <a:latin typeface="Arial"/>
-              </a:endParaRPr>
-            </a:p>
-            <a:p>
-              <a:pPr marL="304920" indent="-304920" defTabSz="914400">
-                <a:lnSpc>
-                  <a:spcPct val="100000"/>
-                </a:lnSpc>
-                <a:buClr>
-                  <a:srgbClr val="000000"/>
-                </a:buClr>
-                <a:buFont typeface="OpenSymbol"/>
-                <a:buChar char="-"/>
-              </a:pPr>
-              <a:r>
-                <a:rPr b="0" lang="en-US" sz="1400" spc="-1" strike="noStrike">
-                  <a:solidFill>
-                    <a:schemeClr val="dk1"/>
-                  </a:solidFill>
-                  <a:latin typeface="Calibri"/>
-                </a:rPr>
-                <a:t>Level</a:t>
-              </a:r>
-              <a:endParaRPr b="0" lang="en-US" sz="1400" spc="-1" strike="noStrike">
-                <a:solidFill>
-                  <a:srgbClr val="000000"/>
-                </a:solidFill>
-                <a:latin typeface="Arial"/>
-              </a:endParaRPr>
-            </a:p>
-            <a:p>
-              <a:pPr marL="304920" indent="-304920" defTabSz="914400">
-                <a:lnSpc>
-                  <a:spcPct val="100000"/>
-                </a:lnSpc>
-                <a:buClr>
-                  <a:srgbClr val="000000"/>
-                </a:buClr>
-                <a:buFont typeface="OpenSymbol"/>
-                <a:buChar char="-"/>
-              </a:pPr>
-              <a:r>
-                <a:rPr b="0" lang="en-US" sz="1400" spc="-1" strike="noStrike">
-                  <a:solidFill>
-                    <a:schemeClr val="dk1"/>
-                  </a:solidFill>
-                  <a:latin typeface="Calibri"/>
-                </a:rPr>
-                <a:t>Building Costs = Cost * Level</a:t>
-              </a:r>
-              <a:endParaRPr b="0" lang="en-US" sz="1400" spc="-1" strike="noStrike">
-                <a:solidFill>
-                  <a:srgbClr val="000000"/>
-                </a:solidFill>
-                <a:latin typeface="Arial"/>
-              </a:endParaRPr>
-            </a:p>
-            <a:p>
-              <a:pPr marL="304920" indent="-304920" defTabSz="914400">
-                <a:lnSpc>
-                  <a:spcPct val="100000"/>
-                </a:lnSpc>
-                <a:buClr>
-                  <a:srgbClr val="000000"/>
-                </a:buClr>
-                <a:buFont typeface="OpenSymbol"/>
-                <a:buChar char="-"/>
-              </a:pPr>
-              <a:r>
-                <a:rPr b="0" lang="en-US" sz="1400" spc="-1" strike="noStrike">
-                  <a:solidFill>
-                    <a:schemeClr val="dk1"/>
-                  </a:solidFill>
-                  <a:latin typeface="Calibri"/>
-                </a:rPr>
-                <a:t>Deletion Drawback</a:t>
               </a:r>
               <a:endParaRPr b="0" lang="en-US" sz="1400" spc="-1" strike="noStrike">
                 <a:solidFill>

</xml_diff>